<commit_message>
Aug 2025 edits to Linux presentation
</commit_message>
<xml_diff>
--- a/logging_in_and_linux/logging_in_linux.pptx
+++ b/logging_in_and_linux/logging_in_linux.pptx
@@ -15,13 +15,13 @@
     <p:sldId id="261" r:id="rId9"/>
     <p:sldId id="294" r:id="rId10"/>
     <p:sldId id="295" r:id="rId11"/>
-    <p:sldId id="271" r:id="rId12"/>
-    <p:sldId id="272" r:id="rId13"/>
-    <p:sldId id="297" r:id="rId14"/>
-    <p:sldId id="296" r:id="rId15"/>
-    <p:sldId id="302" r:id="rId16"/>
-    <p:sldId id="303" r:id="rId17"/>
-    <p:sldId id="301" r:id="rId18"/>
+    <p:sldId id="322" r:id="rId12"/>
+    <p:sldId id="271" r:id="rId13"/>
+    <p:sldId id="272" r:id="rId14"/>
+    <p:sldId id="297" r:id="rId15"/>
+    <p:sldId id="296" r:id="rId16"/>
+    <p:sldId id="302" r:id="rId17"/>
+    <p:sldId id="303" r:id="rId18"/>
     <p:sldId id="304" r:id="rId19"/>
     <p:sldId id="305" r:id="rId20"/>
     <p:sldId id="306" r:id="rId21"/>
@@ -34,11 +34,11 @@
     <p:sldId id="286" r:id="rId28"/>
     <p:sldId id="288" r:id="rId29"/>
     <p:sldId id="289" r:id="rId30"/>
-    <p:sldId id="310" r:id="rId31"/>
-    <p:sldId id="311" r:id="rId32"/>
+    <p:sldId id="341" r:id="rId31"/>
+    <p:sldId id="310" r:id="rId32"/>
     <p:sldId id="266" r:id="rId33"/>
     <p:sldId id="298" r:id="rId34"/>
-    <p:sldId id="312" r:id="rId35"/>
+    <p:sldId id="318" r:id="rId35"/>
   </p:sldIdLst>
   <p:sldSz cx="12192000" cy="6858000"/>
   <p:notesSz cx="6858000" cy="9144000"/>
@@ -1629,6 +1629,97 @@
   <p:cSld>
     <p:spTree>
       <p:nvGrpSpPr>
+        <p:cNvPr id="1" name="Shape 268"/>
+        <p:cNvGrpSpPr/>
+        <p:nvPr/>
+      </p:nvGrpSpPr>
+      <p:grpSpPr>
+        <a:xfrm>
+          <a:off x="0" y="0"/>
+          <a:ext cx="0" cy="0"/>
+          <a:chOff x="0" y="0"/>
+          <a:chExt cx="0" cy="0"/>
+        </a:xfrm>
+      </p:grpSpPr>
+      <p:sp>
+        <p:nvSpPr>
+          <p:cNvPr id="270" name="Google Shape;270;p22:notes"/>
+          <p:cNvSpPr>
+            <a:spLocks noGrp="1" noRot="1" noChangeAspect="1"/>
+          </p:cNvSpPr>
+          <p:nvPr>
+            <p:ph type="sldImg" idx="2"/>
+          </p:nvPr>
+        </p:nvSpPr>
+        <p:spPr>
+          <a:xfrm>
+            <a:off x="685800" y="1143000"/>
+            <a:ext cx="5486400" cy="3086100"/>
+          </a:xfrm>
+          <a:custGeom>
+            <a:avLst/>
+            <a:gdLst/>
+            <a:ahLst/>
+            <a:cxnLst/>
+            <a:rect l="l" t="t" r="r" b="b"/>
+            <a:pathLst>
+              <a:path w="120000" h="120000" extrusionOk="0">
+                <a:moveTo>
+                  <a:pt x="0" y="0"/>
+                </a:moveTo>
+                <a:lnTo>
+                  <a:pt x="120000" y="0"/>
+                </a:lnTo>
+                <a:lnTo>
+                  <a:pt x="120000" y="120000"/>
+                </a:lnTo>
+                <a:lnTo>
+                  <a:pt x="0" y="120000"/>
+                </a:lnTo>
+                <a:close/>
+              </a:path>
+            </a:pathLst>
+          </a:custGeom>
+        </p:spPr>
+      </p:sp>
+      <p:sp>
+        <p:nvSpPr>
+          <p:cNvPr id="3" name="Notes Placeholder 2">
+            <a:extLst>
+              <a:ext uri="{FF2B5EF4-FFF2-40B4-BE49-F238E27FC236}">
+                <a16:creationId xmlns:a16="http://schemas.microsoft.com/office/drawing/2014/main" id="{43D9BD21-8DDE-D8A5-7D0C-099E9F2DA53D}"/>
+              </a:ext>
+            </a:extLst>
+          </p:cNvPr>
+          <p:cNvSpPr>
+            <a:spLocks noGrp="1"/>
+          </p:cNvSpPr>
+          <p:nvPr>
+            <p:ph type="body" idx="1"/>
+          </p:nvPr>
+        </p:nvSpPr>
+        <p:spPr/>
+        <p:txBody>
+          <a:bodyPr/>
+          <a:lstStyle/>
+          <a:p>
+            <a:endParaRPr lang="en-US" dirty="0"/>
+          </a:p>
+        </p:txBody>
+      </p:sp>
+    </p:spTree>
+  </p:cSld>
+  <p:clrMapOvr>
+    <a:masterClrMapping/>
+  </p:clrMapOvr>
+</p:notes>
+</file>
+
+<file path=ppt/notesSlides/notesSlide11.xml><?xml version="1.0" encoding="utf-8"?>
+<p:notes xmlns:a="http://schemas.openxmlformats.org/drawingml/2006/main" xmlns:r="http://schemas.openxmlformats.org/officeDocument/2006/relationships" xmlns:p="http://schemas.openxmlformats.org/presentationml/2006/main" showMasterSp="0" showMasterPhAnim="0">
+  <p:cSld>
+    <p:spTree>
+      <p:nvGrpSpPr>
         <p:cNvPr id="1" name="Shape 247"/>
         <p:cNvGrpSpPr/>
         <p:nvPr/>
@@ -1778,7 +1869,7 @@
 </p:notes>
 </file>
 
-<file path=ppt/notesSlides/notesSlide11.xml><?xml version="1.0" encoding="utf-8"?>
+<file path=ppt/notesSlides/notesSlide12.xml><?xml version="1.0" encoding="utf-8"?>
 <p:notes xmlns:a="http://schemas.openxmlformats.org/drawingml/2006/main" xmlns:r="http://schemas.openxmlformats.org/officeDocument/2006/relationships" xmlns:p="http://schemas.openxmlformats.org/presentationml/2006/main" showMasterSp="0" showMasterPhAnim="0">
   <p:cSld>
     <p:spTree>
@@ -1922,7 +2013,7 @@
 </p:notes>
 </file>
 
-<file path=ppt/notesSlides/notesSlide12.xml><?xml version="1.0" encoding="utf-8"?>
+<file path=ppt/notesSlides/notesSlide13.xml><?xml version="1.0" encoding="utf-8"?>
 <p:notes xmlns:a="http://schemas.openxmlformats.org/drawingml/2006/main" xmlns:r="http://schemas.openxmlformats.org/officeDocument/2006/relationships" xmlns:p="http://schemas.openxmlformats.org/presentationml/2006/main" showMasterSp="0" showMasterPhAnim="0">
   <p:cSld>
     <p:spTree>
@@ -2031,7 +2122,7 @@
 </p:notes>
 </file>
 
-<file path=ppt/notesSlides/notesSlide13.xml><?xml version="1.0" encoding="utf-8"?>
+<file path=ppt/notesSlides/notesSlide14.xml><?xml version="1.0" encoding="utf-8"?>
 <p:notes xmlns:a="http://schemas.openxmlformats.org/drawingml/2006/main" xmlns:r="http://schemas.openxmlformats.org/officeDocument/2006/relationships" xmlns:p="http://schemas.openxmlformats.org/presentationml/2006/main" showMasterSp="0" showMasterPhAnim="0">
   <p:cSld>
     <p:spTree>
@@ -2133,161 +2224,6 @@
         <p14:creationId xmlns:p14="http://schemas.microsoft.com/office/powerpoint/2010/main" val="1419832971"/>
       </p:ext>
     </p:extLst>
-  </p:cSld>
-  <p:clrMapOvr>
-    <a:masterClrMapping/>
-  </p:clrMapOvr>
-</p:notes>
-</file>
-
-<file path=ppt/notesSlides/notesSlide14.xml><?xml version="1.0" encoding="utf-8"?>
-<p:notes xmlns:a="http://schemas.openxmlformats.org/drawingml/2006/main" xmlns:r="http://schemas.openxmlformats.org/officeDocument/2006/relationships" xmlns:p="http://schemas.openxmlformats.org/presentationml/2006/main" showMasterSp="0" showMasterPhAnim="0">
-  <p:cSld>
-    <p:spTree>
-      <p:nvGrpSpPr>
-        <p:cNvPr id="1" name="Shape 199"/>
-        <p:cNvGrpSpPr/>
-        <p:nvPr/>
-      </p:nvGrpSpPr>
-      <p:grpSpPr>
-        <a:xfrm>
-          <a:off x="0" y="0"/>
-          <a:ext cx="0" cy="0"/>
-          <a:chOff x="0" y="0"/>
-          <a:chExt cx="0" cy="0"/>
-        </a:xfrm>
-      </p:grpSpPr>
-      <p:sp>
-        <p:nvSpPr>
-          <p:cNvPr id="201" name="Google Shape;201;p5:notes"/>
-          <p:cNvSpPr>
-            <a:spLocks noGrp="1" noRot="1" noChangeAspect="1"/>
-          </p:cNvSpPr>
-          <p:nvPr>
-            <p:ph type="sldImg" idx="2"/>
-          </p:nvPr>
-        </p:nvSpPr>
-        <p:spPr>
-          <a:xfrm>
-            <a:off x="685800" y="1143000"/>
-            <a:ext cx="5486400" cy="3086100"/>
-          </a:xfrm>
-          <a:custGeom>
-            <a:avLst/>
-            <a:gdLst/>
-            <a:ahLst/>
-            <a:cxnLst/>
-            <a:rect l="l" t="t" r="r" b="b"/>
-            <a:pathLst>
-              <a:path w="120000" h="120000" extrusionOk="0">
-                <a:moveTo>
-                  <a:pt x="0" y="0"/>
-                </a:moveTo>
-                <a:lnTo>
-                  <a:pt x="120000" y="0"/>
-                </a:lnTo>
-                <a:lnTo>
-                  <a:pt x="120000" y="120000"/>
-                </a:lnTo>
-                <a:lnTo>
-                  <a:pt x="0" y="120000"/>
-                </a:lnTo>
-                <a:close/>
-              </a:path>
-            </a:pathLst>
-          </a:custGeom>
-        </p:spPr>
-      </p:sp>
-      <p:sp>
-        <p:nvSpPr>
-          <p:cNvPr id="3" name="Notes Placeholder 2">
-            <a:extLst>
-              <a:ext uri="{FF2B5EF4-FFF2-40B4-BE49-F238E27FC236}">
-                <a16:creationId xmlns:a16="http://schemas.microsoft.com/office/drawing/2014/main" id="{3C407B55-57F4-0FAD-EEF0-EBDDF6378007}"/>
-              </a:ext>
-            </a:extLst>
-          </p:cNvPr>
-          <p:cNvSpPr>
-            <a:spLocks noGrp="1"/>
-          </p:cNvSpPr>
-          <p:nvPr>
-            <p:ph type="body" idx="1"/>
-          </p:nvPr>
-        </p:nvSpPr>
-        <p:spPr/>
-        <p:txBody>
-          <a:bodyPr/>
-          <a:lstStyle/>
-          <a:p>
-            <a:pPr marL="457200" marR="0" lvl="0" indent="-228600" algn="l" defTabSz="914400" rtl="0" eaLnBrk="1" fontAlgn="auto" latinLnBrk="0" hangingPunct="1">
-              <a:lnSpc>
-                <a:spcPct val="100000"/>
-              </a:lnSpc>
-              <a:spcBef>
-                <a:spcPts val="0"/>
-              </a:spcBef>
-              <a:spcAft>
-                <a:spcPts val="0"/>
-              </a:spcAft>
-              <a:buClr>
-                <a:srgbClr val="000000"/>
-              </a:buClr>
-              <a:buSzPts val="1400"/>
-              <a:buFont typeface="Arial"/>
-              <a:buNone/>
-              <a:tabLst/>
-              <a:defRPr/>
-            </a:pPr>
-            <a:r>
-              <a:rPr lang="en-US" sz="1200" dirty="0">
-                <a:solidFill>
-                  <a:srgbClr val="4472C4"/>
-                </a:solidFill>
-                <a:latin typeface="Source Sans Pro Light" panose="020F0302020204030204" pitchFamily="34" charset="0"/>
-                <a:ea typeface="Consolas"/>
-                <a:cs typeface="Source Sans Pro Light" panose="020F0302020204030204" pitchFamily="34" charset="0"/>
-                <a:sym typeface="Consolas"/>
-              </a:rPr>
-              <a:t>git clone </a:t>
-            </a:r>
-            <a:r>
-              <a:rPr lang="en-US" sz="1200" dirty="0">
-                <a:solidFill>
-                  <a:srgbClr val="4472C4"/>
-                </a:solidFill>
-                <a:uFill>
-                  <a:noFill/>
-                </a:uFill>
-                <a:latin typeface="Source Sans Pro Light" panose="020F0302020204030204" pitchFamily="34" charset="0"/>
-                <a:ea typeface="Consolas"/>
-                <a:cs typeface="Source Sans Pro Light" panose="020F0302020204030204" pitchFamily="34" charset="0"/>
-                <a:sym typeface="Consolas"/>
-                <a:hlinkClick r:id="rId3">
-                  <a:extLst>
-                    <a:ext uri="{A12FA001-AC4F-418D-AE19-62706E023703}">
-                      <ahyp:hlinkClr xmlns:ahyp="http://schemas.microsoft.com/office/drawing/2018/hyperlinkcolor" val="tx"/>
-                    </a:ext>
-                  </a:extLst>
-                </a:hlinkClick>
-              </a:rPr>
-              <a:t>https://github.com/ResearchComputing/Supercomputing_Spinup.git</a:t>
-            </a:r>
-            <a:endParaRPr lang="en-US" sz="1200" dirty="0">
-              <a:solidFill>
-                <a:srgbClr val="4472C4"/>
-              </a:solidFill>
-              <a:latin typeface="Source Sans Pro Light" panose="020F0302020204030204" pitchFamily="34" charset="0"/>
-              <a:ea typeface="Consolas"/>
-              <a:cs typeface="Source Sans Pro Light" panose="020F0302020204030204" pitchFamily="34" charset="0"/>
-              <a:sym typeface="Consolas"/>
-            </a:endParaRPr>
-          </a:p>
-          <a:p>
-            <a:endParaRPr lang="en-US" dirty="0"/>
-          </a:p>
-        </p:txBody>
-      </p:sp>
-    </p:spTree>
   </p:cSld>
   <p:clrMapOvr>
     <a:masterClrMapping/>
@@ -3810,7 +3746,13 @@
   <p:cSld>
     <p:spTree>
       <p:nvGrpSpPr>
-        <p:cNvPr id="1" name=""/>
+        <p:cNvPr id="1" name="">
+          <a:extLst>
+            <a:ext uri="{FF2B5EF4-FFF2-40B4-BE49-F238E27FC236}">
+              <a16:creationId xmlns:a16="http://schemas.microsoft.com/office/drawing/2014/main" id="{7930C1EF-F7E3-3785-B15E-F93A56609D30}"/>
+            </a:ext>
+          </a:extLst>
+        </p:cNvPr>
         <p:cNvGrpSpPr/>
         <p:nvPr/>
       </p:nvGrpSpPr>
@@ -3824,7 +3766,13 @@
       </p:grpSpPr>
       <p:sp>
         <p:nvSpPr>
-          <p:cNvPr id="2" name="Slide Image Placeholder 1"/>
+          <p:cNvPr id="2" name="Slide Image Placeholder 1">
+            <a:extLst>
+              <a:ext uri="{FF2B5EF4-FFF2-40B4-BE49-F238E27FC236}">
+                <a16:creationId xmlns:a16="http://schemas.microsoft.com/office/drawing/2014/main" id="{1B198F6F-82D0-9BC1-59D0-CDF4DB22FE68}"/>
+              </a:ext>
+            </a:extLst>
+          </p:cNvPr>
           <p:cNvSpPr>
             <a:spLocks noGrp="1" noRot="1" noChangeAspect="1"/>
           </p:cNvSpPr>
@@ -3836,7 +3784,13 @@
       </p:sp>
       <p:sp>
         <p:nvSpPr>
-          <p:cNvPr id="3" name="Notes Placeholder 2"/>
+          <p:cNvPr id="3" name="Notes Placeholder 2">
+            <a:extLst>
+              <a:ext uri="{FF2B5EF4-FFF2-40B4-BE49-F238E27FC236}">
+                <a16:creationId xmlns:a16="http://schemas.microsoft.com/office/drawing/2014/main" id="{38B19E82-AB3A-4214-7E37-111CFC0270BE}"/>
+              </a:ext>
+            </a:extLst>
+          </p:cNvPr>
           <p:cNvSpPr>
             <a:spLocks noGrp="1"/>
           </p:cNvSpPr>
@@ -3855,7 +3809,13 @@
       </p:sp>
       <p:sp>
         <p:nvSpPr>
-          <p:cNvPr id="4" name="Slide Number Placeholder 3"/>
+          <p:cNvPr id="4" name="Slide Number Placeholder 3">
+            <a:extLst>
+              <a:ext uri="{FF2B5EF4-FFF2-40B4-BE49-F238E27FC236}">
+                <a16:creationId xmlns:a16="http://schemas.microsoft.com/office/drawing/2014/main" id="{BE83DE31-35F9-FF48-77E2-71F54D8FC691}"/>
+              </a:ext>
+            </a:extLst>
+          </p:cNvPr>
           <p:cNvSpPr>
             <a:spLocks noGrp="1"/>
           </p:cNvSpPr>
@@ -3904,7 +3864,7 @@
     </p:spTree>
     <p:extLst>
       <p:ext uri="{BB962C8B-B14F-4D97-AF65-F5344CB8AC3E}">
-        <p14:creationId xmlns:p14="http://schemas.microsoft.com/office/powerpoint/2010/main" val="1731656"/>
+        <p14:creationId xmlns:p14="http://schemas.microsoft.com/office/powerpoint/2010/main" val="1538971036"/>
       </p:ext>
     </p:extLst>
   </p:cSld>
@@ -4013,7 +3973,7 @@
     </p:spTree>
     <p:extLst>
       <p:ext uri="{BB962C8B-B14F-4D97-AF65-F5344CB8AC3E}">
-        <p14:creationId xmlns:p14="http://schemas.microsoft.com/office/powerpoint/2010/main" val="4256257512"/>
+        <p14:creationId xmlns:p14="http://schemas.microsoft.com/office/powerpoint/2010/main" val="1731656"/>
       </p:ext>
     </p:extLst>
   </p:cSld>
@@ -4381,11 +4341,11 @@
 </file>
 
 <file path=ppt/notesSlides/notesSlide31.xml><?xml version="1.0" encoding="utf-8"?>
-<p:notes xmlns:a="http://schemas.openxmlformats.org/drawingml/2006/main" xmlns:r="http://schemas.openxmlformats.org/officeDocument/2006/relationships" xmlns:p="http://schemas.openxmlformats.org/presentationml/2006/main">
+<p:notes xmlns:a="http://schemas.openxmlformats.org/drawingml/2006/main" xmlns:r="http://schemas.openxmlformats.org/officeDocument/2006/relationships" xmlns:p="http://schemas.openxmlformats.org/presentationml/2006/main" showMasterSp="0" showMasterPhAnim="0">
   <p:cSld>
     <p:spTree>
       <p:nvGrpSpPr>
-        <p:cNvPr id="1" name=""/>
+        <p:cNvPr id="1" name="Shape 893"/>
         <p:cNvGrpSpPr/>
         <p:nvPr/>
       </p:nvGrpSpPr>
@@ -4399,89 +4359,131 @@
       </p:grpSpPr>
       <p:sp>
         <p:nvSpPr>
-          <p:cNvPr id="2" name="Slide Image Placeholder 1"/>
+          <p:cNvPr id="894" name="Google Shape;894;g12316551eda_0_860:notes"/>
           <p:cNvSpPr>
             <a:spLocks noGrp="1" noRot="1" noChangeAspect="1"/>
           </p:cNvSpPr>
           <p:nvPr>
-            <p:ph type="sldImg"/>
+            <p:ph type="sldImg" idx="2"/>
           </p:nvPr>
         </p:nvSpPr>
-        <p:spPr/>
+        <p:spPr>
+          <a:xfrm>
+            <a:off x="685800" y="1143000"/>
+            <a:ext cx="5486400" cy="3086100"/>
+          </a:xfrm>
+          <a:custGeom>
+            <a:avLst/>
+            <a:gdLst/>
+            <a:ahLst/>
+            <a:cxnLst/>
+            <a:rect l="l" t="t" r="r" b="b"/>
+            <a:pathLst>
+              <a:path w="120000" h="120000" extrusionOk="0">
+                <a:moveTo>
+                  <a:pt x="0" y="0"/>
+                </a:moveTo>
+                <a:lnTo>
+                  <a:pt x="120000" y="0"/>
+                </a:lnTo>
+                <a:lnTo>
+                  <a:pt x="120000" y="120000"/>
+                </a:lnTo>
+                <a:lnTo>
+                  <a:pt x="0" y="120000"/>
+                </a:lnTo>
+                <a:close/>
+              </a:path>
+            </a:pathLst>
+          </a:custGeom>
+        </p:spPr>
       </p:sp>
       <p:sp>
         <p:nvSpPr>
-          <p:cNvPr id="3" name="Notes Placeholder 2"/>
-          <p:cNvSpPr>
+          <p:cNvPr id="895" name="Google Shape;895;g12316551eda_0_860:notes"/>
+          <p:cNvSpPr txBox="1">
             <a:spLocks noGrp="1"/>
           </p:cNvSpPr>
           <p:nvPr>
             <p:ph type="body" idx="1"/>
           </p:nvPr>
         </p:nvSpPr>
-        <p:spPr/>
+        <p:spPr>
+          <a:xfrm>
+            <a:off x="685800" y="4400550"/>
+            <a:ext cx="5486400" cy="3600600"/>
+          </a:xfrm>
+          <a:prstGeom prst="rect">
+            <a:avLst/>
+          </a:prstGeom>
+        </p:spPr>
         <p:txBody>
-          <a:bodyPr/>
+          <a:bodyPr spcFirstLastPara="1" wrap="square" lIns="91425" tIns="45700" rIns="91425" bIns="45700" anchor="t" anchorCtr="0">
+            <a:noAutofit/>
+          </a:bodyPr>
           <a:lstStyle/>
           <a:p>
-            <a:endParaRPr lang="en-US"/>
+            <a:pPr marL="0" lvl="0" indent="0" algn="l" rtl="0">
+              <a:spcBef>
+                <a:spcPts val="0"/>
+              </a:spcBef>
+              <a:spcAft>
+                <a:spcPts val="0"/>
+              </a:spcAft>
+              <a:buNone/>
+            </a:pPr>
+            <a:endParaRPr dirty="0"/>
           </a:p>
         </p:txBody>
       </p:sp>
       <p:sp>
         <p:nvSpPr>
-          <p:cNvPr id="4" name="Slide Number Placeholder 3"/>
-          <p:cNvSpPr>
+          <p:cNvPr id="896" name="Google Shape;896;g12316551eda_0_860:notes"/>
+          <p:cNvSpPr txBox="1">
             <a:spLocks noGrp="1"/>
           </p:cNvSpPr>
           <p:nvPr>
             <p:ph type="sldNum" idx="12"/>
           </p:nvPr>
         </p:nvSpPr>
-        <p:spPr/>
+        <p:spPr>
+          <a:xfrm>
+            <a:off x="3884613" y="8685213"/>
+            <a:ext cx="2971800" cy="458700"/>
+          </a:xfrm>
+          <a:prstGeom prst="rect">
+            <a:avLst/>
+          </a:prstGeom>
+        </p:spPr>
         <p:txBody>
-          <a:bodyPr/>
+          <a:bodyPr spcFirstLastPara="1" wrap="square" lIns="91425" tIns="45700" rIns="91425" bIns="45700" anchor="b" anchorCtr="0">
+            <a:noAutofit/>
+          </a:bodyPr>
           <a:lstStyle/>
           <a:p>
-            <a:pPr marL="0" marR="0" lvl="0" indent="0" algn="r" rtl="0">
-              <a:spcBef>
-                <a:spcPts val="0"/>
-              </a:spcBef>
-              <a:spcAft>
-                <a:spcPts val="0"/>
-              </a:spcAft>
+            <a:pPr marL="0" lvl="0" indent="0" algn="r" rtl="0">
+              <a:spcBef>
+                <a:spcPts val="0"/>
+              </a:spcBef>
+              <a:spcAft>
+                <a:spcPts val="0"/>
+              </a:spcAft>
+              <a:buClr>
+                <a:srgbClr val="000000"/>
+              </a:buClr>
+              <a:buSzPts val="1200"/>
+              <a:buFont typeface="Arial"/>
               <a:buNone/>
             </a:pPr>
             <a:fld id="{00000000-1234-1234-1234-123412341234}" type="slidenum">
-              <a:rPr lang="en-US" sz="1200" b="0" i="0" u="none" strike="noStrike" cap="none" smtClean="0">
-                <a:solidFill>
-                  <a:schemeClr val="dk1"/>
-                </a:solidFill>
-                <a:latin typeface="Calibri"/>
-                <a:ea typeface="Calibri"/>
-                <a:cs typeface="Calibri"/>
-                <a:sym typeface="Calibri"/>
-              </a:rPr>
+              <a:rPr lang="en-US"/>
               <a:t>31</a:t>
             </a:fld>
-            <a:endParaRPr lang="en-US" sz="1200" b="0" i="0" u="none" strike="noStrike" cap="none">
-              <a:solidFill>
-                <a:schemeClr val="dk1"/>
-              </a:solidFill>
-              <a:latin typeface="Calibri"/>
-              <a:ea typeface="Calibri"/>
-              <a:cs typeface="Calibri"/>
-              <a:sym typeface="Calibri"/>
-            </a:endParaRPr>
+            <a:endParaRPr/>
           </a:p>
         </p:txBody>
       </p:sp>
     </p:spTree>
-    <p:extLst>
-      <p:ext uri="{BB962C8B-B14F-4D97-AF65-F5344CB8AC3E}">
-        <p14:creationId xmlns:p14="http://schemas.microsoft.com/office/powerpoint/2010/main" val="2032981916"/>
-      </p:ext>
-    </p:extLst>
   </p:cSld>
   <p:clrMapOvr>
     <a:masterClrMapping/>
@@ -4986,7 +4988,7 @@
   <p:cSld>
     <p:spTree>
       <p:nvGrpSpPr>
-        <p:cNvPr id="1" name="Shape 247"/>
+        <p:cNvPr id="1" name="Shape 102"/>
         <p:cNvGrpSpPr/>
         <p:nvPr/>
       </p:nvGrpSpPr>
@@ -5000,111 +5002,7 @@
       </p:grpSpPr>
       <p:sp>
         <p:nvSpPr>
-          <p:cNvPr id="248" name="Google Shape;248;p21:notes"/>
-          <p:cNvSpPr txBox="1">
-            <a:spLocks noGrp="1"/>
-          </p:cNvSpPr>
-          <p:nvPr>
-            <p:ph type="body" idx="1"/>
-          </p:nvPr>
-        </p:nvSpPr>
-        <p:spPr>
-          <a:xfrm>
-            <a:off x="685800" y="4400550"/>
-            <a:ext cx="5486400" cy="3600600"/>
-          </a:xfrm>
-          <a:prstGeom prst="rect">
-            <a:avLst/>
-          </a:prstGeom>
-        </p:spPr>
-        <p:txBody>
-          <a:bodyPr spcFirstLastPara="1" wrap="square" lIns="91425" tIns="45700" rIns="91425" bIns="45700" anchor="t" anchorCtr="0">
-            <a:noAutofit/>
-          </a:bodyPr>
-          <a:lstStyle/>
-          <a:p>
-            <a:pPr marL="0" lvl="0" indent="0" algn="l" rtl="0">
-              <a:spcBef>
-                <a:spcPts val="0"/>
-              </a:spcBef>
-              <a:spcAft>
-                <a:spcPts val="0"/>
-              </a:spcAft>
-              <a:buNone/>
-            </a:pPr>
-            <a:endParaRPr/>
-          </a:p>
-        </p:txBody>
-      </p:sp>
-      <p:sp>
-        <p:nvSpPr>
-          <p:cNvPr id="249" name="Google Shape;249;p21:notes"/>
-          <p:cNvSpPr>
-            <a:spLocks noGrp="1" noRot="1" noChangeAspect="1"/>
-          </p:cNvSpPr>
-          <p:nvPr>
-            <p:ph type="sldImg" idx="2"/>
-          </p:nvPr>
-        </p:nvSpPr>
-        <p:spPr>
-          <a:xfrm>
-            <a:off x="685800" y="1143000"/>
-            <a:ext cx="5486400" cy="3086100"/>
-          </a:xfrm>
-          <a:custGeom>
-            <a:avLst/>
-            <a:gdLst/>
-            <a:ahLst/>
-            <a:cxnLst/>
-            <a:rect l="l" t="t" r="r" b="b"/>
-            <a:pathLst>
-              <a:path w="120000" h="120000" extrusionOk="0">
-                <a:moveTo>
-                  <a:pt x="0" y="0"/>
-                </a:moveTo>
-                <a:lnTo>
-                  <a:pt x="120000" y="0"/>
-                </a:lnTo>
-                <a:lnTo>
-                  <a:pt x="120000" y="120000"/>
-                </a:lnTo>
-                <a:lnTo>
-                  <a:pt x="0" y="120000"/>
-                </a:lnTo>
-                <a:close/>
-              </a:path>
-            </a:pathLst>
-          </a:custGeom>
-        </p:spPr>
-      </p:sp>
-    </p:spTree>
-  </p:cSld>
-  <p:clrMapOvr>
-    <a:masterClrMapping/>
-  </p:clrMapOvr>
-</p:notes>
-</file>
-
-<file path=ppt/notesSlides/notesSlide9.xml><?xml version="1.0" encoding="utf-8"?>
-<p:notes xmlns:a="http://schemas.openxmlformats.org/drawingml/2006/main" xmlns:r="http://schemas.openxmlformats.org/officeDocument/2006/relationships" xmlns:p="http://schemas.openxmlformats.org/presentationml/2006/main" showMasterSp="0" showMasterPhAnim="0">
-  <p:cSld>
-    <p:spTree>
-      <p:nvGrpSpPr>
-        <p:cNvPr id="1" name="Shape 268"/>
-        <p:cNvGrpSpPr/>
-        <p:nvPr/>
-      </p:nvGrpSpPr>
-      <p:grpSpPr>
-        <a:xfrm>
-          <a:off x="0" y="0"/>
-          <a:ext cx="0" cy="0"/>
-          <a:chOff x="0" y="0"/>
-          <a:chExt cx="0" cy="0"/>
-        </a:xfrm>
-      </p:grpSpPr>
-      <p:sp>
-        <p:nvSpPr>
-          <p:cNvPr id="270" name="Google Shape;270;p22:notes"/>
+          <p:cNvPr id="104" name="Google Shape;104;p3:notes"/>
           <p:cNvSpPr>
             <a:spLocks noGrp="1" noRot="1" noChangeAspect="1"/>
           </p:cNvSpPr>
@@ -5148,7 +5046,7 @@
           <p:cNvPr id="3" name="Notes Placeholder 2">
             <a:extLst>
               <a:ext uri="{FF2B5EF4-FFF2-40B4-BE49-F238E27FC236}">
-                <a16:creationId xmlns:a16="http://schemas.microsoft.com/office/drawing/2014/main" id="{43D9BD21-8DDE-D8A5-7D0C-099E9F2DA53D}"/>
+                <a16:creationId xmlns:a16="http://schemas.microsoft.com/office/drawing/2014/main" id="{5056596D-D084-9CA3-6B1E-EBF953007CAF}"/>
               </a:ext>
             </a:extLst>
           </p:cNvPr>
@@ -5164,9 +5062,118 @@
           <a:bodyPr/>
           <a:lstStyle/>
           <a:p>
-            <a:endParaRPr lang="en-US" dirty="0"/>
+            <a:endParaRPr lang="en-US"/>
           </a:p>
         </p:txBody>
+      </p:sp>
+    </p:spTree>
+    <p:extLst>
+      <p:ext uri="{BB962C8B-B14F-4D97-AF65-F5344CB8AC3E}">
+        <p14:creationId xmlns:p14="http://schemas.microsoft.com/office/powerpoint/2010/main" val="2733573246"/>
+      </p:ext>
+    </p:extLst>
+  </p:cSld>
+  <p:clrMapOvr>
+    <a:masterClrMapping/>
+  </p:clrMapOvr>
+</p:notes>
+</file>
+
+<file path=ppt/notesSlides/notesSlide9.xml><?xml version="1.0" encoding="utf-8"?>
+<p:notes xmlns:a="http://schemas.openxmlformats.org/drawingml/2006/main" xmlns:r="http://schemas.openxmlformats.org/officeDocument/2006/relationships" xmlns:p="http://schemas.openxmlformats.org/presentationml/2006/main" showMasterSp="0" showMasterPhAnim="0">
+  <p:cSld>
+    <p:spTree>
+      <p:nvGrpSpPr>
+        <p:cNvPr id="1" name="Shape 247"/>
+        <p:cNvGrpSpPr/>
+        <p:nvPr/>
+      </p:nvGrpSpPr>
+      <p:grpSpPr>
+        <a:xfrm>
+          <a:off x="0" y="0"/>
+          <a:ext cx="0" cy="0"/>
+          <a:chOff x="0" y="0"/>
+          <a:chExt cx="0" cy="0"/>
+        </a:xfrm>
+      </p:grpSpPr>
+      <p:sp>
+        <p:nvSpPr>
+          <p:cNvPr id="248" name="Google Shape;248;p21:notes"/>
+          <p:cNvSpPr txBox="1">
+            <a:spLocks noGrp="1"/>
+          </p:cNvSpPr>
+          <p:nvPr>
+            <p:ph type="body" idx="1"/>
+          </p:nvPr>
+        </p:nvSpPr>
+        <p:spPr>
+          <a:xfrm>
+            <a:off x="685800" y="4400550"/>
+            <a:ext cx="5486400" cy="3600600"/>
+          </a:xfrm>
+          <a:prstGeom prst="rect">
+            <a:avLst/>
+          </a:prstGeom>
+        </p:spPr>
+        <p:txBody>
+          <a:bodyPr spcFirstLastPara="1" wrap="square" lIns="91425" tIns="45700" rIns="91425" bIns="45700" anchor="t" anchorCtr="0">
+            <a:noAutofit/>
+          </a:bodyPr>
+          <a:lstStyle/>
+          <a:p>
+            <a:pPr marL="0" lvl="0" indent="0" algn="l" rtl="0">
+              <a:spcBef>
+                <a:spcPts val="0"/>
+              </a:spcBef>
+              <a:spcAft>
+                <a:spcPts val="0"/>
+              </a:spcAft>
+              <a:buNone/>
+            </a:pPr>
+            <a:endParaRPr/>
+          </a:p>
+        </p:txBody>
+      </p:sp>
+      <p:sp>
+        <p:nvSpPr>
+          <p:cNvPr id="249" name="Google Shape;249;p21:notes"/>
+          <p:cNvSpPr>
+            <a:spLocks noGrp="1" noRot="1" noChangeAspect="1"/>
+          </p:cNvSpPr>
+          <p:nvPr>
+            <p:ph type="sldImg" idx="2"/>
+          </p:nvPr>
+        </p:nvSpPr>
+        <p:spPr>
+          <a:xfrm>
+            <a:off x="685800" y="1143000"/>
+            <a:ext cx="5486400" cy="3086100"/>
+          </a:xfrm>
+          <a:custGeom>
+            <a:avLst/>
+            <a:gdLst/>
+            <a:ahLst/>
+            <a:cxnLst/>
+            <a:rect l="l" t="t" r="r" b="b"/>
+            <a:pathLst>
+              <a:path w="120000" h="120000" extrusionOk="0">
+                <a:moveTo>
+                  <a:pt x="0" y="0"/>
+                </a:moveTo>
+                <a:lnTo>
+                  <a:pt x="120000" y="0"/>
+                </a:lnTo>
+                <a:lnTo>
+                  <a:pt x="120000" y="120000"/>
+                </a:lnTo>
+                <a:lnTo>
+                  <a:pt x="0" y="120000"/>
+                </a:lnTo>
+                <a:close/>
+              </a:path>
+            </a:pathLst>
+          </a:custGeom>
+        </p:spPr>
       </p:sp>
     </p:spTree>
   </p:cSld>
@@ -5651,7 +5658,7 @@
           <a:p>
             <a:r>
               <a:rPr lang="en-US"/>
-              <a:t>1/8/2025</a:t>
+              <a:t>8/18/25</a:t>
             </a:r>
             <a:endParaRPr/>
           </a:p>
@@ -5788,7 +5795,7 @@
           <a:p>
             <a:r>
               <a:rPr lang="en-US"/>
-              <a:t>SC Spinup 1 - Linux</a:t>
+              <a:t>Logging in and Linux</a:t>
             </a:r>
             <a:endParaRPr/>
           </a:p>
@@ -6386,7 +6393,7 @@
           <a:p>
             <a:r>
               <a:rPr lang="en-US"/>
-              <a:t>1/8/2025</a:t>
+              <a:t>8/18/25</a:t>
             </a:r>
             <a:endParaRPr/>
           </a:p>
@@ -6523,7 +6530,7 @@
           <a:p>
             <a:r>
               <a:rPr lang="en-US"/>
-              <a:t>SC Spinup 1 - Linux</a:t>
+              <a:t>Logging in and Linux</a:t>
             </a:r>
             <a:endParaRPr/>
           </a:p>
@@ -7158,7 +7165,7 @@
           <a:p>
             <a:r>
               <a:rPr lang="en-US"/>
-              <a:t>1/8/2025</a:t>
+              <a:t>8/18/25</a:t>
             </a:r>
             <a:endParaRPr/>
           </a:p>
@@ -7295,7 +7302,7 @@
           <a:p>
             <a:r>
               <a:rPr lang="en-US"/>
-              <a:t>SC Spinup 1 - Linux</a:t>
+              <a:t>Logging in and Linux</a:t>
             </a:r>
             <a:endParaRPr/>
           </a:p>
@@ -8454,7 +8461,7 @@
           <a:p>
             <a:r>
               <a:rPr lang="en-US"/>
-              <a:t>1/8/2025</a:t>
+              <a:t>8/18/25</a:t>
             </a:r>
             <a:endParaRPr/>
           </a:p>
@@ -8591,7 +8598,7 @@
           <a:p>
             <a:r>
               <a:rPr lang="en-US"/>
-              <a:t>SC Spinup 1 - Linux</a:t>
+              <a:t>Logging in and Linux</a:t>
             </a:r>
             <a:endParaRPr/>
           </a:p>
@@ -9002,7 +9009,7 @@
           <a:p>
             <a:r>
               <a:rPr lang="en-US"/>
-              <a:t>1/8/2025</a:t>
+              <a:t>8/18/25</a:t>
             </a:r>
             <a:endParaRPr/>
           </a:p>
@@ -9139,7 +9146,7 @@
           <a:p>
             <a:r>
               <a:rPr lang="en-US"/>
-              <a:t>SC Spinup 1 - Linux</a:t>
+              <a:t>Logging in and Linux</a:t>
             </a:r>
             <a:endParaRPr/>
           </a:p>
@@ -9925,7 +9932,7 @@
           <a:p>
             <a:r>
               <a:rPr lang="en-US"/>
-              <a:t>1/8/2025</a:t>
+              <a:t>8/18/25</a:t>
             </a:r>
             <a:endParaRPr/>
           </a:p>
@@ -10062,7 +10069,7 @@
           <a:p>
             <a:r>
               <a:rPr lang="en-US"/>
-              <a:t>SC Spinup 1 - Linux</a:t>
+              <a:t>Logging in and Linux</a:t>
             </a:r>
             <a:endParaRPr/>
           </a:p>
@@ -10929,7 +10936,7 @@
           <a:p>
             <a:r>
               <a:rPr lang="en-US"/>
-              <a:t>1/8/2025</a:t>
+              <a:t>8/18/25</a:t>
             </a:r>
             <a:endParaRPr/>
           </a:p>
@@ -11066,7 +11073,7 @@
           <a:p>
             <a:r>
               <a:rPr lang="en-US"/>
-              <a:t>SC Spinup 1 - Linux</a:t>
+              <a:t>Logging in and Linux</a:t>
             </a:r>
             <a:endParaRPr/>
           </a:p>
@@ -11664,7 +11671,7 @@
           <a:p>
             <a:r>
               <a:rPr lang="en-US"/>
-              <a:t>1/8/2025</a:t>
+              <a:t>8/18/25</a:t>
             </a:r>
             <a:endParaRPr/>
           </a:p>
@@ -11801,7 +11808,7 @@
           <a:p>
             <a:r>
               <a:rPr lang="en-US"/>
-              <a:t>SC Spinup 1 - Linux</a:t>
+              <a:t>Logging in and Linux</a:t>
             </a:r>
             <a:endParaRPr/>
           </a:p>
@@ -12399,7 +12406,7 @@
           <a:p>
             <a:r>
               <a:rPr lang="en-US"/>
-              <a:t>1/8/2025</a:t>
+              <a:t>8/18/25</a:t>
             </a:r>
             <a:endParaRPr/>
           </a:p>
@@ -12536,7 +12543,7 @@
           <a:p>
             <a:r>
               <a:rPr lang="en-US"/>
-              <a:t>SC Spinup 1 - Linux</a:t>
+              <a:t>Logging in and Linux</a:t>
             </a:r>
             <a:endParaRPr/>
           </a:p>
@@ -13304,7 +13311,7 @@
           <a:p>
             <a:r>
               <a:rPr lang="en-US"/>
-              <a:t>1/8/2025</a:t>
+              <a:t>8/18/25</a:t>
             </a:r>
             <a:endParaRPr/>
           </a:p>
@@ -13513,7 +13520,7 @@
           <a:p>
             <a:r>
               <a:rPr lang="en-US"/>
-              <a:t>SC Spinup 1 - Linux</a:t>
+              <a:t>Logging in and Linux</a:t>
             </a:r>
             <a:endParaRPr/>
           </a:p>
@@ -13795,7 +13802,7 @@
     <p:sldLayoutId id="2147483657" r:id="rId8"/>
     <p:sldLayoutId id="2147483658" r:id="rId9"/>
   </p:sldLayoutIdLst>
-  <p:hf hdr="0" ftr="0"/>
+  <p:hf hdr="0"/>
   <p:txStyles>
     <p:titleStyle>
       <a:defPPr marR="0" lvl="0" algn="l" rtl="0">
@@ -14605,7 +14612,7 @@
               <a:rPr lang="en-US" sz="2800" dirty="0">
                 <a:latin typeface="Century Gothic" panose="020B0502020202020204" pitchFamily="34" charset="0"/>
               </a:rPr>
-              <a:t>January 8, 2025</a:t>
+              <a:t>August 18, 2025</a:t>
             </a:r>
           </a:p>
         </p:txBody>
@@ -14680,8 +14687,9 @@
           <a:p>
             <a:r>
               <a:rPr lang="en-US"/>
-              <a:t>1/8/2025</a:t>
-            </a:r>
+              <a:t>8/18/25</a:t>
+            </a:r>
+            <a:endParaRPr lang="en-US" dirty="0"/>
           </a:p>
         </p:txBody>
       </p:sp>
@@ -14723,6 +14731,34 @@
           </a:p>
         </p:txBody>
       </p:sp>
+      <p:sp>
+        <p:nvSpPr>
+          <p:cNvPr id="7" name="Footer Placeholder 6">
+            <a:extLst>
+              <a:ext uri="{FF2B5EF4-FFF2-40B4-BE49-F238E27FC236}">
+                <a16:creationId xmlns:a16="http://schemas.microsoft.com/office/drawing/2014/main" id="{8D1AD6C6-4A63-4C0D-C258-B011C18F6DAB}"/>
+              </a:ext>
+            </a:extLst>
+          </p:cNvPr>
+          <p:cNvSpPr>
+            <a:spLocks noGrp="1"/>
+          </p:cNvSpPr>
+          <p:nvPr>
+            <p:ph type="ftr" idx="11"/>
+          </p:nvPr>
+        </p:nvSpPr>
+        <p:spPr/>
+        <p:txBody>
+          <a:bodyPr/>
+          <a:lstStyle/>
+          <a:p>
+            <a:r>
+              <a:rPr lang="en-US"/>
+              <a:t>Logging in and Linux</a:t>
+            </a:r>
+          </a:p>
+        </p:txBody>
+      </p:sp>
     </p:spTree>
     <p:extLst>
       <p:ext uri="{BB962C8B-B14F-4D97-AF65-F5344CB8AC3E}">
@@ -14737,6 +14773,270 @@
 </file>
 
 <file path=ppt/slides/slide10.xml><?xml version="1.0" encoding="utf-8"?>
+<p:sld xmlns:a="http://schemas.openxmlformats.org/drawingml/2006/main" xmlns:r="http://schemas.openxmlformats.org/officeDocument/2006/relationships" xmlns:p="http://schemas.openxmlformats.org/presentationml/2006/main">
+  <p:cSld>
+    <p:spTree>
+      <p:nvGrpSpPr>
+        <p:cNvPr id="1" name="Shape 271"/>
+        <p:cNvGrpSpPr/>
+        <p:nvPr/>
+      </p:nvGrpSpPr>
+      <p:grpSpPr>
+        <a:xfrm>
+          <a:off x="0" y="0"/>
+          <a:ext cx="0" cy="0"/>
+          <a:chOff x="0" y="0"/>
+          <a:chExt cx="0" cy="0"/>
+        </a:xfrm>
+      </p:grpSpPr>
+      <p:sp>
+        <p:nvSpPr>
+          <p:cNvPr id="4" name="Slide Number Placeholder 3">
+            <a:extLst>
+              <a:ext uri="{FF2B5EF4-FFF2-40B4-BE49-F238E27FC236}">
+                <a16:creationId xmlns:a16="http://schemas.microsoft.com/office/drawing/2014/main" id="{237F62D6-87FD-B478-A104-3856ABC7EAD0}"/>
+              </a:ext>
+            </a:extLst>
+          </p:cNvPr>
+          <p:cNvSpPr>
+            <a:spLocks noGrp="1"/>
+          </p:cNvSpPr>
+          <p:nvPr>
+            <p:ph type="sldNum" idx="12"/>
+          </p:nvPr>
+        </p:nvSpPr>
+        <p:spPr/>
+        <p:txBody>
+          <a:bodyPr/>
+          <a:lstStyle/>
+          <a:p>
+            <a:pPr marL="0" lvl="0" indent="0" algn="l" rtl="0">
+              <a:spcBef>
+                <a:spcPts val="0"/>
+              </a:spcBef>
+              <a:spcAft>
+                <a:spcPts val="0"/>
+              </a:spcAft>
+              <a:buNone/>
+            </a:pPr>
+            <a:fld id="{00000000-1234-1234-1234-123412341234}" type="slidenum">
+              <a:rPr lang="en-US" smtClean="0"/>
+              <a:t>10</a:t>
+            </a:fld>
+            <a:endParaRPr lang="en-US"/>
+          </a:p>
+        </p:txBody>
+      </p:sp>
+      <p:sp>
+        <p:nvSpPr>
+          <p:cNvPr id="2" name="Date Placeholder 1">
+            <a:extLst>
+              <a:ext uri="{FF2B5EF4-FFF2-40B4-BE49-F238E27FC236}">
+                <a16:creationId xmlns:a16="http://schemas.microsoft.com/office/drawing/2014/main" id="{A1D5468F-ED2A-D72A-0BF9-6CC9E5099FEC}"/>
+              </a:ext>
+            </a:extLst>
+          </p:cNvPr>
+          <p:cNvSpPr>
+            <a:spLocks noGrp="1"/>
+          </p:cNvSpPr>
+          <p:nvPr>
+            <p:ph type="dt" idx="10"/>
+          </p:nvPr>
+        </p:nvSpPr>
+        <p:spPr/>
+        <p:txBody>
+          <a:bodyPr/>
+          <a:lstStyle/>
+          <a:p>
+            <a:r>
+              <a:rPr lang="en-US"/>
+              <a:t>8/18/25</a:t>
+            </a:r>
+          </a:p>
+        </p:txBody>
+      </p:sp>
+      <p:pic>
+        <p:nvPicPr>
+          <p:cNvPr id="15" name="Picture 14" descr="Image showing linux filesystem tree">
+            <a:extLst>
+              <a:ext uri="{FF2B5EF4-FFF2-40B4-BE49-F238E27FC236}">
+                <a16:creationId xmlns:a16="http://schemas.microsoft.com/office/drawing/2014/main" id="{61319C00-0B4D-BECC-F26B-DE4DFF544919}"/>
+              </a:ext>
+            </a:extLst>
+          </p:cNvPr>
+          <p:cNvPicPr>
+            <a:picLocks noChangeAspect="1"/>
+          </p:cNvPicPr>
+          <p:nvPr/>
+        </p:nvPicPr>
+        <p:blipFill>
+          <a:blip r:embed="rId3"/>
+          <a:stretch>
+            <a:fillRect/>
+          </a:stretch>
+        </p:blipFill>
+        <p:spPr>
+          <a:xfrm>
+            <a:off x="391420" y="572369"/>
+            <a:ext cx="11409159" cy="5713262"/>
+          </a:xfrm>
+          <a:prstGeom prst="rect">
+            <a:avLst/>
+          </a:prstGeom>
+        </p:spPr>
+      </p:pic>
+      <p:sp>
+        <p:nvSpPr>
+          <p:cNvPr id="17" name="Rectangle 16">
+            <a:extLst>
+              <a:ext uri="{FF2B5EF4-FFF2-40B4-BE49-F238E27FC236}">
+                <a16:creationId xmlns:a16="http://schemas.microsoft.com/office/drawing/2014/main" id="{B40DABD5-B03F-A9A1-32D5-FBE67B83B05F}"/>
+              </a:ext>
+              <a:ext uri="{C183D7F6-B498-43B3-948B-1728B52AA6E4}">
+                <adec:decorative xmlns:adec="http://schemas.microsoft.com/office/drawing/2017/decorative" val="1"/>
+              </a:ext>
+            </a:extLst>
+          </p:cNvPr>
+          <p:cNvSpPr/>
+          <p:nvPr/>
+        </p:nvSpPr>
+        <p:spPr>
+          <a:xfrm>
+            <a:off x="738554" y="572369"/>
+            <a:ext cx="3569677" cy="1150923"/>
+          </a:xfrm>
+          <a:prstGeom prst="rect">
+            <a:avLst/>
+          </a:prstGeom>
+          <a:solidFill>
+            <a:schemeClr val="bg1"/>
+          </a:solidFill>
+          <a:ln>
+            <a:noFill/>
+          </a:ln>
+        </p:spPr>
+        <p:style>
+          <a:lnRef idx="2">
+            <a:schemeClr val="accent1">
+              <a:shade val="15000"/>
+            </a:schemeClr>
+          </a:lnRef>
+          <a:fillRef idx="1">
+            <a:schemeClr val="accent1"/>
+          </a:fillRef>
+          <a:effectRef idx="0">
+            <a:schemeClr val="accent1"/>
+          </a:effectRef>
+          <a:fontRef idx="minor">
+            <a:schemeClr val="lt1"/>
+          </a:fontRef>
+        </p:style>
+        <p:txBody>
+          <a:bodyPr rtlCol="0" anchor="ctr"/>
+          <a:lstStyle/>
+          <a:p>
+            <a:pPr algn="ctr"/>
+            <a:endParaRPr lang="en-US" dirty="0"/>
+          </a:p>
+        </p:txBody>
+      </p:sp>
+      <p:sp>
+        <p:nvSpPr>
+          <p:cNvPr id="18" name="Google Shape;251;p28">
+            <a:extLst>
+              <a:ext uri="{FF2B5EF4-FFF2-40B4-BE49-F238E27FC236}">
+                <a16:creationId xmlns:a16="http://schemas.microsoft.com/office/drawing/2014/main" id="{F9FE5CCF-F450-4D83-E3F1-29AA192226AA}"/>
+              </a:ext>
+            </a:extLst>
+          </p:cNvPr>
+          <p:cNvSpPr txBox="1">
+            <a:spLocks noGrp="1"/>
+          </p:cNvSpPr>
+          <p:nvPr>
+            <p:ph type="title"/>
+          </p:nvPr>
+        </p:nvSpPr>
+        <p:spPr>
+          <a:xfrm>
+            <a:off x="878686" y="398202"/>
+            <a:ext cx="6808800" cy="690000"/>
+          </a:xfrm>
+          <a:prstGeom prst="rect">
+            <a:avLst/>
+          </a:prstGeom>
+          <a:noFill/>
+          <a:ln>
+            <a:noFill/>
+          </a:ln>
+        </p:spPr>
+        <p:txBody>
+          <a:bodyPr spcFirstLastPara="1" wrap="square" lIns="0" tIns="12700" rIns="0" bIns="0" anchor="ctr" anchorCtr="0">
+            <a:spAutoFit/>
+          </a:bodyPr>
+          <a:lstStyle/>
+          <a:p>
+            <a:pPr marL="12700" lvl="0" indent="0" algn="l" rtl="0">
+              <a:lnSpc>
+                <a:spcPct val="100000"/>
+              </a:lnSpc>
+              <a:spcBef>
+                <a:spcPts val="0"/>
+              </a:spcBef>
+              <a:spcAft>
+                <a:spcPts val="0"/>
+              </a:spcAft>
+              <a:buClr>
+                <a:schemeClr val="dk1"/>
+              </a:buClr>
+              <a:buSzPts val="4400"/>
+              <a:buFont typeface="Arial Black"/>
+              <a:buNone/>
+            </a:pPr>
+            <a:r>
+              <a:rPr lang="en-US" dirty="0"/>
+              <a:t>Filesystem</a:t>
+            </a:r>
+            <a:endParaRPr dirty="0"/>
+          </a:p>
+        </p:txBody>
+      </p:sp>
+      <p:sp>
+        <p:nvSpPr>
+          <p:cNvPr id="3" name="Footer Placeholder 2">
+            <a:extLst>
+              <a:ext uri="{FF2B5EF4-FFF2-40B4-BE49-F238E27FC236}">
+                <a16:creationId xmlns:a16="http://schemas.microsoft.com/office/drawing/2014/main" id="{87093BD3-BA4D-415D-2895-63890FA830BF}"/>
+              </a:ext>
+            </a:extLst>
+          </p:cNvPr>
+          <p:cNvSpPr>
+            <a:spLocks noGrp="1"/>
+          </p:cNvSpPr>
+          <p:nvPr>
+            <p:ph type="ftr" idx="11"/>
+          </p:nvPr>
+        </p:nvSpPr>
+        <p:spPr/>
+        <p:txBody>
+          <a:bodyPr/>
+          <a:lstStyle/>
+          <a:p>
+            <a:r>
+              <a:rPr lang="en-US"/>
+              <a:t>Logging in and Linux</a:t>
+            </a:r>
+          </a:p>
+        </p:txBody>
+      </p:sp>
+    </p:spTree>
+  </p:cSld>
+  <p:clrMapOvr>
+    <a:masterClrMapping/>
+  </p:clrMapOvr>
+</p:sld>
+</file>
+
+<file path=ppt/slides/slide11.xml><?xml version="1.0" encoding="utf-8"?>
 <p:sld xmlns:a="http://schemas.openxmlformats.org/drawingml/2006/main" xmlns:r="http://schemas.openxmlformats.org/officeDocument/2006/relationships" xmlns:p="http://schemas.openxmlformats.org/presentationml/2006/main">
   <p:cSld>
     <p:spTree>
@@ -14839,7 +15139,7 @@
             </a:pPr>
             <a:fld id="{00000000-1234-1234-1234-123412341234}" type="slidenum">
               <a:rPr lang="en-US" smtClean="0"/>
-              <a:t>10</a:t>
+              <a:t>11</a:t>
             </a:fld>
             <a:endParaRPr lang="en-US"/>
           </a:p>
@@ -14868,7 +15168,7 @@
           <a:p>
             <a:r>
               <a:rPr lang="en-US"/>
-              <a:t>1/8/2025</a:t>
+              <a:t>8/18/25</a:t>
             </a:r>
           </a:p>
         </p:txBody>
@@ -15067,6 +15367,34 @@
           </a:p>
         </p:txBody>
       </p:sp>
+      <p:sp>
+        <p:nvSpPr>
+          <p:cNvPr id="4" name="Footer Placeholder 3">
+            <a:extLst>
+              <a:ext uri="{FF2B5EF4-FFF2-40B4-BE49-F238E27FC236}">
+                <a16:creationId xmlns:a16="http://schemas.microsoft.com/office/drawing/2014/main" id="{BA55E1D7-072C-3DA3-37CC-C2A0EB4A34ED}"/>
+              </a:ext>
+            </a:extLst>
+          </p:cNvPr>
+          <p:cNvSpPr>
+            <a:spLocks noGrp="1"/>
+          </p:cNvSpPr>
+          <p:nvPr>
+            <p:ph type="ftr" idx="11"/>
+          </p:nvPr>
+        </p:nvSpPr>
+        <p:spPr/>
+        <p:txBody>
+          <a:bodyPr/>
+          <a:lstStyle/>
+          <a:p>
+            <a:r>
+              <a:rPr lang="en-US"/>
+              <a:t>Logging in and Linux</a:t>
+            </a:r>
+          </a:p>
+        </p:txBody>
+      </p:sp>
     </p:spTree>
     <p:extLst>
       <p:ext uri="{BB962C8B-B14F-4D97-AF65-F5344CB8AC3E}">
@@ -15080,7 +15408,7 @@
 </p:sld>
 </file>
 
-<file path=ppt/slides/slide11.xml><?xml version="1.0" encoding="utf-8"?>
+<file path=ppt/slides/slide12.xml><?xml version="1.0" encoding="utf-8"?>
 <p:sld xmlns:a="http://schemas.openxmlformats.org/drawingml/2006/main" xmlns:r="http://schemas.openxmlformats.org/officeDocument/2006/relationships" xmlns:p="http://schemas.openxmlformats.org/presentationml/2006/main">
   <p:cSld>
     <p:spTree>
@@ -15194,7 +15522,7 @@
             </a:pPr>
             <a:fld id="{00000000-1234-1234-1234-123412341234}" type="slidenum">
               <a:rPr lang="en-US"/>
-              <a:t>11</a:t>
+              <a:t>12</a:t>
             </a:fld>
             <a:endParaRPr/>
           </a:p>
@@ -15455,7 +15783,35 @@
           <a:p>
             <a:r>
               <a:rPr lang="en-US"/>
-              <a:t>1/8/2025</a:t>
+              <a:t>8/18/25</a:t>
+            </a:r>
+          </a:p>
+        </p:txBody>
+      </p:sp>
+      <p:sp>
+        <p:nvSpPr>
+          <p:cNvPr id="4" name="Footer Placeholder 3">
+            <a:extLst>
+              <a:ext uri="{FF2B5EF4-FFF2-40B4-BE49-F238E27FC236}">
+                <a16:creationId xmlns:a16="http://schemas.microsoft.com/office/drawing/2014/main" id="{E85D8C21-7B88-0F3D-A9A5-61F0724F331D}"/>
+              </a:ext>
+            </a:extLst>
+          </p:cNvPr>
+          <p:cNvSpPr>
+            <a:spLocks noGrp="1"/>
+          </p:cNvSpPr>
+          <p:nvPr>
+            <p:ph type="ftr" idx="11"/>
+          </p:nvPr>
+        </p:nvSpPr>
+        <p:spPr/>
+        <p:txBody>
+          <a:bodyPr/>
+          <a:lstStyle/>
+          <a:p>
+            <a:r>
+              <a:rPr lang="en-US"/>
+              <a:t>Logging in and Linux</a:t>
             </a:r>
           </a:p>
         </p:txBody>
@@ -15473,7 +15829,7 @@
 </p:sld>
 </file>
 
-<file path=ppt/slides/slide12.xml><?xml version="1.0" encoding="utf-8"?>
+<file path=ppt/slides/slide13.xml><?xml version="1.0" encoding="utf-8"?>
 <p:sld xmlns:a="http://schemas.openxmlformats.org/drawingml/2006/main" xmlns:r="http://schemas.openxmlformats.org/officeDocument/2006/relationships" xmlns:p="http://schemas.openxmlformats.org/presentationml/2006/main">
   <p:cSld>
     <p:spTree>
@@ -15721,7 +16077,7 @@
             </a:pPr>
             <a:fld id="{00000000-1234-1234-1234-123412341234}" type="slidenum">
               <a:rPr lang="en-US" smtClean="0"/>
-              <a:t>12</a:t>
+              <a:t>13</a:t>
             </a:fld>
             <a:endParaRPr lang="en-US"/>
           </a:p>
@@ -15750,7 +16106,35 @@
           <a:p>
             <a:r>
               <a:rPr lang="en-US"/>
-              <a:t>1/8/2025</a:t>
+              <a:t>8/18/25</a:t>
+            </a:r>
+          </a:p>
+        </p:txBody>
+      </p:sp>
+      <p:sp>
+        <p:nvSpPr>
+          <p:cNvPr id="4" name="Footer Placeholder 3">
+            <a:extLst>
+              <a:ext uri="{FF2B5EF4-FFF2-40B4-BE49-F238E27FC236}">
+                <a16:creationId xmlns:a16="http://schemas.microsoft.com/office/drawing/2014/main" id="{7D620B50-CC6B-2A23-005C-D3F08E77DF8C}"/>
+              </a:ext>
+            </a:extLst>
+          </p:cNvPr>
+          <p:cNvSpPr>
+            <a:spLocks noGrp="1"/>
+          </p:cNvSpPr>
+          <p:nvPr>
+            <p:ph type="ftr" idx="11"/>
+          </p:nvPr>
+        </p:nvSpPr>
+        <p:spPr/>
+        <p:txBody>
+          <a:bodyPr/>
+          <a:lstStyle/>
+          <a:p>
+            <a:r>
+              <a:rPr lang="en-US"/>
+              <a:t>Logging in and Linux</a:t>
             </a:r>
           </a:p>
         </p:txBody>
@@ -15768,7 +16152,7 @@
 </p:sld>
 </file>
 
-<file path=ppt/slides/slide13.xml><?xml version="1.0" encoding="utf-8"?>
+<file path=ppt/slides/slide14.xml><?xml version="1.0" encoding="utf-8"?>
 <p:sld xmlns:a="http://schemas.openxmlformats.org/drawingml/2006/main" xmlns:r="http://schemas.openxmlformats.org/officeDocument/2006/relationships" xmlns:p="http://schemas.openxmlformats.org/presentationml/2006/main">
   <p:cSld>
     <p:spTree>
@@ -16097,7 +16481,7 @@
             </a:pPr>
             <a:fld id="{00000000-1234-1234-1234-123412341234}" type="slidenum">
               <a:rPr lang="en-US" smtClean="0"/>
-              <a:t>13</a:t>
+              <a:t>14</a:t>
             </a:fld>
             <a:endParaRPr lang="en-US"/>
           </a:p>
@@ -16126,7 +16510,35 @@
           <a:p>
             <a:r>
               <a:rPr lang="en-US"/>
-              <a:t>1/8/2025</a:t>
+              <a:t>8/18/25</a:t>
+            </a:r>
+          </a:p>
+        </p:txBody>
+      </p:sp>
+      <p:sp>
+        <p:nvSpPr>
+          <p:cNvPr id="4" name="Footer Placeholder 3">
+            <a:extLst>
+              <a:ext uri="{FF2B5EF4-FFF2-40B4-BE49-F238E27FC236}">
+                <a16:creationId xmlns:a16="http://schemas.microsoft.com/office/drawing/2014/main" id="{16DE55AF-D1C3-8C90-F149-2D03B79E0844}"/>
+              </a:ext>
+            </a:extLst>
+          </p:cNvPr>
+          <p:cNvSpPr>
+            <a:spLocks noGrp="1"/>
+          </p:cNvSpPr>
+          <p:nvPr>
+            <p:ph type="ftr" idx="11"/>
+          </p:nvPr>
+        </p:nvSpPr>
+        <p:spPr/>
+        <p:txBody>
+          <a:bodyPr/>
+          <a:lstStyle/>
+          <a:p>
+            <a:r>
+              <a:rPr lang="en-US"/>
+              <a:t>Logging in and Linux</a:t>
             </a:r>
           </a:p>
         </p:txBody>
@@ -16137,332 +16549,6 @@
         <p14:creationId xmlns:p14="http://schemas.microsoft.com/office/powerpoint/2010/main" val="1556662887"/>
       </p:ext>
     </p:extLst>
-  </p:cSld>
-  <p:clrMapOvr>
-    <a:masterClrMapping/>
-  </p:clrMapOvr>
-</p:sld>
-</file>
-
-<file path=ppt/slides/slide14.xml><?xml version="1.0" encoding="utf-8"?>
-<p:sld xmlns:a="http://schemas.openxmlformats.org/drawingml/2006/main" xmlns:r="http://schemas.openxmlformats.org/officeDocument/2006/relationships" xmlns:p="http://schemas.openxmlformats.org/presentationml/2006/main">
-  <p:cSld>
-    <p:spTree>
-      <p:nvGrpSpPr>
-        <p:cNvPr id="1" name="Shape 202"/>
-        <p:cNvGrpSpPr/>
-        <p:nvPr/>
-      </p:nvGrpSpPr>
-      <p:grpSpPr>
-        <a:xfrm>
-          <a:off x="0" y="0"/>
-          <a:ext cx="0" cy="0"/>
-          <a:chOff x="0" y="0"/>
-          <a:chExt cx="0" cy="0"/>
-        </a:xfrm>
-      </p:grpSpPr>
-      <p:sp>
-        <p:nvSpPr>
-          <p:cNvPr id="203" name="Google Shape;203;p29"/>
-          <p:cNvSpPr txBox="1">
-            <a:spLocks noGrp="1"/>
-          </p:cNvSpPr>
-          <p:nvPr>
-            <p:ph type="title"/>
-          </p:nvPr>
-        </p:nvSpPr>
-        <p:spPr>
-          <a:xfrm>
-            <a:off x="838200" y="365125"/>
-            <a:ext cx="10515600" cy="1325563"/>
-          </a:xfrm>
-          <a:prstGeom prst="rect">
-            <a:avLst/>
-          </a:prstGeom>
-          <a:noFill/>
-          <a:ln>
-            <a:noFill/>
-          </a:ln>
-        </p:spPr>
-        <p:txBody>
-          <a:bodyPr spcFirstLastPara="1" wrap="square" lIns="91425" tIns="45700" rIns="91425" bIns="45700" anchor="ctr" anchorCtr="0">
-            <a:normAutofit/>
-          </a:bodyPr>
-          <a:lstStyle/>
-          <a:p>
-            <a:pPr marL="0" lvl="0" indent="0" algn="l" rtl="0">
-              <a:lnSpc>
-                <a:spcPct val="90000"/>
-              </a:lnSpc>
-              <a:spcBef>
-                <a:spcPts val="0"/>
-              </a:spcBef>
-              <a:spcAft>
-                <a:spcPts val="0"/>
-              </a:spcAft>
-              <a:buClr>
-                <a:schemeClr val="dk1"/>
-              </a:buClr>
-              <a:buSzPts val="4400"/>
-              <a:buFont typeface="Arial Black"/>
-              <a:buNone/>
-            </a:pPr>
-            <a:r>
-              <a:rPr lang="en-US" dirty="0"/>
-              <a:t>Cloning a git repository</a:t>
-            </a:r>
-            <a:endParaRPr dirty="0"/>
-          </a:p>
-        </p:txBody>
-      </p:sp>
-      <p:sp>
-        <p:nvSpPr>
-          <p:cNvPr id="204" name="Google Shape;204;p29"/>
-          <p:cNvSpPr txBox="1">
-            <a:spLocks noGrp="1"/>
-          </p:cNvSpPr>
-          <p:nvPr>
-            <p:ph type="body" idx="1"/>
-          </p:nvPr>
-        </p:nvSpPr>
-        <p:spPr>
-          <a:xfrm>
-            <a:off x="838200" y="1825625"/>
-            <a:ext cx="11097600" cy="4163100"/>
-          </a:xfrm>
-          <a:prstGeom prst="rect">
-            <a:avLst/>
-          </a:prstGeom>
-          <a:noFill/>
-          <a:ln>
-            <a:noFill/>
-          </a:ln>
-        </p:spPr>
-        <p:txBody>
-          <a:bodyPr spcFirstLastPara="1" wrap="square" lIns="91425" tIns="45700" rIns="91425" bIns="45700" anchor="t" anchorCtr="0">
-            <a:normAutofit/>
-          </a:bodyPr>
-          <a:lstStyle/>
-          <a:p>
-            <a:pPr marL="228600" lvl="0" indent="-228600" algn="l" rtl="0">
-              <a:lnSpc>
-                <a:spcPct val="150000"/>
-              </a:lnSpc>
-              <a:spcBef>
-                <a:spcPts val="1000"/>
-              </a:spcBef>
-              <a:spcAft>
-                <a:spcPts val="0"/>
-              </a:spcAft>
-              <a:buSzPts val="2400"/>
-              <a:buChar char="•"/>
-            </a:pPr>
-            <a:r>
-              <a:rPr lang="en-US" sz="2400" dirty="0">
-                <a:latin typeface="+mn-lt"/>
-                <a:ea typeface="Helvetica Neue Light" panose="02000403000000020004" pitchFamily="2" charset="0"/>
-              </a:rPr>
-              <a:t>How to get there: </a:t>
-            </a:r>
-            <a:r>
-              <a:rPr lang="en-US" sz="2400" dirty="0">
-                <a:latin typeface="+mn-lt"/>
-                <a:ea typeface="Helvetica Neue Light" panose="02000403000000020004" pitchFamily="2" charset="0"/>
-                <a:hlinkClick r:id="rId3"/>
-              </a:rPr>
-              <a:t>github.com/ResearchComputing/Supercomputing_Spinup</a:t>
-            </a:r>
-            <a:endParaRPr lang="en-US" sz="2400" dirty="0">
-              <a:latin typeface="+mn-lt"/>
-              <a:ea typeface="Helvetica Neue Light" panose="02000403000000020004" pitchFamily="2" charset="0"/>
-            </a:endParaRPr>
-          </a:p>
-          <a:p>
-            <a:pPr marL="228600" lvl="0" indent="-228600" algn="l" rtl="0">
-              <a:lnSpc>
-                <a:spcPct val="150000"/>
-              </a:lnSpc>
-              <a:spcBef>
-                <a:spcPts val="1000"/>
-              </a:spcBef>
-              <a:spcAft>
-                <a:spcPts val="0"/>
-              </a:spcAft>
-              <a:buSzPts val="2400"/>
-              <a:buChar char="•"/>
-            </a:pPr>
-            <a:r>
-              <a:rPr lang="en-US" sz="2400" dirty="0">
-                <a:latin typeface="+mn-lt"/>
-                <a:ea typeface="Helvetica Neue Light" panose="02000403000000020004" pitchFamily="2" charset="0"/>
-              </a:rPr>
-              <a:t>Clone the repository:</a:t>
-            </a:r>
-            <a:r>
-              <a:rPr lang="en-US" dirty="0">
-                <a:latin typeface="+mn-lt"/>
-                <a:ea typeface="Helvetica Neue Light" panose="02000403000000020004" pitchFamily="2" charset="0"/>
-              </a:rPr>
-              <a:t> </a:t>
-            </a:r>
-            <a:endParaRPr dirty="0">
-              <a:latin typeface="+mn-lt"/>
-              <a:ea typeface="Helvetica Neue Light" panose="02000403000000020004" pitchFamily="2" charset="0"/>
-            </a:endParaRPr>
-          </a:p>
-        </p:txBody>
-      </p:sp>
-      <p:sp>
-        <p:nvSpPr>
-          <p:cNvPr id="205" name="Google Shape;205;p29"/>
-          <p:cNvSpPr/>
-          <p:nvPr/>
-        </p:nvSpPr>
-        <p:spPr>
-          <a:xfrm>
-            <a:off x="362983" y="3429000"/>
-            <a:ext cx="11466034" cy="551100"/>
-          </a:xfrm>
-          <a:prstGeom prst="rect">
-            <a:avLst/>
-          </a:prstGeom>
-          <a:noFill/>
-          <a:ln w="9525" cap="flat" cmpd="sng">
-            <a:noFill/>
-            <a:prstDash val="solid"/>
-            <a:round/>
-            <a:headEnd type="none" w="sm" len="sm"/>
-            <a:tailEnd type="none" w="sm" len="sm"/>
-          </a:ln>
-        </p:spPr>
-        <p:txBody>
-          <a:bodyPr spcFirstLastPara="1" wrap="square" lIns="91425" tIns="45700" rIns="91425" bIns="45700" anchor="t" anchorCtr="0">
-            <a:noAutofit/>
-          </a:bodyPr>
-          <a:lstStyle/>
-          <a:p>
-            <a:pPr marL="0" marR="0" lvl="0" indent="0" algn="ctr" rtl="0">
-              <a:spcBef>
-                <a:spcPts val="16"/>
-              </a:spcBef>
-              <a:spcAft>
-                <a:spcPts val="0"/>
-              </a:spcAft>
-              <a:buNone/>
-            </a:pPr>
-            <a:r>
-              <a:rPr lang="en-US" sz="2000" dirty="0">
-                <a:solidFill>
-                  <a:srgbClr val="4472C4"/>
-                </a:solidFill>
-                <a:latin typeface="Consolas" panose="020B0609020204030204" pitchFamily="49" charset="0"/>
-                <a:ea typeface="Consolas"/>
-                <a:cs typeface="Consolas" panose="020B0609020204030204" pitchFamily="49" charset="0"/>
-                <a:sym typeface="Consolas"/>
-              </a:rPr>
-              <a:t>git clone </a:t>
-            </a:r>
-            <a:r>
-              <a:rPr lang="en-US" sz="2000" dirty="0">
-                <a:solidFill>
-                  <a:srgbClr val="4472C4"/>
-                </a:solidFill>
-                <a:uFill>
-                  <a:noFill/>
-                </a:uFill>
-                <a:latin typeface="Consolas" panose="020B0609020204030204" pitchFamily="49" charset="0"/>
-                <a:ea typeface="Consolas"/>
-                <a:cs typeface="Consolas" panose="020B0609020204030204" pitchFamily="49" charset="0"/>
-                <a:sym typeface="Consolas"/>
-                <a:hlinkClick r:id="rId4">
-                  <a:extLst>
-                    <a:ext uri="{A12FA001-AC4F-418D-AE19-62706E023703}">
-                      <ahyp:hlinkClr xmlns:ahyp="http://schemas.microsoft.com/office/drawing/2018/hyperlinkcolor" val="tx"/>
-                    </a:ext>
-                  </a:extLst>
-                </a:hlinkClick>
-              </a:rPr>
-              <a:t>https://github.com/ResearchComputing/Supercomputing_Spinup.git</a:t>
-            </a:r>
-            <a:endParaRPr sz="2000" dirty="0">
-              <a:solidFill>
-                <a:srgbClr val="4472C4"/>
-              </a:solidFill>
-              <a:latin typeface="Consolas" panose="020B0609020204030204" pitchFamily="49" charset="0"/>
-              <a:ea typeface="Consolas"/>
-              <a:cs typeface="Consolas" panose="020B0609020204030204" pitchFamily="49" charset="0"/>
-              <a:sym typeface="Consolas"/>
-            </a:endParaRPr>
-          </a:p>
-        </p:txBody>
-      </p:sp>
-      <p:sp>
-        <p:nvSpPr>
-          <p:cNvPr id="2" name="Date Placeholder 1">
-            <a:extLst>
-              <a:ext uri="{FF2B5EF4-FFF2-40B4-BE49-F238E27FC236}">
-                <a16:creationId xmlns:a16="http://schemas.microsoft.com/office/drawing/2014/main" id="{608396A6-37D0-891B-07C9-C39B4C613C72}"/>
-              </a:ext>
-            </a:extLst>
-          </p:cNvPr>
-          <p:cNvSpPr>
-            <a:spLocks noGrp="1"/>
-          </p:cNvSpPr>
-          <p:nvPr>
-            <p:ph type="dt" idx="10"/>
-          </p:nvPr>
-        </p:nvSpPr>
-        <p:spPr/>
-        <p:txBody>
-          <a:bodyPr/>
-          <a:lstStyle/>
-          <a:p>
-            <a:r>
-              <a:rPr lang="en-US"/>
-              <a:t>1/8/2025</a:t>
-            </a:r>
-          </a:p>
-        </p:txBody>
-      </p:sp>
-      <p:sp>
-        <p:nvSpPr>
-          <p:cNvPr id="4" name="Slide Number Placeholder 3">
-            <a:extLst>
-              <a:ext uri="{FF2B5EF4-FFF2-40B4-BE49-F238E27FC236}">
-                <a16:creationId xmlns:a16="http://schemas.microsoft.com/office/drawing/2014/main" id="{CD685763-7F1D-4BF7-1B2D-9F2DEDF95D7F}"/>
-              </a:ext>
-            </a:extLst>
-          </p:cNvPr>
-          <p:cNvSpPr>
-            <a:spLocks noGrp="1"/>
-          </p:cNvSpPr>
-          <p:nvPr>
-            <p:ph type="sldNum" idx="12"/>
-          </p:nvPr>
-        </p:nvSpPr>
-        <p:spPr/>
-        <p:txBody>
-          <a:bodyPr/>
-          <a:lstStyle/>
-          <a:p>
-            <a:pPr marL="0" lvl="0" indent="0" algn="l" rtl="0">
-              <a:spcBef>
-                <a:spcPts val="0"/>
-              </a:spcBef>
-              <a:spcAft>
-                <a:spcPts val="0"/>
-              </a:spcAft>
-              <a:buNone/>
-            </a:pPr>
-            <a:fld id="{00000000-1234-1234-1234-123412341234}" type="slidenum">
-              <a:rPr lang="en-US" smtClean="0"/>
-              <a:t>14</a:t>
-            </a:fld>
-            <a:endParaRPr lang="en-US"/>
-          </a:p>
-        </p:txBody>
-      </p:sp>
-    </p:spTree>
   </p:cSld>
   <p:clrMapOvr>
     <a:masterClrMapping/>
@@ -16832,7 +16918,35 @@
           <a:p>
             <a:r>
               <a:rPr lang="en-US"/>
-              <a:t>1/8/2025</a:t>
+              <a:t>8/18/25</a:t>
+            </a:r>
+          </a:p>
+        </p:txBody>
+      </p:sp>
+      <p:sp>
+        <p:nvSpPr>
+          <p:cNvPr id="4" name="Footer Placeholder 3">
+            <a:extLst>
+              <a:ext uri="{FF2B5EF4-FFF2-40B4-BE49-F238E27FC236}">
+                <a16:creationId xmlns:a16="http://schemas.microsoft.com/office/drawing/2014/main" id="{9FF91909-FBC6-E149-432B-913E45660F26}"/>
+              </a:ext>
+            </a:extLst>
+          </p:cNvPr>
+          <p:cNvSpPr>
+            <a:spLocks noGrp="1"/>
+          </p:cNvSpPr>
+          <p:nvPr>
+            <p:ph type="ftr" idx="11"/>
+          </p:nvPr>
+        </p:nvSpPr>
+        <p:spPr/>
+        <p:txBody>
+          <a:bodyPr/>
+          <a:lstStyle/>
+          <a:p>
+            <a:r>
+              <a:rPr lang="en-US"/>
+              <a:t>Logging in and Linux</a:t>
             </a:r>
           </a:p>
         </p:txBody>
@@ -17253,7 +17367,35 @@
           <a:p>
             <a:r>
               <a:rPr lang="en-US"/>
-              <a:t>1/8/2025</a:t>
+              <a:t>8/18/25</a:t>
+            </a:r>
+          </a:p>
+        </p:txBody>
+      </p:sp>
+      <p:sp>
+        <p:nvSpPr>
+          <p:cNvPr id="4" name="Footer Placeholder 3">
+            <a:extLst>
+              <a:ext uri="{FF2B5EF4-FFF2-40B4-BE49-F238E27FC236}">
+                <a16:creationId xmlns:a16="http://schemas.microsoft.com/office/drawing/2014/main" id="{3BF79208-D36D-5507-D4B1-02724E392DB1}"/>
+              </a:ext>
+            </a:extLst>
+          </p:cNvPr>
+          <p:cNvSpPr>
+            <a:spLocks noGrp="1"/>
+          </p:cNvSpPr>
+          <p:nvPr>
+            <p:ph type="ftr" idx="11"/>
+          </p:nvPr>
+        </p:nvSpPr>
+        <p:spPr/>
+        <p:txBody>
+          <a:bodyPr/>
+          <a:lstStyle/>
+          <a:p>
+            <a:r>
+              <a:rPr lang="en-US"/>
+              <a:t>Logging in and Linux</a:t>
             </a:r>
           </a:p>
         </p:txBody>
@@ -17733,7 +17875,35 @@
           <a:p>
             <a:r>
               <a:rPr lang="en-US"/>
-              <a:t>1/8/2025</a:t>
+              <a:t>8/18/25</a:t>
+            </a:r>
+          </a:p>
+        </p:txBody>
+      </p:sp>
+      <p:sp>
+        <p:nvSpPr>
+          <p:cNvPr id="5" name="Footer Placeholder 4">
+            <a:extLst>
+              <a:ext uri="{FF2B5EF4-FFF2-40B4-BE49-F238E27FC236}">
+                <a16:creationId xmlns:a16="http://schemas.microsoft.com/office/drawing/2014/main" id="{4CD6FDE6-E5DB-FAC7-E7BA-70F9519DAC0D}"/>
+              </a:ext>
+            </a:extLst>
+          </p:cNvPr>
+          <p:cNvSpPr>
+            <a:spLocks noGrp="1"/>
+          </p:cNvSpPr>
+          <p:nvPr>
+            <p:ph type="ftr" idx="11"/>
+          </p:nvPr>
+        </p:nvSpPr>
+        <p:spPr/>
+        <p:txBody>
+          <a:bodyPr/>
+          <a:lstStyle/>
+          <a:p>
+            <a:r>
+              <a:rPr lang="en-US"/>
+              <a:t>Logging in and Linux</a:t>
             </a:r>
           </a:p>
         </p:txBody>
@@ -18105,7 +18275,7 @@
           <a:p>
             <a:r>
               <a:rPr lang="en-US"/>
-              <a:t>1/8/2025</a:t>
+              <a:t>8/18/25</a:t>
             </a:r>
           </a:p>
         </p:txBody>
@@ -18145,6 +18315,34 @@
               <a:t>18</a:t>
             </a:fld>
             <a:endParaRPr lang="en-US"/>
+          </a:p>
+        </p:txBody>
+      </p:sp>
+      <p:sp>
+        <p:nvSpPr>
+          <p:cNvPr id="4" name="Footer Placeholder 3">
+            <a:extLst>
+              <a:ext uri="{FF2B5EF4-FFF2-40B4-BE49-F238E27FC236}">
+                <a16:creationId xmlns:a16="http://schemas.microsoft.com/office/drawing/2014/main" id="{39D052C0-FD43-1CF6-88DF-9EEC5C098671}"/>
+              </a:ext>
+            </a:extLst>
+          </p:cNvPr>
+          <p:cNvSpPr>
+            <a:spLocks noGrp="1"/>
+          </p:cNvSpPr>
+          <p:nvPr>
+            <p:ph type="ftr" idx="11"/>
+          </p:nvPr>
+        </p:nvSpPr>
+        <p:spPr/>
+        <p:txBody>
+          <a:bodyPr/>
+          <a:lstStyle/>
+          <a:p>
+            <a:r>
+              <a:rPr lang="en-US"/>
+              <a:t>Logging in and Linux</a:t>
+            </a:r>
           </a:p>
         </p:txBody>
       </p:sp>
@@ -18485,7 +18683,35 @@
           <a:p>
             <a:r>
               <a:rPr lang="en-US"/>
-              <a:t>1/8/2025</a:t>
+              <a:t>8/18/25</a:t>
+            </a:r>
+          </a:p>
+        </p:txBody>
+      </p:sp>
+      <p:sp>
+        <p:nvSpPr>
+          <p:cNvPr id="4" name="Footer Placeholder 3">
+            <a:extLst>
+              <a:ext uri="{FF2B5EF4-FFF2-40B4-BE49-F238E27FC236}">
+                <a16:creationId xmlns:a16="http://schemas.microsoft.com/office/drawing/2014/main" id="{B4A44BA7-A17E-5266-B080-E589BA760B1A}"/>
+              </a:ext>
+            </a:extLst>
+          </p:cNvPr>
+          <p:cNvSpPr>
+            <a:spLocks noGrp="1"/>
+          </p:cNvSpPr>
+          <p:nvPr>
+            <p:ph type="ftr" idx="11"/>
+          </p:nvPr>
+        </p:nvSpPr>
+        <p:spPr/>
+        <p:txBody>
+          <a:bodyPr/>
+          <a:lstStyle/>
+          <a:p>
+            <a:r>
+              <a:rPr lang="en-US"/>
+              <a:t>Logging in and Linux</a:t>
             </a:r>
           </a:p>
         </p:txBody>
@@ -18767,7 +18993,35 @@
           <a:p>
             <a:r>
               <a:rPr lang="en-US"/>
-              <a:t>1/8/2025</a:t>
+              <a:t>8/18/25</a:t>
+            </a:r>
+          </a:p>
+        </p:txBody>
+      </p:sp>
+      <p:sp>
+        <p:nvSpPr>
+          <p:cNvPr id="3" name="Footer Placeholder 2">
+            <a:extLst>
+              <a:ext uri="{FF2B5EF4-FFF2-40B4-BE49-F238E27FC236}">
+                <a16:creationId xmlns:a16="http://schemas.microsoft.com/office/drawing/2014/main" id="{D353B99A-7493-87BF-2AAA-568C9E752F65}"/>
+              </a:ext>
+            </a:extLst>
+          </p:cNvPr>
+          <p:cNvSpPr>
+            <a:spLocks noGrp="1"/>
+          </p:cNvSpPr>
+          <p:nvPr>
+            <p:ph type="ftr" idx="11"/>
+          </p:nvPr>
+        </p:nvSpPr>
+        <p:spPr/>
+        <p:txBody>
+          <a:bodyPr/>
+          <a:lstStyle/>
+          <a:p>
+            <a:r>
+              <a:rPr lang="en-US"/>
+              <a:t>Logging in and Linux</a:t>
             </a:r>
           </a:p>
         </p:txBody>
@@ -19134,7 +19388,35 @@
           <a:p>
             <a:r>
               <a:rPr lang="en-US"/>
-              <a:t>1/8/2025</a:t>
+              <a:t>8/18/25</a:t>
+            </a:r>
+          </a:p>
+        </p:txBody>
+      </p:sp>
+      <p:sp>
+        <p:nvSpPr>
+          <p:cNvPr id="4" name="Footer Placeholder 3">
+            <a:extLst>
+              <a:ext uri="{FF2B5EF4-FFF2-40B4-BE49-F238E27FC236}">
+                <a16:creationId xmlns:a16="http://schemas.microsoft.com/office/drawing/2014/main" id="{69018544-94CD-0603-03B5-10D6BDEF34EB}"/>
+              </a:ext>
+            </a:extLst>
+          </p:cNvPr>
+          <p:cNvSpPr>
+            <a:spLocks noGrp="1"/>
+          </p:cNvSpPr>
+          <p:nvPr>
+            <p:ph type="ftr" idx="11"/>
+          </p:nvPr>
+        </p:nvSpPr>
+        <p:spPr/>
+        <p:txBody>
+          <a:bodyPr/>
+          <a:lstStyle/>
+          <a:p>
+            <a:r>
+              <a:rPr lang="en-US"/>
+              <a:t>Logging in and Linux</a:t>
             </a:r>
           </a:p>
         </p:txBody>
@@ -19506,7 +19788,35 @@
           <a:p>
             <a:r>
               <a:rPr lang="en-US"/>
-              <a:t>1/8/2025</a:t>
+              <a:t>8/18/25</a:t>
+            </a:r>
+          </a:p>
+        </p:txBody>
+      </p:sp>
+      <p:sp>
+        <p:nvSpPr>
+          <p:cNvPr id="4" name="Footer Placeholder 3">
+            <a:extLst>
+              <a:ext uri="{FF2B5EF4-FFF2-40B4-BE49-F238E27FC236}">
+                <a16:creationId xmlns:a16="http://schemas.microsoft.com/office/drawing/2014/main" id="{F2C946EB-7AD0-55FB-2E00-ED940DDEB7B8}"/>
+              </a:ext>
+            </a:extLst>
+          </p:cNvPr>
+          <p:cNvSpPr>
+            <a:spLocks noGrp="1"/>
+          </p:cNvSpPr>
+          <p:nvPr>
+            <p:ph type="ftr" idx="11"/>
+          </p:nvPr>
+        </p:nvSpPr>
+        <p:spPr/>
+        <p:txBody>
+          <a:bodyPr/>
+          <a:lstStyle/>
+          <a:p>
+            <a:r>
+              <a:rPr lang="en-US"/>
+              <a:t>Logging in and Linux</a:t>
             </a:r>
           </a:p>
         </p:txBody>
@@ -20077,7 +20387,7 @@
           <a:p>
             <a:r>
               <a:rPr lang="en-US"/>
-              <a:t>1/8/2025</a:t>
+              <a:t>8/18/25</a:t>
             </a:r>
           </a:p>
         </p:txBody>
@@ -20117,6 +20427,34 @@
               <a:t>22</a:t>
             </a:fld>
             <a:endParaRPr lang="en-US"/>
+          </a:p>
+        </p:txBody>
+      </p:sp>
+      <p:sp>
+        <p:nvSpPr>
+          <p:cNvPr id="3" name="Footer Placeholder 2">
+            <a:extLst>
+              <a:ext uri="{FF2B5EF4-FFF2-40B4-BE49-F238E27FC236}">
+                <a16:creationId xmlns:a16="http://schemas.microsoft.com/office/drawing/2014/main" id="{6AA29451-CF9B-471A-7F59-7ABA13074935}"/>
+              </a:ext>
+            </a:extLst>
+          </p:cNvPr>
+          <p:cNvSpPr>
+            <a:spLocks noGrp="1"/>
+          </p:cNvSpPr>
+          <p:nvPr>
+            <p:ph type="ftr" idx="11"/>
+          </p:nvPr>
+        </p:nvSpPr>
+        <p:spPr/>
+        <p:txBody>
+          <a:bodyPr/>
+          <a:lstStyle/>
+          <a:p>
+            <a:r>
+              <a:rPr lang="en-US"/>
+              <a:t>Logging in and Linux</a:t>
+            </a:r>
           </a:p>
         </p:txBody>
       </p:sp>
@@ -20501,7 +20839,7 @@
                 <a:cs typeface="Courier New"/>
                 <a:sym typeface="Courier New"/>
               </a:rPr>
-              <a:t># the files in /</a:t>
+              <a:t># list files in /</a:t>
             </a:r>
             <a:r>
               <a:rPr lang="en-US" sz="2600" i="1" dirty="0" err="1">
@@ -20868,7 +21206,7 @@
           <a:p>
             <a:r>
               <a:rPr lang="en-US"/>
-              <a:t>1/8/2025</a:t>
+              <a:t>8/18/25</a:t>
             </a:r>
           </a:p>
         </p:txBody>
@@ -20968,6 +21306,34 @@
               <a:t>Anatomy of a shell script</a:t>
             </a:r>
             <a:endParaRPr dirty="0"/>
+          </a:p>
+        </p:txBody>
+      </p:sp>
+      <p:sp>
+        <p:nvSpPr>
+          <p:cNvPr id="3" name="Footer Placeholder 2">
+            <a:extLst>
+              <a:ext uri="{FF2B5EF4-FFF2-40B4-BE49-F238E27FC236}">
+                <a16:creationId xmlns:a16="http://schemas.microsoft.com/office/drawing/2014/main" id="{171F765A-8D81-3ED0-D81A-0252B670FDA5}"/>
+              </a:ext>
+            </a:extLst>
+          </p:cNvPr>
+          <p:cNvSpPr>
+            <a:spLocks noGrp="1"/>
+          </p:cNvSpPr>
+          <p:nvPr>
+            <p:ph type="ftr" idx="11"/>
+          </p:nvPr>
+        </p:nvSpPr>
+        <p:spPr/>
+        <p:txBody>
+          <a:bodyPr/>
+          <a:lstStyle/>
+          <a:p>
+            <a:r>
+              <a:rPr lang="en-US"/>
+              <a:t>Logging in and Linux</a:t>
+            </a:r>
           </a:p>
         </p:txBody>
       </p:sp>
@@ -21529,7 +21895,7 @@
           <a:p>
             <a:r>
               <a:rPr lang="en-US"/>
-              <a:t>1/8/2025</a:t>
+              <a:t>8/18/25</a:t>
             </a:r>
           </a:p>
         </p:txBody>
@@ -21569,6 +21935,34 @@
               <a:t>24</a:t>
             </a:fld>
             <a:endParaRPr lang="en-US"/>
+          </a:p>
+        </p:txBody>
+      </p:sp>
+      <p:sp>
+        <p:nvSpPr>
+          <p:cNvPr id="3" name="Footer Placeholder 2">
+            <a:extLst>
+              <a:ext uri="{FF2B5EF4-FFF2-40B4-BE49-F238E27FC236}">
+                <a16:creationId xmlns:a16="http://schemas.microsoft.com/office/drawing/2014/main" id="{68A15733-FFF9-BF7C-5FEF-76FB728B9074}"/>
+              </a:ext>
+            </a:extLst>
+          </p:cNvPr>
+          <p:cNvSpPr>
+            <a:spLocks noGrp="1"/>
+          </p:cNvSpPr>
+          <p:nvPr>
+            <p:ph type="ftr" idx="11"/>
+          </p:nvPr>
+        </p:nvSpPr>
+        <p:spPr/>
+        <p:txBody>
+          <a:bodyPr/>
+          <a:lstStyle/>
+          <a:p>
+            <a:r>
+              <a:rPr lang="en-US"/>
+              <a:t>Logging in and Linux</a:t>
+            </a:r>
           </a:p>
         </p:txBody>
       </p:sp>
@@ -22291,7 +22685,35 @@
           <a:p>
             <a:r>
               <a:rPr lang="en-US"/>
-              <a:t>1/8/2025</a:t>
+              <a:t>8/18/25</a:t>
+            </a:r>
+          </a:p>
+        </p:txBody>
+      </p:sp>
+      <p:sp>
+        <p:nvSpPr>
+          <p:cNvPr id="4" name="Footer Placeholder 3">
+            <a:extLst>
+              <a:ext uri="{FF2B5EF4-FFF2-40B4-BE49-F238E27FC236}">
+                <a16:creationId xmlns:a16="http://schemas.microsoft.com/office/drawing/2014/main" id="{CFACA8ED-D21B-68AA-297F-186184E0CB95}"/>
+              </a:ext>
+            </a:extLst>
+          </p:cNvPr>
+          <p:cNvSpPr>
+            <a:spLocks noGrp="1"/>
+          </p:cNvSpPr>
+          <p:nvPr>
+            <p:ph type="ftr" idx="11"/>
+          </p:nvPr>
+        </p:nvSpPr>
+        <p:spPr/>
+        <p:txBody>
+          <a:bodyPr/>
+          <a:lstStyle/>
+          <a:p>
+            <a:r>
+              <a:rPr lang="en-US"/>
+              <a:t>Logging in and Linux</a:t>
             </a:r>
           </a:p>
         </p:txBody>
@@ -22804,7 +23226,35 @@
           <a:p>
             <a:r>
               <a:rPr lang="en-US"/>
-              <a:t>1/8/2025</a:t>
+              <a:t>8/18/25</a:t>
+            </a:r>
+          </a:p>
+        </p:txBody>
+      </p:sp>
+      <p:sp>
+        <p:nvSpPr>
+          <p:cNvPr id="4" name="Footer Placeholder 3">
+            <a:extLst>
+              <a:ext uri="{FF2B5EF4-FFF2-40B4-BE49-F238E27FC236}">
+                <a16:creationId xmlns:a16="http://schemas.microsoft.com/office/drawing/2014/main" id="{0DA61016-6D02-1D65-16C1-31F0F10F9C4B}"/>
+              </a:ext>
+            </a:extLst>
+          </p:cNvPr>
+          <p:cNvSpPr>
+            <a:spLocks noGrp="1"/>
+          </p:cNvSpPr>
+          <p:nvPr>
+            <p:ph type="ftr" idx="11"/>
+          </p:nvPr>
+        </p:nvSpPr>
+        <p:spPr/>
+        <p:txBody>
+          <a:bodyPr/>
+          <a:lstStyle/>
+          <a:p>
+            <a:r>
+              <a:rPr lang="en-US"/>
+              <a:t>Logging in and Linux</a:t>
             </a:r>
           </a:p>
         </p:txBody>
@@ -22827,7 +23277,13 @@
   <p:cSld>
     <p:spTree>
       <p:nvGrpSpPr>
-        <p:cNvPr id="1" name=""/>
+        <p:cNvPr id="1" name="">
+          <a:extLst>
+            <a:ext uri="{FF2B5EF4-FFF2-40B4-BE49-F238E27FC236}">
+              <a16:creationId xmlns:a16="http://schemas.microsoft.com/office/drawing/2014/main" id="{B25878D1-04D0-6615-5B4A-1162EAA5FDEE}"/>
+            </a:ext>
+          </a:extLst>
+        </p:cNvPr>
         <p:cNvGrpSpPr/>
         <p:nvPr/>
       </p:nvGrpSpPr>
@@ -22844,7 +23300,7 @@
           <p:cNvPr id="2" name="Title 1">
             <a:extLst>
               <a:ext uri="{FF2B5EF4-FFF2-40B4-BE49-F238E27FC236}">
-                <a16:creationId xmlns:a16="http://schemas.microsoft.com/office/drawing/2014/main" id="{D332E882-BA6F-885D-6120-8BD3DAFDA0F1}"/>
+                <a16:creationId xmlns:a16="http://schemas.microsoft.com/office/drawing/2014/main" id="{AE62F0F1-1C1F-9258-132D-5F2E646AFF5A}"/>
               </a:ext>
             </a:extLst>
           </p:cNvPr>
@@ -22862,13 +23318,20 @@
           <a:p>
             <a:r>
               <a:rPr lang="en-US" dirty="0"/>
-              <a:t>Run </a:t>
-            </a:r>
-            <a:r>
-              <a:rPr lang="en-US" dirty="0" err="1"/>
+              <a:t>Let’s create a script, </a:t>
+            </a:r>
+            <a:r>
+              <a:rPr lang="en-US" i="1" dirty="0"/>
+              <a:t>“</a:t>
+            </a:r>
+            <a:r>
+              <a:rPr lang="en-US" i="1" dirty="0" err="1"/>
               <a:t>test.sh</a:t>
             </a:r>
-            <a:endParaRPr lang="en-US" dirty="0"/>
+            <a:r>
+              <a:rPr lang="en-US" i="1" dirty="0"/>
+              <a:t>”</a:t>
+            </a:r>
           </a:p>
         </p:txBody>
       </p:sp>
@@ -22877,7 +23340,7 @@
           <p:cNvPr id="6" name="Slide Number Placeholder 5">
             <a:extLst>
               <a:ext uri="{FF2B5EF4-FFF2-40B4-BE49-F238E27FC236}">
-                <a16:creationId xmlns:a16="http://schemas.microsoft.com/office/drawing/2014/main" id="{C10D4CAF-BAB8-1E92-3114-9F8BC35DAD92}"/>
+                <a16:creationId xmlns:a16="http://schemas.microsoft.com/office/drawing/2014/main" id="{A9E00396-B4F9-3A33-F938-55A8F5B61D64}"/>
               </a:ext>
             </a:extLst>
           </p:cNvPr>
@@ -22915,7 +23378,7 @@
           <p:cNvPr id="7" name="Google Shape;391;p33">
             <a:extLst>
               <a:ext uri="{FF2B5EF4-FFF2-40B4-BE49-F238E27FC236}">
-                <a16:creationId xmlns:a16="http://schemas.microsoft.com/office/drawing/2014/main" id="{584653C5-4DCD-4D2F-BF0E-1A0F9D1F50B2}"/>
+                <a16:creationId xmlns:a16="http://schemas.microsoft.com/office/drawing/2014/main" id="{8F0DE96E-256D-A751-871F-92CDCC103E6C}"/>
               </a:ext>
             </a:extLst>
           </p:cNvPr>
@@ -22924,8 +23387,8 @@
         </p:nvSpPr>
         <p:spPr>
           <a:xfrm>
-            <a:off x="959457" y="1931069"/>
-            <a:ext cx="10273085" cy="2047986"/>
+            <a:off x="947100" y="1560367"/>
+            <a:ext cx="10273085" cy="4787198"/>
           </a:xfrm>
           <a:prstGeom prst="rect">
             <a:avLst/>
@@ -22941,22 +23404,33 @@
           </a:bodyPr>
           <a:lstStyle/>
           <a:p>
-            <a:pPr marL="12700" marR="0" lvl="0" algn="l" rtl="0">
-              <a:lnSpc>
-                <a:spcPct val="100000"/>
-              </a:lnSpc>
-              <a:spcBef>
-                <a:spcPts val="0"/>
-              </a:spcBef>
-              <a:spcAft>
-                <a:spcPts val="0"/>
-              </a:spcAft>
+            <a:pPr marL="12700" lvl="0">
               <a:buClr>
                 <a:srgbClr val="CEB97C"/>
               </a:buClr>
             </a:pPr>
             <a:r>
-              <a:rPr lang="en-US" sz="4400" b="1" dirty="0" err="1">
+              <a:rPr lang="en-US" sz="3200" b="1" i="1" dirty="0">
+                <a:solidFill>
+                  <a:schemeClr val="tx2">
+                    <a:lumMod val="50000"/>
+                  </a:schemeClr>
+                </a:solidFill>
+                <a:latin typeface="Consolas" panose="020B0609020204030204" pitchFamily="49" charset="0"/>
+                <a:ea typeface="Helvetica Neue Light" panose="02000403000000020004" pitchFamily="2" charset="0"/>
+                <a:cs typeface="Consolas" panose="020B0609020204030204" pitchFamily="49" charset="0"/>
+              </a:rPr>
+              <a:t>Step 1: open new file </a:t>
+            </a:r>
+          </a:p>
+          <a:p>
+            <a:pPr marL="12700" lvl="0">
+              <a:buClr>
+                <a:srgbClr val="CEB97C"/>
+              </a:buClr>
+            </a:pPr>
+            <a:r>
+              <a:rPr lang="en-US" sz="4400" b="1" dirty="0">
                 <a:solidFill>
                   <a:schemeClr val="accent1">
                     <a:lumMod val="75000"/>
@@ -22966,46 +23440,7 @@
                 <a:ea typeface="Helvetica Neue Light" panose="02000403000000020004" pitchFamily="2" charset="0"/>
                 <a:cs typeface="Consolas" panose="020B0609020204030204" pitchFamily="49" charset="0"/>
               </a:rPr>
-              <a:t>chmod</a:t>
-            </a:r>
-            <a:r>
-              <a:rPr lang="en-US" sz="4400" b="1" dirty="0">
-                <a:solidFill>
-                  <a:schemeClr val="accent1">
-                    <a:lumMod val="75000"/>
-                  </a:schemeClr>
-                </a:solidFill>
-                <a:latin typeface="Consolas" panose="020B0609020204030204" pitchFamily="49" charset="0"/>
-                <a:ea typeface="Helvetica Neue Light" panose="02000403000000020004" pitchFamily="2" charset="0"/>
-                <a:cs typeface="Consolas" panose="020B0609020204030204" pitchFamily="49" charset="0"/>
-              </a:rPr>
-              <a:t> </a:t>
-            </a:r>
-            <a:r>
-              <a:rPr lang="en-US" sz="4400" b="1" dirty="0" err="1">
-                <a:solidFill>
-                  <a:schemeClr val="accent1">
-                    <a:lumMod val="75000"/>
-                  </a:schemeClr>
-                </a:solidFill>
-                <a:latin typeface="Consolas" panose="020B0609020204030204" pitchFamily="49" charset="0"/>
-                <a:ea typeface="Helvetica Neue Light" panose="02000403000000020004" pitchFamily="2" charset="0"/>
-                <a:cs typeface="Consolas" panose="020B0609020204030204" pitchFamily="49" charset="0"/>
-              </a:rPr>
-              <a:t>u+x</a:t>
-            </a:r>
-            <a:r>
-              <a:rPr lang="en-US" sz="4400" b="1" dirty="0">
-                <a:solidFill>
-                  <a:schemeClr val="accent1">
-                    <a:lumMod val="75000"/>
-                  </a:schemeClr>
-                </a:solidFill>
-                <a:latin typeface="Consolas" panose="020B0609020204030204" pitchFamily="49" charset="0"/>
-                <a:ea typeface="Helvetica Neue Light" panose="02000403000000020004" pitchFamily="2" charset="0"/>
-                <a:cs typeface="Consolas" panose="020B0609020204030204" pitchFamily="49" charset="0"/>
-              </a:rPr>
-              <a:t> </a:t>
+              <a:t>nano </a:t>
             </a:r>
             <a:r>
               <a:rPr lang="en-US" sz="4400" b="1" dirty="0" err="1">
@@ -23032,21 +23467,12 @@
             </a:endParaRPr>
           </a:p>
           <a:p>
-            <a:pPr marL="12700" marR="0" lvl="0" algn="l" rtl="0">
-              <a:lnSpc>
-                <a:spcPct val="100000"/>
-              </a:lnSpc>
-              <a:spcBef>
-                <a:spcPts val="0"/>
-              </a:spcBef>
-              <a:spcAft>
-                <a:spcPts val="0"/>
-              </a:spcAft>
+            <a:pPr marL="12700" lvl="0">
               <a:buClr>
                 <a:srgbClr val="CEB97C"/>
               </a:buClr>
             </a:pPr>
-            <a:endParaRPr lang="en-US" sz="4400" b="1" dirty="0">
+            <a:endParaRPr lang="en-US" sz="1000" b="1" i="1" dirty="0">
               <a:solidFill>
                 <a:schemeClr val="accent1">
                   <a:lumMod val="75000"/>
@@ -23058,50 +23484,123 @@
             </a:endParaRPr>
           </a:p>
           <a:p>
-            <a:pPr marL="12700" marR="0" lvl="0" algn="l" rtl="0">
-              <a:lnSpc>
-                <a:spcPct val="100000"/>
-              </a:lnSpc>
-              <a:spcBef>
-                <a:spcPts val="0"/>
-              </a:spcBef>
-              <a:spcAft>
-                <a:spcPts val="0"/>
-              </a:spcAft>
+            <a:pPr marL="12700">
               <a:buClr>
                 <a:srgbClr val="CEB97C"/>
               </a:buClr>
             </a:pPr>
             <a:r>
-              <a:rPr lang="en-US" sz="4400" b="1" dirty="0">
-                <a:solidFill>
-                  <a:schemeClr val="accent1">
-                    <a:lumMod val="75000"/>
+              <a:rPr lang="en-US" sz="3200" b="1" i="1" dirty="0">
+                <a:solidFill>
+                  <a:schemeClr val="tx2">
+                    <a:lumMod val="50000"/>
                   </a:schemeClr>
                 </a:solidFill>
                 <a:latin typeface="Consolas" panose="020B0609020204030204" pitchFamily="49" charset="0"/>
                 <a:ea typeface="Helvetica Neue Light" panose="02000403000000020004" pitchFamily="2" charset="0"/>
                 <a:cs typeface="Consolas" panose="020B0609020204030204" pitchFamily="49" charset="0"/>
               </a:rPr>
-              <a:t>./</a:t>
-            </a:r>
-            <a:r>
-              <a:rPr lang="en-US" sz="4400" b="1" dirty="0" err="1">
-                <a:solidFill>
-                  <a:schemeClr val="accent1">
-                    <a:lumMod val="75000"/>
+              <a:t>Step 2: add the following text:</a:t>
+            </a:r>
+          </a:p>
+          <a:p>
+            <a:pPr marL="12700">
+              <a:buClr>
+                <a:srgbClr val="CEB97C"/>
+              </a:buClr>
+            </a:pPr>
+            <a:endParaRPr lang="en-US" sz="3200" b="1" i="1" dirty="0">
+              <a:solidFill>
+                <a:schemeClr val="tx2">
+                  <a:lumMod val="50000"/>
+                </a:schemeClr>
+              </a:solidFill>
+              <a:latin typeface="Consolas" panose="020B0609020204030204" pitchFamily="49" charset="0"/>
+              <a:ea typeface="Helvetica Neue Light" panose="02000403000000020004" pitchFamily="2" charset="0"/>
+              <a:cs typeface="Consolas" panose="020B0609020204030204" pitchFamily="49" charset="0"/>
+            </a:endParaRPr>
+          </a:p>
+          <a:p>
+            <a:pPr marL="12700">
+              <a:buClr>
+                <a:srgbClr val="CEB97C"/>
+              </a:buClr>
+            </a:pPr>
+            <a:endParaRPr lang="en-US" sz="3200" b="1" i="1" dirty="0">
+              <a:solidFill>
+                <a:schemeClr val="tx2">
+                  <a:lumMod val="50000"/>
+                </a:schemeClr>
+              </a:solidFill>
+              <a:latin typeface="Consolas" panose="020B0609020204030204" pitchFamily="49" charset="0"/>
+              <a:ea typeface="Helvetica Neue Light" panose="02000403000000020004" pitchFamily="2" charset="0"/>
+              <a:cs typeface="Consolas" panose="020B0609020204030204" pitchFamily="49" charset="0"/>
+            </a:endParaRPr>
+          </a:p>
+          <a:p>
+            <a:pPr marL="12700">
+              <a:buClr>
+                <a:srgbClr val="CEB97C"/>
+              </a:buClr>
+            </a:pPr>
+            <a:endParaRPr lang="en-US" sz="3200" b="1" i="1" dirty="0">
+              <a:solidFill>
+                <a:schemeClr val="tx2">
+                  <a:lumMod val="50000"/>
+                </a:schemeClr>
+              </a:solidFill>
+              <a:latin typeface="Consolas" panose="020B0609020204030204" pitchFamily="49" charset="0"/>
+              <a:ea typeface="Helvetica Neue Light" panose="02000403000000020004" pitchFamily="2" charset="0"/>
+              <a:cs typeface="Consolas" panose="020B0609020204030204" pitchFamily="49" charset="0"/>
+            </a:endParaRPr>
+          </a:p>
+          <a:p>
+            <a:pPr marL="12700">
+              <a:buClr>
+                <a:srgbClr val="CEB97C"/>
+              </a:buClr>
+            </a:pPr>
+            <a:endParaRPr lang="en-US" sz="3200" b="1" i="1" dirty="0">
+              <a:solidFill>
+                <a:schemeClr val="tx2">
+                  <a:lumMod val="50000"/>
+                </a:schemeClr>
+              </a:solidFill>
+              <a:latin typeface="Consolas" panose="020B0609020204030204" pitchFamily="49" charset="0"/>
+              <a:ea typeface="Helvetica Neue Light" panose="02000403000000020004" pitchFamily="2" charset="0"/>
+              <a:cs typeface="Consolas" panose="020B0609020204030204" pitchFamily="49" charset="0"/>
+            </a:endParaRPr>
+          </a:p>
+          <a:p>
+            <a:pPr marL="12700">
+              <a:buClr>
+                <a:srgbClr val="CEB97C"/>
+              </a:buClr>
+            </a:pPr>
+            <a:r>
+              <a:rPr lang="en-US" sz="3200" b="1" i="1" dirty="0">
+                <a:solidFill>
+                  <a:schemeClr val="tx2">
+                    <a:lumMod val="50000"/>
                   </a:schemeClr>
                 </a:solidFill>
                 <a:latin typeface="Consolas" panose="020B0609020204030204" pitchFamily="49" charset="0"/>
                 <a:ea typeface="Helvetica Neue Light" panose="02000403000000020004" pitchFamily="2" charset="0"/>
                 <a:cs typeface="Consolas" panose="020B0609020204030204" pitchFamily="49" charset="0"/>
               </a:rPr>
-              <a:t>test.sh</a:t>
-            </a:r>
-            <a:endParaRPr lang="en-US" sz="4400" b="1" dirty="0">
+              <a:t>Step 3: save the file and exit</a:t>
+            </a:r>
+          </a:p>
+          <a:p>
+            <a:pPr marL="12700" lvl="0">
+              <a:buClr>
+                <a:srgbClr val="CEB97C"/>
+              </a:buClr>
+            </a:pPr>
+            <a:endParaRPr lang="en-US" sz="3200" b="1" i="1" dirty="0">
               <a:solidFill>
-                <a:schemeClr val="accent1">
-                  <a:lumMod val="75000"/>
+                <a:schemeClr val="tx2">
+                  <a:lumMod val="50000"/>
                 </a:schemeClr>
               </a:solidFill>
               <a:latin typeface="Consolas" panose="020B0609020204030204" pitchFamily="49" charset="0"/>
@@ -23116,7 +23615,7 @@
           <p:cNvPr id="3" name="Date Placeholder 2">
             <a:extLst>
               <a:ext uri="{FF2B5EF4-FFF2-40B4-BE49-F238E27FC236}">
-                <a16:creationId xmlns:a16="http://schemas.microsoft.com/office/drawing/2014/main" id="{03E14D24-FDC7-7225-FB93-6F7DD09EDC16}"/>
+                <a16:creationId xmlns:a16="http://schemas.microsoft.com/office/drawing/2014/main" id="{9B003E57-FAFA-7DCD-147B-CC2D5108A436}"/>
               </a:ext>
             </a:extLst>
           </p:cNvPr>
@@ -23134,15 +23633,228 @@
           <a:p>
             <a:r>
               <a:rPr lang="en-US"/>
-              <a:t>1/8/2025</a:t>
-            </a:r>
+              <a:t>8/18/25</a:t>
+            </a:r>
+          </a:p>
+        </p:txBody>
+      </p:sp>
+      <p:sp>
+        <p:nvSpPr>
+          <p:cNvPr id="4" name="Footer Placeholder 3">
+            <a:extLst>
+              <a:ext uri="{FF2B5EF4-FFF2-40B4-BE49-F238E27FC236}">
+                <a16:creationId xmlns:a16="http://schemas.microsoft.com/office/drawing/2014/main" id="{D1725598-CC17-4E04-D31C-6FBE83210FBE}"/>
+              </a:ext>
+            </a:extLst>
+          </p:cNvPr>
+          <p:cNvSpPr>
+            <a:spLocks noGrp="1"/>
+          </p:cNvSpPr>
+          <p:nvPr>
+            <p:ph type="ftr" idx="11"/>
+          </p:nvPr>
+        </p:nvSpPr>
+        <p:spPr/>
+        <p:txBody>
+          <a:bodyPr/>
+          <a:lstStyle/>
+          <a:p>
+            <a:r>
+              <a:rPr lang="en-US"/>
+              <a:t>Logging in and Linux</a:t>
+            </a:r>
+          </a:p>
+        </p:txBody>
+      </p:sp>
+      <p:sp>
+        <p:nvSpPr>
+          <p:cNvPr id="8" name="Google Shape;224;p32">
+            <a:extLst>
+              <a:ext uri="{FF2B5EF4-FFF2-40B4-BE49-F238E27FC236}">
+                <a16:creationId xmlns:a16="http://schemas.microsoft.com/office/drawing/2014/main" id="{4ABE3AD7-AECD-63EA-0093-8B188980EFA3}"/>
+              </a:ext>
+            </a:extLst>
+          </p:cNvPr>
+          <p:cNvSpPr txBox="1"/>
+          <p:nvPr/>
+        </p:nvSpPr>
+        <p:spPr>
+          <a:xfrm>
+            <a:off x="2598472" y="3508376"/>
+            <a:ext cx="4296599" cy="1632220"/>
+          </a:xfrm>
+          <a:prstGeom prst="rect">
+            <a:avLst/>
+          </a:prstGeom>
+          <a:solidFill>
+            <a:schemeClr val="tx2">
+              <a:lumMod val="90000"/>
+            </a:schemeClr>
+          </a:solidFill>
+          <a:ln>
+            <a:solidFill>
+              <a:schemeClr val="tx1"/>
+            </a:solidFill>
+          </a:ln>
+        </p:spPr>
+        <p:txBody>
+          <a:bodyPr spcFirstLastPara="1" wrap="square" lIns="0" tIns="31475" rIns="0" bIns="0" anchor="t" anchorCtr="0">
+            <a:spAutoFit/>
+          </a:bodyPr>
+          <a:lstStyle/>
+          <a:p>
+            <a:pPr marL="29975" marR="0" lvl="0" indent="0" algn="l" rtl="0">
+              <a:spcBef>
+                <a:spcPts val="0"/>
+              </a:spcBef>
+              <a:spcAft>
+                <a:spcPts val="0"/>
+              </a:spcAft>
+              <a:buNone/>
+            </a:pPr>
+            <a:r>
+              <a:rPr lang="en-US" sz="2600" i="1" dirty="0">
+                <a:solidFill>
+                  <a:srgbClr val="3F7F7F"/>
+                </a:solidFill>
+                <a:latin typeface="Courier New"/>
+                <a:ea typeface="Courier New"/>
+                <a:cs typeface="Courier New"/>
+                <a:sym typeface="Courier New"/>
+              </a:rPr>
+              <a:t>#!/bin/bash</a:t>
+            </a:r>
+            <a:br>
+              <a:rPr lang="en-US" sz="2600" i="1" dirty="0">
+                <a:solidFill>
+                  <a:srgbClr val="3F7F7F"/>
+                </a:solidFill>
+                <a:latin typeface="Courier New"/>
+                <a:ea typeface="Courier New"/>
+                <a:cs typeface="Courier New"/>
+                <a:sym typeface="Courier New"/>
+              </a:rPr>
+            </a:br>
+            <a:r>
+              <a:rPr lang="en-US" sz="2600" i="1" dirty="0">
+                <a:solidFill>
+                  <a:srgbClr val="3F7F7F"/>
+                </a:solidFill>
+                <a:latin typeface="Courier New"/>
+                <a:ea typeface="Courier New"/>
+                <a:cs typeface="Courier New"/>
+                <a:sym typeface="Courier New"/>
+              </a:rPr>
+              <a:t># list files in /</a:t>
+            </a:r>
+            <a:r>
+              <a:rPr lang="en-US" sz="2600" i="1" dirty="0" err="1">
+                <a:solidFill>
+                  <a:srgbClr val="3F7F7F"/>
+                </a:solidFill>
+                <a:latin typeface="Courier New"/>
+                <a:ea typeface="Courier New"/>
+                <a:cs typeface="Courier New"/>
+                <a:sym typeface="Courier New"/>
+              </a:rPr>
+              <a:t>tmp</a:t>
+            </a:r>
+            <a:endParaRPr sz="2700" dirty="0">
+              <a:solidFill>
+                <a:schemeClr val="dk1"/>
+              </a:solidFill>
+              <a:latin typeface="Times New Roman"/>
+              <a:ea typeface="Times New Roman"/>
+              <a:cs typeface="Times New Roman"/>
+              <a:sym typeface="Times New Roman"/>
+            </a:endParaRPr>
+          </a:p>
+          <a:p>
+            <a:pPr marL="29975" marR="1212522" lvl="0" indent="0" algn="l" rtl="0">
+              <a:spcBef>
+                <a:spcPts val="0"/>
+              </a:spcBef>
+              <a:spcAft>
+                <a:spcPts val="0"/>
+              </a:spcAft>
+              <a:buNone/>
+            </a:pPr>
+            <a:r>
+              <a:rPr lang="en-US" sz="2600" dirty="0">
+                <a:solidFill>
+                  <a:srgbClr val="007F00"/>
+                </a:solidFill>
+                <a:latin typeface="Courier New"/>
+                <a:ea typeface="Courier New"/>
+                <a:cs typeface="Courier New"/>
+                <a:sym typeface="Courier New"/>
+              </a:rPr>
+              <a:t>cd </a:t>
+            </a:r>
+            <a:r>
+              <a:rPr lang="en-US" sz="2600" dirty="0">
+                <a:solidFill>
+                  <a:schemeClr val="dk1"/>
+                </a:solidFill>
+                <a:latin typeface="Courier New"/>
+                <a:ea typeface="Courier New"/>
+                <a:cs typeface="Courier New"/>
+                <a:sym typeface="Courier New"/>
+              </a:rPr>
+              <a:t>/</a:t>
+            </a:r>
+            <a:r>
+              <a:rPr lang="en-US" sz="2600" dirty="0" err="1">
+                <a:solidFill>
+                  <a:schemeClr val="dk1"/>
+                </a:solidFill>
+                <a:latin typeface="Courier New"/>
+                <a:ea typeface="Courier New"/>
+                <a:cs typeface="Courier New"/>
+                <a:sym typeface="Courier New"/>
+              </a:rPr>
+              <a:t>tmp</a:t>
+            </a:r>
+            <a:endParaRPr lang="en-US" sz="2600" dirty="0">
+              <a:solidFill>
+                <a:schemeClr val="dk1"/>
+              </a:solidFill>
+              <a:latin typeface="Courier New"/>
+              <a:ea typeface="Courier New"/>
+              <a:cs typeface="Courier New"/>
+              <a:sym typeface="Courier New"/>
+            </a:endParaRPr>
+          </a:p>
+          <a:p>
+            <a:pPr marL="29975" marR="1212522" lvl="0" indent="0" algn="l" rtl="0">
+              <a:spcBef>
+                <a:spcPts val="0"/>
+              </a:spcBef>
+              <a:spcAft>
+                <a:spcPts val="0"/>
+              </a:spcAft>
+              <a:buNone/>
+            </a:pPr>
+            <a:r>
+              <a:rPr lang="en-US" sz="2600" dirty="0">
+                <a:solidFill>
+                  <a:schemeClr val="dk1"/>
+                </a:solidFill>
+                <a:latin typeface="Courier New"/>
+                <a:ea typeface="Courier New"/>
+                <a:cs typeface="Courier New"/>
+                <a:sym typeface="Courier New"/>
+              </a:rPr>
+              <a:t>ls </a:t>
+            </a:r>
+            <a:endParaRPr dirty="0"/>
           </a:p>
         </p:txBody>
       </p:sp>
     </p:spTree>
     <p:extLst>
       <p:ext uri="{BB962C8B-B14F-4D97-AF65-F5344CB8AC3E}">
-        <p14:creationId xmlns:p14="http://schemas.microsoft.com/office/powerpoint/2010/main" val="3268758884"/>
+        <p14:creationId xmlns:p14="http://schemas.microsoft.com/office/powerpoint/2010/main" val="3304371464"/>
       </p:ext>
     </p:extLst>
   </p:cSld>
@@ -23192,11 +23904,11 @@
           <a:p>
             <a:r>
               <a:rPr lang="en-US" dirty="0"/>
-              <a:t>Run </a:t>
+              <a:t>Now run </a:t>
             </a:r>
             <a:r>
               <a:rPr lang="en-US" dirty="0" err="1"/>
-              <a:t>hello.sh</a:t>
+              <a:t>test.sh</a:t>
             </a:r>
             <a:endParaRPr lang="en-US" dirty="0"/>
           </a:p>
@@ -23242,10 +23954,66 @@
       </p:sp>
       <p:sp>
         <p:nvSpPr>
-          <p:cNvPr id="7" name="Google Shape;391;p33">
+          <p:cNvPr id="3" name="Date Placeholder 2">
             <a:extLst>
               <a:ext uri="{FF2B5EF4-FFF2-40B4-BE49-F238E27FC236}">
-                <a16:creationId xmlns:a16="http://schemas.microsoft.com/office/drawing/2014/main" id="{584653C5-4DCD-4D2F-BF0E-1A0F9D1F50B2}"/>
+                <a16:creationId xmlns:a16="http://schemas.microsoft.com/office/drawing/2014/main" id="{03E14D24-FDC7-7225-FB93-6F7DD09EDC16}"/>
+              </a:ext>
+            </a:extLst>
+          </p:cNvPr>
+          <p:cNvSpPr>
+            <a:spLocks noGrp="1"/>
+          </p:cNvSpPr>
+          <p:nvPr>
+            <p:ph type="dt" idx="10"/>
+          </p:nvPr>
+        </p:nvSpPr>
+        <p:spPr/>
+        <p:txBody>
+          <a:bodyPr/>
+          <a:lstStyle/>
+          <a:p>
+            <a:r>
+              <a:rPr lang="en-US" dirty="0"/>
+              <a:t>8/18/25</a:t>
+            </a:r>
+          </a:p>
+        </p:txBody>
+      </p:sp>
+      <p:sp>
+        <p:nvSpPr>
+          <p:cNvPr id="4" name="Footer Placeholder 3">
+            <a:extLst>
+              <a:ext uri="{FF2B5EF4-FFF2-40B4-BE49-F238E27FC236}">
+                <a16:creationId xmlns:a16="http://schemas.microsoft.com/office/drawing/2014/main" id="{6BB2EBD6-DC37-7660-E162-D52AF92FDBBD}"/>
+              </a:ext>
+            </a:extLst>
+          </p:cNvPr>
+          <p:cNvSpPr>
+            <a:spLocks noGrp="1"/>
+          </p:cNvSpPr>
+          <p:nvPr>
+            <p:ph type="ftr" idx="11"/>
+          </p:nvPr>
+        </p:nvSpPr>
+        <p:spPr/>
+        <p:txBody>
+          <a:bodyPr/>
+          <a:lstStyle/>
+          <a:p>
+            <a:r>
+              <a:rPr lang="en-US"/>
+              <a:t>Logging in and Linux</a:t>
+            </a:r>
+          </a:p>
+        </p:txBody>
+      </p:sp>
+      <p:sp>
+        <p:nvSpPr>
+          <p:cNvPr id="5" name="Google Shape;391;p33">
+            <a:extLst>
+              <a:ext uri="{FF2B5EF4-FFF2-40B4-BE49-F238E27FC236}">
+                <a16:creationId xmlns:a16="http://schemas.microsoft.com/office/drawing/2014/main" id="{21AB977D-9D9E-CCEB-60CE-B8867144205B}"/>
               </a:ext>
             </a:extLst>
           </p:cNvPr>
@@ -23254,8 +24022,8 @@
         </p:nvSpPr>
         <p:spPr>
           <a:xfrm>
-            <a:off x="959457" y="1931069"/>
-            <a:ext cx="10273085" cy="2047986"/>
+            <a:off x="923037" y="1837094"/>
+            <a:ext cx="10273085" cy="3648425"/>
           </a:xfrm>
           <a:prstGeom prst="rect">
             <a:avLst/>
@@ -23271,16 +24039,27 @@
           </a:bodyPr>
           <a:lstStyle/>
           <a:p>
-            <a:pPr marL="12700" marR="0" lvl="0" algn="l" rtl="0">
-              <a:lnSpc>
-                <a:spcPct val="100000"/>
-              </a:lnSpc>
-              <a:spcBef>
-                <a:spcPts val="0"/>
-              </a:spcBef>
-              <a:spcAft>
-                <a:spcPts val="0"/>
-              </a:spcAft>
+            <a:pPr marL="12700" lvl="0">
+              <a:buClr>
+                <a:srgbClr val="CEB97C"/>
+              </a:buClr>
+            </a:pPr>
+            <a:r>
+              <a:rPr lang="en-US" sz="3200" b="1" i="1" dirty="0">
+                <a:solidFill>
+                  <a:schemeClr val="tx2">
+                    <a:lumMod val="50000"/>
+                  </a:schemeClr>
+                </a:solidFill>
+                <a:latin typeface="Consolas" panose="020B0609020204030204" pitchFamily="49" charset="0"/>
+                <a:ea typeface="Helvetica Neue Light" panose="02000403000000020004" pitchFamily="2" charset="0"/>
+                <a:cs typeface="Consolas" panose="020B0609020204030204" pitchFamily="49" charset="0"/>
+              </a:rPr>
+              <a:t>Step 4: make the script executable</a:t>
+            </a:r>
+          </a:p>
+          <a:p>
+            <a:pPr marL="12700" lvl="0">
               <a:buClr>
                 <a:srgbClr val="CEB97C"/>
               </a:buClr>
@@ -23348,7 +24127,7 @@
                 <a:ea typeface="Helvetica Neue Light" panose="02000403000000020004" pitchFamily="2" charset="0"/>
                 <a:cs typeface="Consolas" panose="020B0609020204030204" pitchFamily="49" charset="0"/>
               </a:rPr>
-              <a:t>hello.sh</a:t>
+              <a:t>test.sh</a:t>
             </a:r>
             <a:endParaRPr lang="en-US" sz="4400" b="1" dirty="0">
               <a:solidFill>
@@ -23362,20 +24141,91 @@
             </a:endParaRPr>
           </a:p>
           <a:p>
-            <a:pPr marL="12700" marR="0" lvl="0" algn="l" rtl="0">
-              <a:lnSpc>
-                <a:spcPct val="100000"/>
-              </a:lnSpc>
-              <a:spcBef>
-                <a:spcPts val="0"/>
-              </a:spcBef>
-              <a:spcAft>
-                <a:spcPts val="0"/>
-              </a:spcAft>
+            <a:pPr marL="12700" lvl="0">
               <a:buClr>
                 <a:srgbClr val="CEB97C"/>
               </a:buClr>
             </a:pPr>
+            <a:endParaRPr lang="en-US" sz="1000" b="1" dirty="0">
+              <a:solidFill>
+                <a:schemeClr val="accent1">
+                  <a:lumMod val="75000"/>
+                </a:schemeClr>
+              </a:solidFill>
+              <a:latin typeface="Consolas" panose="020B0609020204030204" pitchFamily="49" charset="0"/>
+              <a:ea typeface="Helvetica Neue Light" panose="02000403000000020004" pitchFamily="2" charset="0"/>
+              <a:cs typeface="Consolas" panose="020B0609020204030204" pitchFamily="49" charset="0"/>
+            </a:endParaRPr>
+          </a:p>
+          <a:p>
+            <a:pPr marL="12700" lvl="0">
+              <a:buClr>
+                <a:srgbClr val="CEB97C"/>
+              </a:buClr>
+            </a:pPr>
+            <a:endParaRPr lang="en-US" sz="1000" b="1" i="1" dirty="0">
+              <a:solidFill>
+                <a:schemeClr val="accent1">
+                  <a:lumMod val="75000"/>
+                </a:schemeClr>
+              </a:solidFill>
+              <a:latin typeface="Consolas" panose="020B0609020204030204" pitchFamily="49" charset="0"/>
+              <a:ea typeface="Helvetica Neue Light" panose="02000403000000020004" pitchFamily="2" charset="0"/>
+              <a:cs typeface="Consolas" panose="020B0609020204030204" pitchFamily="49" charset="0"/>
+            </a:endParaRPr>
+          </a:p>
+          <a:p>
+            <a:pPr marL="12700">
+              <a:buClr>
+                <a:srgbClr val="CEB97C"/>
+              </a:buClr>
+            </a:pPr>
+            <a:r>
+              <a:rPr lang="en-US" sz="3200" b="1" i="1" dirty="0">
+                <a:solidFill>
+                  <a:schemeClr val="tx2">
+                    <a:lumMod val="50000"/>
+                  </a:schemeClr>
+                </a:solidFill>
+                <a:latin typeface="Consolas" panose="020B0609020204030204" pitchFamily="49" charset="0"/>
+                <a:ea typeface="Helvetica Neue Light" panose="02000403000000020004" pitchFamily="2" charset="0"/>
+                <a:cs typeface="Consolas" panose="020B0609020204030204" pitchFamily="49" charset="0"/>
+              </a:rPr>
+              <a:t>Step 5: run the script:</a:t>
+            </a:r>
+          </a:p>
+          <a:p>
+            <a:pPr marL="12700">
+              <a:buClr>
+                <a:srgbClr val="CEB97C"/>
+              </a:buClr>
+            </a:pPr>
+            <a:r>
+              <a:rPr lang="en-US" sz="4400" b="1" dirty="0">
+                <a:solidFill>
+                  <a:schemeClr val="accent1">
+                    <a:lumMod val="75000"/>
+                  </a:schemeClr>
+                </a:solidFill>
+                <a:latin typeface="Consolas" panose="020B0609020204030204" pitchFamily="49" charset="0"/>
+                <a:ea typeface="Helvetica Neue Light" panose="02000403000000020004" pitchFamily="2" charset="0"/>
+                <a:cs typeface="Consolas" panose="020B0609020204030204" pitchFamily="49" charset="0"/>
+              </a:rPr>
+              <a:t>./</a:t>
+            </a:r>
+            <a:r>
+              <a:rPr lang="en-US" sz="4400" b="1" dirty="0" err="1">
+                <a:solidFill>
+                  <a:schemeClr val="accent1">
+                    <a:lumMod val="75000"/>
+                  </a:schemeClr>
+                </a:solidFill>
+                <a:latin typeface="Consolas" panose="020B0609020204030204" pitchFamily="49" charset="0"/>
+                <a:ea typeface="Helvetica Neue Light" panose="02000403000000020004" pitchFamily="2" charset="0"/>
+                <a:cs typeface="Consolas" panose="020B0609020204030204" pitchFamily="49" charset="0"/>
+              </a:rPr>
+              <a:t>test.sh</a:t>
+            </a:r>
             <a:endParaRPr lang="en-US" sz="4400" b="1" dirty="0">
               <a:solidFill>
                 <a:schemeClr val="accent1">
@@ -23388,50 +24238,15 @@
             </a:endParaRPr>
           </a:p>
           <a:p>
-            <a:pPr marL="12700" marR="0" lvl="0" algn="l" rtl="0">
-              <a:lnSpc>
-                <a:spcPct val="100000"/>
-              </a:lnSpc>
-              <a:spcBef>
-                <a:spcPts val="0"/>
-              </a:spcBef>
-              <a:spcAft>
-                <a:spcPts val="0"/>
-              </a:spcAft>
+            <a:pPr marL="12700">
               <a:buClr>
                 <a:srgbClr val="CEB97C"/>
               </a:buClr>
             </a:pPr>
-            <a:r>
-              <a:rPr lang="en-US" sz="4400" b="1" dirty="0">
-                <a:solidFill>
-                  <a:schemeClr val="accent1">
-                    <a:lumMod val="75000"/>
-                  </a:schemeClr>
-                </a:solidFill>
-                <a:latin typeface="Consolas" panose="020B0609020204030204" pitchFamily="49" charset="0"/>
-                <a:ea typeface="Helvetica Neue Light" panose="02000403000000020004" pitchFamily="2" charset="0"/>
-                <a:cs typeface="Consolas" panose="020B0609020204030204" pitchFamily="49" charset="0"/>
-              </a:rPr>
-              <a:t>./</a:t>
-            </a:r>
-            <a:r>
-              <a:rPr lang="en-US" sz="4400" b="1" dirty="0" err="1">
-                <a:solidFill>
-                  <a:schemeClr val="accent1">
-                    <a:lumMod val="75000"/>
-                  </a:schemeClr>
-                </a:solidFill>
-                <a:latin typeface="Consolas" panose="020B0609020204030204" pitchFamily="49" charset="0"/>
-                <a:ea typeface="Helvetica Neue Light" panose="02000403000000020004" pitchFamily="2" charset="0"/>
-                <a:cs typeface="Consolas" panose="020B0609020204030204" pitchFamily="49" charset="0"/>
-              </a:rPr>
-              <a:t>hello.sh</a:t>
-            </a:r>
-            <a:endParaRPr lang="en-US" sz="4400" b="1" dirty="0">
+            <a:endParaRPr lang="en-US" sz="3200" b="1" i="1" dirty="0">
               <a:solidFill>
-                <a:schemeClr val="accent1">
-                  <a:lumMod val="75000"/>
+                <a:schemeClr val="tx2">
+                  <a:lumMod val="50000"/>
                 </a:schemeClr>
               </a:solidFill>
               <a:latin typeface="Consolas" panose="020B0609020204030204" pitchFamily="49" charset="0"/>
@@ -23439,40 +24254,29 @@
               <a:cs typeface="Consolas" panose="020B0609020204030204" pitchFamily="49" charset="0"/>
             </a:endParaRPr>
           </a:p>
-        </p:txBody>
-      </p:sp>
-      <p:sp>
-        <p:nvSpPr>
-          <p:cNvPr id="3" name="Date Placeholder 2">
-            <a:extLst>
-              <a:ext uri="{FF2B5EF4-FFF2-40B4-BE49-F238E27FC236}">
-                <a16:creationId xmlns:a16="http://schemas.microsoft.com/office/drawing/2014/main" id="{96E88D48-B741-7865-3C90-8B31DA7DC1C6}"/>
-              </a:ext>
-            </a:extLst>
-          </p:cNvPr>
-          <p:cNvSpPr>
-            <a:spLocks noGrp="1"/>
-          </p:cNvSpPr>
-          <p:nvPr>
-            <p:ph type="dt" idx="10"/>
-          </p:nvPr>
-        </p:nvSpPr>
-        <p:spPr/>
-        <p:txBody>
-          <a:bodyPr/>
-          <a:lstStyle/>
-          <a:p>
-            <a:r>
-              <a:rPr lang="en-US"/>
-              <a:t>1/8/2025</a:t>
-            </a:r>
+          <a:p>
+            <a:pPr marL="12700" lvl="0">
+              <a:buClr>
+                <a:srgbClr val="CEB97C"/>
+              </a:buClr>
+            </a:pPr>
+            <a:endParaRPr lang="en-US" sz="3200" b="1" i="1" dirty="0">
+              <a:solidFill>
+                <a:schemeClr val="tx2">
+                  <a:lumMod val="50000"/>
+                </a:schemeClr>
+              </a:solidFill>
+              <a:latin typeface="Consolas" panose="020B0609020204030204" pitchFamily="49" charset="0"/>
+              <a:ea typeface="Helvetica Neue Light" panose="02000403000000020004" pitchFamily="2" charset="0"/>
+              <a:cs typeface="Consolas" panose="020B0609020204030204" pitchFamily="49" charset="0"/>
+            </a:endParaRPr>
           </a:p>
         </p:txBody>
       </p:sp>
     </p:spTree>
     <p:extLst>
       <p:ext uri="{BB962C8B-B14F-4D97-AF65-F5344CB8AC3E}">
-        <p14:creationId xmlns:p14="http://schemas.microsoft.com/office/powerpoint/2010/main" val="2378174557"/>
+        <p14:creationId xmlns:p14="http://schemas.microsoft.com/office/powerpoint/2010/main" val="3268758884"/>
       </p:ext>
     </p:extLst>
   </p:cSld>
@@ -23748,7 +24552,7 @@
           <a:p>
             <a:r>
               <a:rPr lang="en-US"/>
-              <a:t>1/8/2025</a:t>
+              <a:t>8/18/25</a:t>
             </a:r>
           </a:p>
         </p:txBody>
@@ -23788,6 +24592,34 @@
               <a:t>29</a:t>
             </a:fld>
             <a:endParaRPr lang="en-US"/>
+          </a:p>
+        </p:txBody>
+      </p:sp>
+      <p:sp>
+        <p:nvSpPr>
+          <p:cNvPr id="3" name="Footer Placeholder 2">
+            <a:extLst>
+              <a:ext uri="{FF2B5EF4-FFF2-40B4-BE49-F238E27FC236}">
+                <a16:creationId xmlns:a16="http://schemas.microsoft.com/office/drawing/2014/main" id="{DD44A30F-9940-5CBB-FCEA-820E40AB1029}"/>
+              </a:ext>
+            </a:extLst>
+          </p:cNvPr>
+          <p:cNvSpPr>
+            <a:spLocks noGrp="1"/>
+          </p:cNvSpPr>
+          <p:nvPr>
+            <p:ph type="ftr" idx="11"/>
+          </p:nvPr>
+        </p:nvSpPr>
+        <p:spPr/>
+        <p:txBody>
+          <a:bodyPr/>
+          <a:lstStyle/>
+          <a:p>
+            <a:r>
+              <a:rPr lang="en-US"/>
+              <a:t>Logging in and Linux</a:t>
+            </a:r>
           </a:p>
         </p:txBody>
       </p:sp>
@@ -24551,7 +25383,35 @@
           <a:p>
             <a:r>
               <a:rPr lang="en-US"/>
-              <a:t>1/8/2025</a:t>
+              <a:t>8/18/25</a:t>
+            </a:r>
+          </a:p>
+        </p:txBody>
+      </p:sp>
+      <p:sp>
+        <p:nvSpPr>
+          <p:cNvPr id="4" name="Footer Placeholder 3">
+            <a:extLst>
+              <a:ext uri="{FF2B5EF4-FFF2-40B4-BE49-F238E27FC236}">
+                <a16:creationId xmlns:a16="http://schemas.microsoft.com/office/drawing/2014/main" id="{A926C182-92D0-AF43-F8B9-3BB6A247122C}"/>
+              </a:ext>
+            </a:extLst>
+          </p:cNvPr>
+          <p:cNvSpPr>
+            <a:spLocks noGrp="1"/>
+          </p:cNvSpPr>
+          <p:nvPr>
+            <p:ph type="ftr" idx="11"/>
+          </p:nvPr>
+        </p:nvSpPr>
+        <p:spPr/>
+        <p:txBody>
+          <a:bodyPr/>
+          <a:lstStyle/>
+          <a:p>
+            <a:r>
+              <a:rPr lang="en-US"/>
+              <a:t>Logging in and Linux</a:t>
             </a:r>
           </a:p>
         </p:txBody>
@@ -25200,7 +26060,35 @@
           <a:p>
             <a:r>
               <a:rPr lang="en-US"/>
-              <a:t>1/8/2025</a:t>
+              <a:t>8/18/25</a:t>
+            </a:r>
+          </a:p>
+        </p:txBody>
+      </p:sp>
+      <p:sp>
+        <p:nvSpPr>
+          <p:cNvPr id="4" name="Footer Placeholder 3">
+            <a:extLst>
+              <a:ext uri="{FF2B5EF4-FFF2-40B4-BE49-F238E27FC236}">
+                <a16:creationId xmlns:a16="http://schemas.microsoft.com/office/drawing/2014/main" id="{A94696C1-498E-9F63-1B5C-50E78B6B40E8}"/>
+              </a:ext>
+            </a:extLst>
+          </p:cNvPr>
+          <p:cNvSpPr>
+            <a:spLocks noGrp="1"/>
+          </p:cNvSpPr>
+          <p:nvPr>
+            <p:ph type="ftr" idx="11"/>
+          </p:nvPr>
+        </p:nvSpPr>
+        <p:spPr/>
+        <p:txBody>
+          <a:bodyPr/>
+          <a:lstStyle/>
+          <a:p>
+            <a:r>
+              <a:rPr lang="en-US"/>
+              <a:t>Logging in and Linux</a:t>
             </a:r>
           </a:p>
         </p:txBody>
@@ -25223,7 +26111,7 @@
   <p:cSld>
     <p:spTree>
       <p:nvGrpSpPr>
-        <p:cNvPr id="1" name=""/>
+        <p:cNvPr id="1" name="Shape 897"/>
         <p:cNvGrpSpPr/>
         <p:nvPr/>
       </p:nvGrpSpPr>
@@ -25237,10 +26125,52 @@
       </p:grpSpPr>
       <p:sp>
         <p:nvSpPr>
-          <p:cNvPr id="2" name="Title 1">
+          <p:cNvPr id="898" name="Google Shape;898;p76"/>
+          <p:cNvSpPr txBox="1">
+            <a:spLocks noGrp="1"/>
+          </p:cNvSpPr>
+          <p:nvPr>
+            <p:ph type="title"/>
+          </p:nvPr>
+        </p:nvSpPr>
+        <p:spPr>
+          <a:xfrm>
+            <a:off x="838200" y="365125"/>
+            <a:ext cx="10515600" cy="1325700"/>
+          </a:xfrm>
+          <a:prstGeom prst="rect">
+            <a:avLst/>
+          </a:prstGeom>
+        </p:spPr>
+        <p:txBody>
+          <a:bodyPr spcFirstLastPara="1" wrap="square" lIns="91425" tIns="45700" rIns="91425" bIns="45700" anchor="ctr" anchorCtr="0">
+            <a:normAutofit/>
+          </a:bodyPr>
+          <a:lstStyle/>
+          <a:p>
+            <a:pPr marL="0" lvl="0" indent="0" algn="l" rtl="0">
+              <a:spcBef>
+                <a:spcPts val="0"/>
+              </a:spcBef>
+              <a:spcAft>
+                <a:spcPts val="0"/>
+              </a:spcAft>
+              <a:buNone/>
+            </a:pPr>
+            <a:r>
+              <a:rPr lang="en-US" dirty="0"/>
+              <a:t>Thank you!	Questions?</a:t>
+            </a:r>
+            <a:endParaRPr dirty="0"/>
+          </a:p>
+        </p:txBody>
+      </p:sp>
+      <p:sp>
+        <p:nvSpPr>
+          <p:cNvPr id="3" name="Footer Placeholder 2">
             <a:extLst>
               <a:ext uri="{FF2B5EF4-FFF2-40B4-BE49-F238E27FC236}">
-                <a16:creationId xmlns:a16="http://schemas.microsoft.com/office/drawing/2014/main" id="{D332E882-BA6F-885D-6120-8BD3DAFDA0F1}"/>
+                <a16:creationId xmlns:a16="http://schemas.microsoft.com/office/drawing/2014/main" id="{3B1D5E10-29EE-DA80-1400-6FD3CFD802A9}"/>
               </a:ext>
             </a:extLst>
           </p:cNvPr>
@@ -25248,7 +26178,7 @@
             <a:spLocks noGrp="1"/>
           </p:cNvSpPr>
           <p:nvPr>
-            <p:ph type="title"/>
+            <p:ph type="ftr" idx="11"/>
           </p:nvPr>
         </p:nvSpPr>
         <p:spPr/>
@@ -25258,35 +26188,34 @@
           <a:p>
             <a:r>
               <a:rPr lang="en-US" dirty="0"/>
-              <a:t>Run </a:t>
-            </a:r>
-            <a:r>
-              <a:rPr lang="en-US" dirty="0" err="1"/>
-              <a:t>variables_scope.sh</a:t>
-            </a:r>
-            <a:endParaRPr lang="en-US" dirty="0"/>
+              <a:t>Working with Linux on HPC</a:t>
+            </a:r>
           </a:p>
         </p:txBody>
       </p:sp>
       <p:sp>
         <p:nvSpPr>
-          <p:cNvPr id="6" name="Slide Number Placeholder 5">
-            <a:extLst>
-              <a:ext uri="{FF2B5EF4-FFF2-40B4-BE49-F238E27FC236}">
-                <a16:creationId xmlns:a16="http://schemas.microsoft.com/office/drawing/2014/main" id="{C10D4CAF-BAB8-1E92-3114-9F8BC35DAD92}"/>
-              </a:ext>
-            </a:extLst>
-          </p:cNvPr>
-          <p:cNvSpPr>
+          <p:cNvPr id="900" name="Google Shape;900;p76"/>
+          <p:cNvSpPr txBox="1">
             <a:spLocks noGrp="1"/>
           </p:cNvSpPr>
           <p:nvPr>
             <p:ph type="sldNum" idx="12"/>
           </p:nvPr>
         </p:nvSpPr>
-        <p:spPr/>
+        <p:spPr>
+          <a:xfrm>
+            <a:off x="8610600" y="6356350"/>
+            <a:ext cx="682800" cy="365100"/>
+          </a:xfrm>
+          <a:prstGeom prst="rect">
+            <a:avLst/>
+          </a:prstGeom>
+        </p:spPr>
         <p:txBody>
-          <a:bodyPr/>
+          <a:bodyPr spcFirstLastPara="1" wrap="square" lIns="91425" tIns="45700" rIns="91425" bIns="45700" anchor="ctr" anchorCtr="0">
+            <a:noAutofit/>
+          </a:bodyPr>
           <a:lstStyle/>
           <a:p>
             <a:pPr marL="0" lvl="0" indent="0" algn="l" rtl="0">
@@ -25296,223 +26225,27 @@
               <a:spcAft>
                 <a:spcPts val="0"/>
               </a:spcAft>
+              <a:buClr>
+                <a:srgbClr val="000000"/>
+              </a:buClr>
+              <a:buSzPts val="1200"/>
+              <a:buFont typeface="Arial"/>
               <a:buNone/>
             </a:pPr>
             <a:fld id="{00000000-1234-1234-1234-123412341234}" type="slidenum">
-              <a:rPr lang="en-US" smtClean="0"/>
+              <a:rPr lang="en-US"/>
               <a:t>31</a:t>
             </a:fld>
-            <a:endParaRPr lang="en-US"/>
+            <a:endParaRPr/>
           </a:p>
         </p:txBody>
       </p:sp>
       <p:sp>
         <p:nvSpPr>
-          <p:cNvPr id="7" name="Google Shape;391;p33">
+          <p:cNvPr id="4" name="Date Placeholder 2">
             <a:extLst>
               <a:ext uri="{FF2B5EF4-FFF2-40B4-BE49-F238E27FC236}">
-                <a16:creationId xmlns:a16="http://schemas.microsoft.com/office/drawing/2014/main" id="{584653C5-4DCD-4D2F-BF0E-1A0F9D1F50B2}"/>
-              </a:ext>
-            </a:extLst>
-          </p:cNvPr>
-          <p:cNvSpPr txBox="1"/>
-          <p:nvPr/>
-        </p:nvSpPr>
-        <p:spPr>
-          <a:xfrm>
-            <a:off x="959457" y="1931069"/>
-            <a:ext cx="10273085" cy="2047986"/>
-          </a:xfrm>
-          <a:prstGeom prst="rect">
-            <a:avLst/>
-          </a:prstGeom>
-          <a:noFill/>
-          <a:ln>
-            <a:noFill/>
-          </a:ln>
-        </p:spPr>
-        <p:txBody>
-          <a:bodyPr spcFirstLastPara="1" wrap="square" lIns="0" tIns="16500" rIns="0" bIns="0" anchor="t" anchorCtr="0">
-            <a:spAutoFit/>
-          </a:bodyPr>
-          <a:lstStyle/>
-          <a:p>
-            <a:pPr marL="12700" marR="0" lvl="0" algn="l" rtl="0">
-              <a:lnSpc>
-                <a:spcPct val="100000"/>
-              </a:lnSpc>
-              <a:spcBef>
-                <a:spcPts val="0"/>
-              </a:spcBef>
-              <a:spcAft>
-                <a:spcPts val="0"/>
-              </a:spcAft>
-              <a:buClr>
-                <a:srgbClr val="CEB97C"/>
-              </a:buClr>
-            </a:pPr>
-            <a:r>
-              <a:rPr lang="en-US" sz="4400" b="1" dirty="0" err="1">
-                <a:solidFill>
-                  <a:schemeClr val="accent1">
-                    <a:lumMod val="75000"/>
-                  </a:schemeClr>
-                </a:solidFill>
-                <a:latin typeface="Consolas" panose="020B0609020204030204" pitchFamily="49" charset="0"/>
-                <a:ea typeface="Helvetica Neue Light" panose="02000403000000020004" pitchFamily="2" charset="0"/>
-                <a:cs typeface="Consolas" panose="020B0609020204030204" pitchFamily="49" charset="0"/>
-              </a:rPr>
-              <a:t>chmod</a:t>
-            </a:r>
-            <a:r>
-              <a:rPr lang="en-US" sz="4400" b="1" dirty="0">
-                <a:solidFill>
-                  <a:schemeClr val="accent1">
-                    <a:lumMod val="75000"/>
-                  </a:schemeClr>
-                </a:solidFill>
-                <a:latin typeface="Consolas" panose="020B0609020204030204" pitchFamily="49" charset="0"/>
-                <a:ea typeface="Helvetica Neue Light" panose="02000403000000020004" pitchFamily="2" charset="0"/>
-                <a:cs typeface="Consolas" panose="020B0609020204030204" pitchFamily="49" charset="0"/>
-              </a:rPr>
-              <a:t> </a:t>
-            </a:r>
-            <a:r>
-              <a:rPr lang="en-US" sz="4400" b="1" dirty="0" err="1">
-                <a:solidFill>
-                  <a:schemeClr val="accent1">
-                    <a:lumMod val="75000"/>
-                  </a:schemeClr>
-                </a:solidFill>
-                <a:latin typeface="Consolas" panose="020B0609020204030204" pitchFamily="49" charset="0"/>
-                <a:ea typeface="Helvetica Neue Light" panose="02000403000000020004" pitchFamily="2" charset="0"/>
-                <a:cs typeface="Consolas" panose="020B0609020204030204" pitchFamily="49" charset="0"/>
-              </a:rPr>
-              <a:t>u+x</a:t>
-            </a:r>
-            <a:r>
-              <a:rPr lang="en-US" sz="4400" b="1" dirty="0">
-                <a:solidFill>
-                  <a:schemeClr val="accent1">
-                    <a:lumMod val="75000"/>
-                  </a:schemeClr>
-                </a:solidFill>
-                <a:latin typeface="Consolas" panose="020B0609020204030204" pitchFamily="49" charset="0"/>
-                <a:ea typeface="Helvetica Neue Light" panose="02000403000000020004" pitchFamily="2" charset="0"/>
-                <a:cs typeface="Consolas" panose="020B0609020204030204" pitchFamily="49" charset="0"/>
-              </a:rPr>
-              <a:t> </a:t>
-            </a:r>
-            <a:r>
-              <a:rPr lang="en-US" sz="4400" b="1" dirty="0" err="1">
-                <a:solidFill>
-                  <a:schemeClr val="accent1">
-                    <a:lumMod val="75000"/>
-                  </a:schemeClr>
-                </a:solidFill>
-                <a:latin typeface="Consolas" panose="020B0609020204030204" pitchFamily="49" charset="0"/>
-                <a:ea typeface="Helvetica Neue Light" panose="02000403000000020004" pitchFamily="2" charset="0"/>
-                <a:cs typeface="Consolas" panose="020B0609020204030204" pitchFamily="49" charset="0"/>
-              </a:rPr>
-              <a:t>variables_scope.sh</a:t>
-            </a:r>
-            <a:endParaRPr lang="en-US" sz="4400" b="1" dirty="0">
-              <a:solidFill>
-                <a:schemeClr val="accent1">
-                  <a:lumMod val="75000"/>
-                </a:schemeClr>
-              </a:solidFill>
-              <a:latin typeface="Consolas" panose="020B0609020204030204" pitchFamily="49" charset="0"/>
-              <a:ea typeface="Helvetica Neue Light" panose="02000403000000020004" pitchFamily="2" charset="0"/>
-              <a:cs typeface="Consolas" panose="020B0609020204030204" pitchFamily="49" charset="0"/>
-            </a:endParaRPr>
-          </a:p>
-          <a:p>
-            <a:pPr marL="12700" marR="0" lvl="0" algn="l" rtl="0">
-              <a:lnSpc>
-                <a:spcPct val="100000"/>
-              </a:lnSpc>
-              <a:spcBef>
-                <a:spcPts val="0"/>
-              </a:spcBef>
-              <a:spcAft>
-                <a:spcPts val="0"/>
-              </a:spcAft>
-              <a:buClr>
-                <a:srgbClr val="CEB97C"/>
-              </a:buClr>
-            </a:pPr>
-            <a:endParaRPr lang="en-US" sz="4400" b="1" dirty="0">
-              <a:solidFill>
-                <a:schemeClr val="accent1">
-                  <a:lumMod val="75000"/>
-                </a:schemeClr>
-              </a:solidFill>
-              <a:latin typeface="Consolas" panose="020B0609020204030204" pitchFamily="49" charset="0"/>
-              <a:ea typeface="Helvetica Neue Light" panose="02000403000000020004" pitchFamily="2" charset="0"/>
-              <a:cs typeface="Consolas" panose="020B0609020204030204" pitchFamily="49" charset="0"/>
-            </a:endParaRPr>
-          </a:p>
-          <a:p>
-            <a:pPr marL="12700" marR="0" lvl="0" algn="l" rtl="0">
-              <a:lnSpc>
-                <a:spcPct val="100000"/>
-              </a:lnSpc>
-              <a:spcBef>
-                <a:spcPts val="0"/>
-              </a:spcBef>
-              <a:spcAft>
-                <a:spcPts val="0"/>
-              </a:spcAft>
-              <a:buClr>
-                <a:srgbClr val="CEB97C"/>
-              </a:buClr>
-            </a:pPr>
-            <a:r>
-              <a:rPr lang="en-US" sz="4400" b="1" dirty="0">
-                <a:solidFill>
-                  <a:schemeClr val="accent1">
-                    <a:lumMod val="75000"/>
-                  </a:schemeClr>
-                </a:solidFill>
-                <a:latin typeface="Consolas" panose="020B0609020204030204" pitchFamily="49" charset="0"/>
-                <a:ea typeface="Helvetica Neue Light" panose="02000403000000020004" pitchFamily="2" charset="0"/>
-                <a:cs typeface="Consolas" panose="020B0609020204030204" pitchFamily="49" charset="0"/>
-              </a:rPr>
-              <a:t>./</a:t>
-            </a:r>
-            <a:r>
-              <a:rPr lang="en-US" sz="4400" b="1" dirty="0" err="1">
-                <a:solidFill>
-                  <a:schemeClr val="accent1">
-                    <a:lumMod val="75000"/>
-                  </a:schemeClr>
-                </a:solidFill>
-                <a:latin typeface="Consolas" panose="020B0609020204030204" pitchFamily="49" charset="0"/>
-                <a:ea typeface="Helvetica Neue Light" panose="02000403000000020004" pitchFamily="2" charset="0"/>
-                <a:cs typeface="Consolas" panose="020B0609020204030204" pitchFamily="49" charset="0"/>
-              </a:rPr>
-              <a:t>variables_scope.sh</a:t>
-            </a:r>
-            <a:endParaRPr lang="en-US" sz="4400" b="1" dirty="0">
-              <a:solidFill>
-                <a:schemeClr val="accent1">
-                  <a:lumMod val="75000"/>
-                </a:schemeClr>
-              </a:solidFill>
-              <a:latin typeface="Consolas" panose="020B0609020204030204" pitchFamily="49" charset="0"/>
-              <a:ea typeface="Helvetica Neue Light" panose="02000403000000020004" pitchFamily="2" charset="0"/>
-              <a:cs typeface="Consolas" panose="020B0609020204030204" pitchFamily="49" charset="0"/>
-            </a:endParaRPr>
-          </a:p>
-        </p:txBody>
-      </p:sp>
-      <p:sp>
-        <p:nvSpPr>
-          <p:cNvPr id="3" name="Date Placeholder 2">
-            <a:extLst>
-              <a:ext uri="{FF2B5EF4-FFF2-40B4-BE49-F238E27FC236}">
-                <a16:creationId xmlns:a16="http://schemas.microsoft.com/office/drawing/2014/main" id="{1F32A9E3-6978-B4E2-9D90-3A87FB73EF5F}"/>
+                <a16:creationId xmlns:a16="http://schemas.microsoft.com/office/drawing/2014/main" id="{6DA1E5D1-8D5E-CE4B-17BB-DBFF772E66E7}"/>
               </a:ext>
             </a:extLst>
           </p:cNvPr>
@@ -25523,24 +26256,24 @@
             <p:ph type="dt" idx="10"/>
           </p:nvPr>
         </p:nvSpPr>
-        <p:spPr/>
+        <p:spPr>
+          <a:xfrm>
+            <a:off x="2931386" y="6356349"/>
+            <a:ext cx="906687" cy="327667"/>
+          </a:xfrm>
+        </p:spPr>
         <p:txBody>
           <a:bodyPr/>
           <a:lstStyle/>
           <a:p>
             <a:r>
-              <a:rPr lang="en-US"/>
-              <a:t>1/8/2025</a:t>
+              <a:rPr lang="en-US" dirty="0"/>
+              <a:t>1/29/2025</a:t>
             </a:r>
           </a:p>
         </p:txBody>
       </p:sp>
     </p:spTree>
-    <p:extLst>
-      <p:ext uri="{BB962C8B-B14F-4D97-AF65-F5344CB8AC3E}">
-        <p14:creationId xmlns:p14="http://schemas.microsoft.com/office/powerpoint/2010/main" val="1206791772"/>
-      </p:ext>
-    </p:extLst>
   </p:cSld>
   <p:clrMapOvr>
     <a:masterClrMapping/>
@@ -26057,7 +26790,35 @@
           <a:p>
             <a:r>
               <a:rPr lang="en-US"/>
-              <a:t>1/8/2025</a:t>
+              <a:t>8/18/25</a:t>
+            </a:r>
+          </a:p>
+        </p:txBody>
+      </p:sp>
+      <p:sp>
+        <p:nvSpPr>
+          <p:cNvPr id="4" name="Footer Placeholder 3">
+            <a:extLst>
+              <a:ext uri="{FF2B5EF4-FFF2-40B4-BE49-F238E27FC236}">
+                <a16:creationId xmlns:a16="http://schemas.microsoft.com/office/drawing/2014/main" id="{A2305DCC-C57A-01E8-121A-B8B521146651}"/>
+              </a:ext>
+            </a:extLst>
+          </p:cNvPr>
+          <p:cNvSpPr>
+            <a:spLocks noGrp="1"/>
+          </p:cNvSpPr>
+          <p:nvPr>
+            <p:ph type="ftr" idx="11"/>
+          </p:nvPr>
+        </p:nvSpPr>
+        <p:spPr/>
+        <p:txBody>
+          <a:bodyPr/>
+          <a:lstStyle/>
+          <a:p>
+            <a:r>
+              <a:rPr lang="en-US"/>
+              <a:t>Logging in and Linux</a:t>
             </a:r>
           </a:p>
         </p:txBody>
@@ -26553,7 +27314,35 @@
           <a:p>
             <a:r>
               <a:rPr lang="en-US"/>
-              <a:t>1/8/2025</a:t>
+              <a:t>8/18/25</a:t>
+            </a:r>
+          </a:p>
+        </p:txBody>
+      </p:sp>
+      <p:sp>
+        <p:nvSpPr>
+          <p:cNvPr id="5" name="Footer Placeholder 4">
+            <a:extLst>
+              <a:ext uri="{FF2B5EF4-FFF2-40B4-BE49-F238E27FC236}">
+                <a16:creationId xmlns:a16="http://schemas.microsoft.com/office/drawing/2014/main" id="{05740369-C347-64D4-2DC8-22CD0B3A4309}"/>
+              </a:ext>
+            </a:extLst>
+          </p:cNvPr>
+          <p:cNvSpPr>
+            <a:spLocks noGrp="1"/>
+          </p:cNvSpPr>
+          <p:nvPr>
+            <p:ph type="ftr" idx="11"/>
+          </p:nvPr>
+        </p:nvSpPr>
+        <p:spPr/>
+        <p:txBody>
+          <a:bodyPr/>
+          <a:lstStyle/>
+          <a:p>
+            <a:r>
+              <a:rPr lang="en-US"/>
+              <a:t>Logging in and Linux</a:t>
             </a:r>
           </a:p>
         </p:txBody>
@@ -27177,7 +27966,35 @@
           <a:p>
             <a:r>
               <a:rPr lang="en-US"/>
-              <a:t>1/8/2025</a:t>
+              <a:t>8/18/25</a:t>
+            </a:r>
+          </a:p>
+        </p:txBody>
+      </p:sp>
+      <p:sp>
+        <p:nvSpPr>
+          <p:cNvPr id="3" name="Footer Placeholder 2">
+            <a:extLst>
+              <a:ext uri="{FF2B5EF4-FFF2-40B4-BE49-F238E27FC236}">
+                <a16:creationId xmlns:a16="http://schemas.microsoft.com/office/drawing/2014/main" id="{64837712-9B92-6C73-F782-2F115CDD8355}"/>
+              </a:ext>
+            </a:extLst>
+          </p:cNvPr>
+          <p:cNvSpPr>
+            <a:spLocks noGrp="1"/>
+          </p:cNvSpPr>
+          <p:nvPr>
+            <p:ph type="ftr" idx="11"/>
+          </p:nvPr>
+        </p:nvSpPr>
+        <p:spPr/>
+        <p:txBody>
+          <a:bodyPr/>
+          <a:lstStyle/>
+          <a:p>
+            <a:r>
+              <a:rPr lang="en-US"/>
+              <a:t>Logging in and Linux</a:t>
             </a:r>
           </a:p>
         </p:txBody>
@@ -27632,7 +28449,35 @@
           <a:p>
             <a:r>
               <a:rPr lang="en-US"/>
-              <a:t>1/8/2025</a:t>
+              <a:t>8/18/25</a:t>
+            </a:r>
+          </a:p>
+        </p:txBody>
+      </p:sp>
+      <p:sp>
+        <p:nvSpPr>
+          <p:cNvPr id="3" name="Footer Placeholder 2">
+            <a:extLst>
+              <a:ext uri="{FF2B5EF4-FFF2-40B4-BE49-F238E27FC236}">
+                <a16:creationId xmlns:a16="http://schemas.microsoft.com/office/drawing/2014/main" id="{C525CE01-81FB-41BE-09F0-7B8BE9905181}"/>
+              </a:ext>
+            </a:extLst>
+          </p:cNvPr>
+          <p:cNvSpPr>
+            <a:spLocks noGrp="1"/>
+          </p:cNvSpPr>
+          <p:nvPr>
+            <p:ph type="ftr" idx="11"/>
+          </p:nvPr>
+        </p:nvSpPr>
+        <p:spPr/>
+        <p:txBody>
+          <a:bodyPr/>
+          <a:lstStyle/>
+          <a:p>
+            <a:r>
+              <a:rPr lang="en-US"/>
+              <a:t>Logging in and Linux</a:t>
             </a:r>
           </a:p>
         </p:txBody>
@@ -27651,6 +28496,582 @@
 </file>
 
 <file path=ppt/slides/slide8.xml><?xml version="1.0" encoding="utf-8"?>
+<p:sld xmlns:a="http://schemas.openxmlformats.org/drawingml/2006/main" xmlns:r="http://schemas.openxmlformats.org/officeDocument/2006/relationships" xmlns:p="http://schemas.openxmlformats.org/presentationml/2006/main">
+  <p:cSld>
+    <p:spTree>
+      <p:nvGrpSpPr>
+        <p:cNvPr id="1" name="Shape 105"/>
+        <p:cNvGrpSpPr/>
+        <p:nvPr/>
+      </p:nvGrpSpPr>
+      <p:grpSpPr>
+        <a:xfrm>
+          <a:off x="0" y="0"/>
+          <a:ext cx="0" cy="0"/>
+          <a:chOff x="0" y="0"/>
+          <a:chExt cx="0" cy="0"/>
+        </a:xfrm>
+      </p:grpSpPr>
+      <p:sp>
+        <p:nvSpPr>
+          <p:cNvPr id="106" name="Google Shape;106;p15"/>
+          <p:cNvSpPr txBox="1">
+            <a:spLocks noGrp="1"/>
+          </p:cNvSpPr>
+          <p:nvPr>
+            <p:ph type="title"/>
+          </p:nvPr>
+        </p:nvSpPr>
+        <p:spPr>
+          <a:xfrm>
+            <a:off x="878685" y="398202"/>
+            <a:ext cx="11008515" cy="689932"/>
+          </a:xfrm>
+          <a:prstGeom prst="rect">
+            <a:avLst/>
+          </a:prstGeom>
+          <a:noFill/>
+          <a:ln>
+            <a:noFill/>
+          </a:ln>
+        </p:spPr>
+        <p:txBody>
+          <a:bodyPr spcFirstLastPara="1" wrap="square" lIns="0" tIns="12700" rIns="0" bIns="0" anchor="ctr" anchorCtr="0">
+            <a:spAutoFit/>
+          </a:bodyPr>
+          <a:lstStyle/>
+          <a:p>
+            <a:pPr marL="12700" lvl="0" indent="0" algn="l" rtl="0">
+              <a:lnSpc>
+                <a:spcPct val="100000"/>
+              </a:lnSpc>
+              <a:spcBef>
+                <a:spcPts val="0"/>
+              </a:spcBef>
+              <a:spcAft>
+                <a:spcPts val="0"/>
+              </a:spcAft>
+              <a:buClr>
+                <a:schemeClr val="dk1"/>
+              </a:buClr>
+              <a:buSzPts val="4400"/>
+              <a:buFont typeface="Arial Black"/>
+              <a:buNone/>
+            </a:pPr>
+            <a:r>
+              <a:rPr lang="en-US" dirty="0"/>
+              <a:t>Alt: Logging into CURC via browser</a:t>
+            </a:r>
+            <a:endParaRPr dirty="0"/>
+          </a:p>
+        </p:txBody>
+      </p:sp>
+      <p:sp>
+        <p:nvSpPr>
+          <p:cNvPr id="8" name="Google Shape;109;p15">
+            <a:extLst>
+              <a:ext uri="{FF2B5EF4-FFF2-40B4-BE49-F238E27FC236}">
+                <a16:creationId xmlns:a16="http://schemas.microsoft.com/office/drawing/2014/main" id="{F4A446E5-F8F2-4797-0B74-0798FC0C6C5B}"/>
+              </a:ext>
+            </a:extLst>
+          </p:cNvPr>
+          <p:cNvSpPr txBox="1"/>
+          <p:nvPr/>
+        </p:nvSpPr>
+        <p:spPr>
+          <a:xfrm>
+            <a:off x="744209" y="1383160"/>
+            <a:ext cx="10429395" cy="4526219"/>
+          </a:xfrm>
+          <a:prstGeom prst="rect">
+            <a:avLst/>
+          </a:prstGeom>
+          <a:noFill/>
+          <a:ln>
+            <a:noFill/>
+          </a:ln>
+        </p:spPr>
+        <p:txBody>
+          <a:bodyPr spcFirstLastPara="1" wrap="square" lIns="0" tIns="93325" rIns="0" bIns="0" anchor="t" anchorCtr="0">
+            <a:spAutoFit/>
+          </a:bodyPr>
+          <a:lstStyle/>
+          <a:p>
+            <a:pPr marL="377825" lvl="1" indent="-243840">
+              <a:buClr>
+                <a:srgbClr val="A9A57C"/>
+              </a:buClr>
+              <a:buSzPts val="2550"/>
+              <a:buFont typeface="Arial"/>
+              <a:buChar char="•"/>
+            </a:pPr>
+            <a:r>
+              <a:rPr lang="en-US" sz="2400" dirty="0">
+                <a:solidFill>
+                  <a:schemeClr val="tx1"/>
+                </a:solidFill>
+                <a:latin typeface="+mn-lt"/>
+                <a:ea typeface="Helvetica Neue Light" panose="02000403000000020004" pitchFamily="2" charset="0"/>
+                <a:sym typeface="Arial"/>
+              </a:rPr>
+              <a:t>Navigate to </a:t>
+            </a:r>
+            <a:r>
+              <a:rPr lang="en-US" sz="2400" dirty="0">
+                <a:solidFill>
+                  <a:schemeClr val="tx1"/>
+                </a:solidFill>
+                <a:latin typeface="+mn-lt"/>
+                <a:ea typeface="Helvetica Neue Light" panose="02000403000000020004" pitchFamily="2" charset="0"/>
+                <a:sym typeface="Arial"/>
+                <a:hlinkClick r:id="rId3"/>
+              </a:rPr>
+              <a:t>https://ondemand-rmacc.rc.colorado.edu</a:t>
+            </a:r>
+            <a:r>
+              <a:rPr lang="en-US" sz="2400" dirty="0">
+                <a:solidFill>
+                  <a:schemeClr val="tx1"/>
+                </a:solidFill>
+                <a:latin typeface="+mn-lt"/>
+                <a:ea typeface="Helvetica Neue Light" panose="02000403000000020004" pitchFamily="2" charset="0"/>
+                <a:sym typeface="Arial"/>
+              </a:rPr>
+              <a:t> </a:t>
+            </a:r>
+            <a:endParaRPr lang="en-US" sz="2400" dirty="0">
+              <a:solidFill>
+                <a:schemeClr val="accent1">
+                  <a:lumMod val="75000"/>
+                </a:schemeClr>
+              </a:solidFill>
+              <a:latin typeface="+mn-lt"/>
+              <a:ea typeface="Helvetica Neue Light" panose="02000403000000020004" pitchFamily="2" charset="0"/>
+              <a:cs typeface="Source Sans Pro Light" panose="020F0302020204030204" pitchFamily="34" charset="0"/>
+              <a:sym typeface="Wingdings" pitchFamily="2" charset="2"/>
+            </a:endParaRPr>
+          </a:p>
+          <a:p>
+            <a:pPr marL="377825" marR="0" lvl="0" indent="-243840" algn="l" rtl="0">
+              <a:lnSpc>
+                <a:spcPct val="100000"/>
+              </a:lnSpc>
+              <a:spcBef>
+                <a:spcPts val="0"/>
+              </a:spcBef>
+              <a:spcAft>
+                <a:spcPts val="0"/>
+              </a:spcAft>
+              <a:buClr>
+                <a:srgbClr val="A9A57C"/>
+              </a:buClr>
+              <a:buSzPts val="2550"/>
+              <a:buFont typeface="Arial"/>
+              <a:buChar char="•"/>
+            </a:pPr>
+            <a:endParaRPr lang="en-US" sz="2400" dirty="0">
+              <a:solidFill>
+                <a:srgbClr val="FF0000"/>
+              </a:solidFill>
+              <a:latin typeface="+mn-lt"/>
+              <a:ea typeface="Helvetica Neue Light" panose="02000403000000020004" pitchFamily="2" charset="0"/>
+              <a:sym typeface="Wingdings" pitchFamily="2" charset="2"/>
+            </a:endParaRPr>
+          </a:p>
+          <a:p>
+            <a:pPr marL="377825" marR="0" lvl="0" indent="-243840" algn="l" rtl="0">
+              <a:lnSpc>
+                <a:spcPct val="100000"/>
+              </a:lnSpc>
+              <a:spcBef>
+                <a:spcPts val="0"/>
+              </a:spcBef>
+              <a:spcAft>
+                <a:spcPts val="0"/>
+              </a:spcAft>
+              <a:buClr>
+                <a:srgbClr val="A9A57C"/>
+              </a:buClr>
+              <a:buSzPts val="2550"/>
+              <a:buFont typeface="Arial"/>
+              <a:buChar char="•"/>
+            </a:pPr>
+            <a:r>
+              <a:rPr lang="en-US" sz="2400" dirty="0">
+                <a:solidFill>
+                  <a:schemeClr val="tx1"/>
+                </a:solidFill>
+                <a:latin typeface="+mn-lt"/>
+                <a:ea typeface="Helvetica Neue Light" panose="02000403000000020004" pitchFamily="2" charset="0"/>
+                <a:sym typeface="Wingdings" pitchFamily="2" charset="2"/>
+              </a:rPr>
+              <a:t>Choose your organization</a:t>
+            </a:r>
+          </a:p>
+          <a:p>
+            <a:pPr marL="377825" marR="0" lvl="0" indent="-243840" algn="l" rtl="0">
+              <a:lnSpc>
+                <a:spcPct val="100000"/>
+              </a:lnSpc>
+              <a:spcBef>
+                <a:spcPts val="0"/>
+              </a:spcBef>
+              <a:spcAft>
+                <a:spcPts val="0"/>
+              </a:spcAft>
+              <a:buClr>
+                <a:srgbClr val="A9A57C"/>
+              </a:buClr>
+              <a:buSzPts val="2550"/>
+              <a:buFont typeface="Arial"/>
+              <a:buChar char="•"/>
+            </a:pPr>
+            <a:endParaRPr lang="en-US" sz="2400" dirty="0">
+              <a:solidFill>
+                <a:schemeClr val="tx1"/>
+              </a:solidFill>
+              <a:latin typeface="+mn-lt"/>
+              <a:ea typeface="Helvetica Neue Light" panose="02000403000000020004" pitchFamily="2" charset="0"/>
+              <a:sym typeface="Wingdings" pitchFamily="2" charset="2"/>
+            </a:endParaRPr>
+          </a:p>
+          <a:p>
+            <a:pPr marL="377825" marR="0" lvl="0" indent="-243840" algn="l" rtl="0">
+              <a:lnSpc>
+                <a:spcPct val="100000"/>
+              </a:lnSpc>
+              <a:spcBef>
+                <a:spcPts val="0"/>
+              </a:spcBef>
+              <a:spcAft>
+                <a:spcPts val="0"/>
+              </a:spcAft>
+              <a:buClr>
+                <a:srgbClr val="A9A57C"/>
+              </a:buClr>
+              <a:buSzPts val="2550"/>
+              <a:buFont typeface="Arial"/>
+              <a:buChar char="•"/>
+            </a:pPr>
+            <a:r>
+              <a:rPr lang="en-US" sz="2400" dirty="0">
+                <a:solidFill>
+                  <a:schemeClr val="tx1"/>
+                </a:solidFill>
+                <a:latin typeface="+mn-lt"/>
+                <a:ea typeface="Helvetica Neue Light" panose="02000403000000020004" pitchFamily="2" charset="0"/>
+                <a:sym typeface="Wingdings" pitchFamily="2" charset="2"/>
+              </a:rPr>
+              <a:t>Enter your password</a:t>
+            </a:r>
+          </a:p>
+          <a:p>
+            <a:pPr marL="377825" marR="0" lvl="0" indent="-243840" algn="l" rtl="0">
+              <a:lnSpc>
+                <a:spcPct val="100000"/>
+              </a:lnSpc>
+              <a:spcBef>
+                <a:spcPts val="0"/>
+              </a:spcBef>
+              <a:spcAft>
+                <a:spcPts val="0"/>
+              </a:spcAft>
+              <a:buClr>
+                <a:srgbClr val="A9A57C"/>
+              </a:buClr>
+              <a:buSzPts val="2550"/>
+              <a:buFont typeface="Arial"/>
+              <a:buChar char="•"/>
+            </a:pPr>
+            <a:endParaRPr lang="en-US" sz="2400" dirty="0">
+              <a:solidFill>
+                <a:schemeClr val="tx1"/>
+              </a:solidFill>
+              <a:latin typeface="+mn-lt"/>
+              <a:ea typeface="Helvetica Neue Light" panose="02000403000000020004" pitchFamily="2" charset="0"/>
+              <a:sym typeface="Wingdings" pitchFamily="2" charset="2"/>
+            </a:endParaRPr>
+          </a:p>
+          <a:p>
+            <a:pPr marL="377825" marR="0" lvl="0" indent="-243840" algn="l" rtl="0">
+              <a:lnSpc>
+                <a:spcPct val="100000"/>
+              </a:lnSpc>
+              <a:spcBef>
+                <a:spcPts val="0"/>
+              </a:spcBef>
+              <a:spcAft>
+                <a:spcPts val="0"/>
+              </a:spcAft>
+              <a:buClr>
+                <a:srgbClr val="A9A57C"/>
+              </a:buClr>
+              <a:buSzPts val="2550"/>
+              <a:buFont typeface="Arial"/>
+              <a:buChar char="•"/>
+            </a:pPr>
+            <a:r>
+              <a:rPr lang="en-US" sz="2400" dirty="0">
+                <a:solidFill>
+                  <a:schemeClr val="tx1"/>
+                </a:solidFill>
+                <a:latin typeface="+mn-lt"/>
+                <a:ea typeface="Helvetica Neue Light" panose="02000403000000020004" pitchFamily="2" charset="0"/>
+                <a:sym typeface="Wingdings" pitchFamily="2" charset="2"/>
+              </a:rPr>
+              <a:t>Authenticate by accepting the Duo push to your smartphone</a:t>
+            </a:r>
+          </a:p>
+          <a:p>
+            <a:pPr marL="377825" marR="0" lvl="0" indent="-243840" algn="l" rtl="0">
+              <a:lnSpc>
+                <a:spcPct val="100000"/>
+              </a:lnSpc>
+              <a:spcBef>
+                <a:spcPts val="0"/>
+              </a:spcBef>
+              <a:spcAft>
+                <a:spcPts val="0"/>
+              </a:spcAft>
+              <a:buClr>
+                <a:srgbClr val="A9A57C"/>
+              </a:buClr>
+              <a:buSzPts val="2550"/>
+              <a:buFont typeface="Arial"/>
+              <a:buChar char="•"/>
+            </a:pPr>
+            <a:endParaRPr lang="en-US" sz="2400" dirty="0">
+              <a:solidFill>
+                <a:schemeClr val="tx1"/>
+              </a:solidFill>
+              <a:latin typeface="+mn-lt"/>
+              <a:ea typeface="Helvetica Neue Light" panose="02000403000000020004" pitchFamily="2" charset="0"/>
+              <a:sym typeface="Wingdings" pitchFamily="2" charset="2"/>
+            </a:endParaRPr>
+          </a:p>
+          <a:p>
+            <a:pPr marL="377825" marR="0" lvl="0" indent="-243840" algn="l" rtl="0">
+              <a:lnSpc>
+                <a:spcPct val="100000"/>
+              </a:lnSpc>
+              <a:spcBef>
+                <a:spcPts val="0"/>
+              </a:spcBef>
+              <a:spcAft>
+                <a:spcPts val="0"/>
+              </a:spcAft>
+              <a:buClr>
+                <a:srgbClr val="A9A57C"/>
+              </a:buClr>
+              <a:buSzPts val="2550"/>
+              <a:buFont typeface="Arial"/>
+              <a:buChar char="•"/>
+            </a:pPr>
+            <a:r>
+              <a:rPr lang="en-US" sz="2400" dirty="0">
+                <a:solidFill>
+                  <a:schemeClr val="tx1"/>
+                </a:solidFill>
+                <a:latin typeface="+mn-lt"/>
+                <a:ea typeface="Helvetica Neue Light" panose="02000403000000020004" pitchFamily="2" charset="0"/>
+                <a:sym typeface="Wingdings" pitchFamily="2" charset="2"/>
+              </a:rPr>
+              <a:t>Select the “Clusters” app to bring up an Alpine terminal</a:t>
+            </a:r>
+          </a:p>
+          <a:p>
+            <a:pPr marL="133985" lvl="1">
+              <a:buClr>
+                <a:srgbClr val="A9A57C"/>
+              </a:buClr>
+              <a:buSzPts val="2550"/>
+            </a:pPr>
+            <a:endParaRPr lang="en-US" sz="2400" dirty="0">
+              <a:latin typeface="+mn-lt"/>
+              <a:ea typeface="Helvetica Neue Light" panose="02000403000000020004" pitchFamily="2" charset="0"/>
+              <a:hlinkClick r:id="rId4"/>
+            </a:endParaRPr>
+          </a:p>
+          <a:p>
+            <a:pPr marL="133985" lvl="1">
+              <a:buClr>
+                <a:srgbClr val="A9A57C"/>
+              </a:buClr>
+              <a:buSzPts val="2550"/>
+            </a:pPr>
+            <a:endParaRPr lang="en-US" sz="2400" dirty="0">
+              <a:latin typeface="+mn-lt"/>
+              <a:ea typeface="Helvetica Neue Light" panose="02000403000000020004" pitchFamily="2" charset="0"/>
+              <a:hlinkClick r:id="rId4"/>
+            </a:endParaRPr>
+          </a:p>
+          <a:p>
+            <a:pPr marL="133985" lvl="1">
+              <a:buClr>
+                <a:srgbClr val="A9A57C"/>
+              </a:buClr>
+              <a:buSzPts val="2550"/>
+            </a:pPr>
+            <a:r>
+              <a:rPr lang="en-US" sz="2400" dirty="0">
+                <a:latin typeface="+mn-lt"/>
+                <a:ea typeface="Helvetica Neue Light" panose="02000403000000020004" pitchFamily="2" charset="0"/>
+                <a:hlinkClick r:id="rId5"/>
+              </a:rPr>
+              <a:t>https://curc.readthedocs.io/en/latest/open_ondemand/index.html</a:t>
+            </a:r>
+            <a:r>
+              <a:rPr lang="en-US" sz="2400" dirty="0">
+                <a:latin typeface="+mn-lt"/>
+                <a:ea typeface="Helvetica Neue Light" panose="02000403000000020004" pitchFamily="2" charset="0"/>
+              </a:rPr>
+              <a:t> </a:t>
+            </a:r>
+            <a:endParaRPr sz="2400" dirty="0">
+              <a:solidFill>
+                <a:schemeClr val="tx1"/>
+              </a:solidFill>
+              <a:latin typeface="+mn-lt"/>
+              <a:ea typeface="Helvetica Neue Light" panose="02000403000000020004" pitchFamily="2" charset="0"/>
+              <a:sym typeface="Arial"/>
+            </a:endParaRPr>
+          </a:p>
+        </p:txBody>
+      </p:sp>
+      <p:sp>
+        <p:nvSpPr>
+          <p:cNvPr id="107" name="Google Shape;107;p15"/>
+          <p:cNvSpPr txBox="1">
+            <a:spLocks noGrp="1"/>
+          </p:cNvSpPr>
+          <p:nvPr>
+            <p:ph type="ftr" idx="11"/>
+          </p:nvPr>
+        </p:nvSpPr>
+        <p:spPr>
+          <a:xfrm>
+            <a:off x="4122303" y="6443053"/>
+            <a:ext cx="4114800" cy="191719"/>
+          </a:xfrm>
+          <a:prstGeom prst="rect">
+            <a:avLst/>
+          </a:prstGeom>
+          <a:noFill/>
+          <a:ln>
+            <a:noFill/>
+          </a:ln>
+        </p:spPr>
+        <p:txBody>
+          <a:bodyPr spcFirstLastPara="1" wrap="square" lIns="0" tIns="6975" rIns="0" bIns="0" anchor="ctr" anchorCtr="0">
+            <a:spAutoFit/>
+          </a:bodyPr>
+          <a:lstStyle/>
+          <a:p>
+            <a:r>
+              <a:rPr lang="en-US"/>
+              <a:t>Logging in and Linux</a:t>
+            </a:r>
+            <a:endParaRPr lang="en-US" dirty="0"/>
+          </a:p>
+        </p:txBody>
+      </p:sp>
+      <p:sp>
+        <p:nvSpPr>
+          <p:cNvPr id="108" name="Google Shape;108;p15"/>
+          <p:cNvSpPr txBox="1">
+            <a:spLocks noGrp="1"/>
+          </p:cNvSpPr>
+          <p:nvPr>
+            <p:ph type="sldNum" idx="12"/>
+          </p:nvPr>
+        </p:nvSpPr>
+        <p:spPr>
+          <a:xfrm>
+            <a:off x="8610600" y="6393809"/>
+            <a:ext cx="682920" cy="290207"/>
+          </a:xfrm>
+          <a:prstGeom prst="rect">
+            <a:avLst/>
+          </a:prstGeom>
+          <a:noFill/>
+          <a:ln>
+            <a:noFill/>
+          </a:ln>
+        </p:spPr>
+        <p:txBody>
+          <a:bodyPr spcFirstLastPara="1" wrap="square" lIns="0" tIns="104500" rIns="0" bIns="0" anchor="ctr" anchorCtr="0">
+            <a:spAutoFit/>
+          </a:bodyPr>
+          <a:lstStyle/>
+          <a:p>
+            <a:pPr marL="25400" lvl="0" indent="0" algn="l" rtl="0">
+              <a:lnSpc>
+                <a:spcPct val="100000"/>
+              </a:lnSpc>
+              <a:spcBef>
+                <a:spcPts val="0"/>
+              </a:spcBef>
+              <a:spcAft>
+                <a:spcPts val="0"/>
+              </a:spcAft>
+              <a:buNone/>
+            </a:pPr>
+            <a:fld id="{00000000-1234-1234-1234-123412341234}" type="slidenum">
+              <a:rPr lang="en-US"/>
+              <a:t>8</a:t>
+            </a:fld>
+            <a:endParaRPr/>
+          </a:p>
+        </p:txBody>
+      </p:sp>
+      <p:sp>
+        <p:nvSpPr>
+          <p:cNvPr id="3" name="Date Placeholder 2">
+            <a:extLst>
+              <a:ext uri="{FF2B5EF4-FFF2-40B4-BE49-F238E27FC236}">
+                <a16:creationId xmlns:a16="http://schemas.microsoft.com/office/drawing/2014/main" id="{226AF617-6054-2B25-941A-072D846D4A79}"/>
+              </a:ext>
+            </a:extLst>
+          </p:cNvPr>
+          <p:cNvSpPr>
+            <a:spLocks noGrp="1"/>
+          </p:cNvSpPr>
+          <p:nvPr>
+            <p:ph type="dt" idx="10"/>
+          </p:nvPr>
+        </p:nvSpPr>
+        <p:spPr>
+          <a:xfrm>
+            <a:off x="2931386" y="6356349"/>
+            <a:ext cx="906687" cy="327667"/>
+          </a:xfrm>
+        </p:spPr>
+        <p:txBody>
+          <a:bodyPr/>
+          <a:lstStyle/>
+          <a:p>
+            <a:r>
+              <a:rPr lang="en-US"/>
+              <a:t>8/18/25</a:t>
+            </a:r>
+            <a:endParaRPr lang="en-US" dirty="0"/>
+          </a:p>
+        </p:txBody>
+      </p:sp>
+    </p:spTree>
+    <p:extLst>
+      <p:ext uri="{BB962C8B-B14F-4D97-AF65-F5344CB8AC3E}">
+        <p14:creationId xmlns:p14="http://schemas.microsoft.com/office/powerpoint/2010/main" val="2085987279"/>
+      </p:ext>
+    </p:extLst>
+  </p:cSld>
+  <p:clrMapOvr>
+    <a:masterClrMapping/>
+  </p:clrMapOvr>
+</p:sld>
+</file>
+
+<file path=ppt/slides/slide9.xml><?xml version="1.0" encoding="utf-8"?>
 <p:sld xmlns:a="http://schemas.openxmlformats.org/drawingml/2006/main" xmlns:r="http://schemas.openxmlformats.org/officeDocument/2006/relationships" xmlns:p="http://schemas.openxmlformats.org/presentationml/2006/main">
   <p:cSld>
     <p:spTree>
@@ -28265,7 +29686,7 @@
             </a:pPr>
             <a:fld id="{00000000-1234-1234-1234-123412341234}" type="slidenum">
               <a:rPr lang="en-US" smtClean="0"/>
-              <a:t>8</a:t>
+              <a:t>9</a:t>
             </a:fld>
             <a:endParaRPr lang="en-US"/>
           </a:p>
@@ -28294,42 +29715,17 @@
           <a:p>
             <a:r>
               <a:rPr lang="en-US"/>
-              <a:t>1/8/2025</a:t>
+              <a:t>8/18/25</a:t>
             </a:r>
           </a:p>
         </p:txBody>
       </p:sp>
-    </p:spTree>
-  </p:cSld>
-  <p:clrMapOvr>
-    <a:masterClrMapping/>
-  </p:clrMapOvr>
-</p:sld>
-</file>
-
-<file path=ppt/slides/slide9.xml><?xml version="1.0" encoding="utf-8"?>
-<p:sld xmlns:a="http://schemas.openxmlformats.org/drawingml/2006/main" xmlns:r="http://schemas.openxmlformats.org/officeDocument/2006/relationships" xmlns:p="http://schemas.openxmlformats.org/presentationml/2006/main">
-  <p:cSld>
-    <p:spTree>
-      <p:nvGrpSpPr>
-        <p:cNvPr id="1" name="Shape 271"/>
-        <p:cNvGrpSpPr/>
-        <p:nvPr/>
-      </p:nvGrpSpPr>
-      <p:grpSpPr>
-        <a:xfrm>
-          <a:off x="0" y="0"/>
-          <a:ext cx="0" cy="0"/>
-          <a:chOff x="0" y="0"/>
-          <a:chExt cx="0" cy="0"/>
-        </a:xfrm>
-      </p:grpSpPr>
       <p:sp>
         <p:nvSpPr>
-          <p:cNvPr id="4" name="Slide Number Placeholder 3">
+          <p:cNvPr id="4" name="Footer Placeholder 3">
             <a:extLst>
               <a:ext uri="{FF2B5EF4-FFF2-40B4-BE49-F238E27FC236}">
-                <a16:creationId xmlns:a16="http://schemas.microsoft.com/office/drawing/2014/main" id="{237F62D6-87FD-B478-A104-3856ABC7EAD0}"/>
+                <a16:creationId xmlns:a16="http://schemas.microsoft.com/office/drawing/2014/main" id="{0BC9A45F-16F5-4736-AF14-26743125060B}"/>
               </a:ext>
             </a:extLst>
           </p:cNvPr>
@@ -28337,7 +29733,7 @@
             <a:spLocks noGrp="1"/>
           </p:cNvSpPr>
           <p:nvPr>
-            <p:ph type="sldNum" idx="12"/>
+            <p:ph type="ftr" idx="11"/>
           </p:nvPr>
         </p:nvSpPr>
         <p:spPr/>
@@ -28345,193 +29741,10 @@
           <a:bodyPr/>
           <a:lstStyle/>
           <a:p>
-            <a:pPr marL="0" lvl="0" indent="0" algn="l" rtl="0">
-              <a:spcBef>
-                <a:spcPts val="0"/>
-              </a:spcBef>
-              <a:spcAft>
-                <a:spcPts val="0"/>
-              </a:spcAft>
-              <a:buNone/>
-            </a:pPr>
-            <a:fld id="{00000000-1234-1234-1234-123412341234}" type="slidenum">
-              <a:rPr lang="en-US" smtClean="0"/>
-              <a:t>9</a:t>
-            </a:fld>
-            <a:endParaRPr lang="en-US"/>
-          </a:p>
-        </p:txBody>
-      </p:sp>
-      <p:sp>
-        <p:nvSpPr>
-          <p:cNvPr id="2" name="Date Placeholder 1">
-            <a:extLst>
-              <a:ext uri="{FF2B5EF4-FFF2-40B4-BE49-F238E27FC236}">
-                <a16:creationId xmlns:a16="http://schemas.microsoft.com/office/drawing/2014/main" id="{A1D5468F-ED2A-D72A-0BF9-6CC9E5099FEC}"/>
-              </a:ext>
-            </a:extLst>
-          </p:cNvPr>
-          <p:cNvSpPr>
-            <a:spLocks noGrp="1"/>
-          </p:cNvSpPr>
-          <p:nvPr>
-            <p:ph type="dt" idx="10"/>
-          </p:nvPr>
-        </p:nvSpPr>
-        <p:spPr/>
-        <p:txBody>
-          <a:bodyPr/>
-          <a:lstStyle/>
-          <a:p>
             <a:r>
               <a:rPr lang="en-US"/>
-              <a:t>1/8/2025</a:t>
-            </a:r>
-          </a:p>
-        </p:txBody>
-      </p:sp>
-      <p:pic>
-        <p:nvPicPr>
-          <p:cNvPr id="15" name="Picture 14" descr="Image showing linux filesystem tree">
-            <a:extLst>
-              <a:ext uri="{FF2B5EF4-FFF2-40B4-BE49-F238E27FC236}">
-                <a16:creationId xmlns:a16="http://schemas.microsoft.com/office/drawing/2014/main" id="{61319C00-0B4D-BECC-F26B-DE4DFF544919}"/>
-              </a:ext>
-            </a:extLst>
-          </p:cNvPr>
-          <p:cNvPicPr>
-            <a:picLocks noChangeAspect="1"/>
-          </p:cNvPicPr>
-          <p:nvPr/>
-        </p:nvPicPr>
-        <p:blipFill>
-          <a:blip r:embed="rId3"/>
-          <a:stretch>
-            <a:fillRect/>
-          </a:stretch>
-        </p:blipFill>
-        <p:spPr>
-          <a:xfrm>
-            <a:off x="391420" y="572369"/>
-            <a:ext cx="11409159" cy="5713262"/>
-          </a:xfrm>
-          <a:prstGeom prst="rect">
-            <a:avLst/>
-          </a:prstGeom>
-        </p:spPr>
-      </p:pic>
-      <p:sp>
-        <p:nvSpPr>
-          <p:cNvPr id="17" name="Rectangle 16">
-            <a:extLst>
-              <a:ext uri="{FF2B5EF4-FFF2-40B4-BE49-F238E27FC236}">
-                <a16:creationId xmlns:a16="http://schemas.microsoft.com/office/drawing/2014/main" id="{B40DABD5-B03F-A9A1-32D5-FBE67B83B05F}"/>
-              </a:ext>
-              <a:ext uri="{C183D7F6-B498-43B3-948B-1728B52AA6E4}">
-                <adec:decorative xmlns:adec="http://schemas.microsoft.com/office/drawing/2017/decorative" val="1"/>
-              </a:ext>
-            </a:extLst>
-          </p:cNvPr>
-          <p:cNvSpPr/>
-          <p:nvPr/>
-        </p:nvSpPr>
-        <p:spPr>
-          <a:xfrm>
-            <a:off x="738554" y="572369"/>
-            <a:ext cx="3569677" cy="1150923"/>
-          </a:xfrm>
-          <a:prstGeom prst="rect">
-            <a:avLst/>
-          </a:prstGeom>
-          <a:solidFill>
-            <a:schemeClr val="bg1"/>
-          </a:solidFill>
-          <a:ln>
-            <a:noFill/>
-          </a:ln>
-        </p:spPr>
-        <p:style>
-          <a:lnRef idx="2">
-            <a:schemeClr val="accent1">
-              <a:shade val="15000"/>
-            </a:schemeClr>
-          </a:lnRef>
-          <a:fillRef idx="1">
-            <a:schemeClr val="accent1"/>
-          </a:fillRef>
-          <a:effectRef idx="0">
-            <a:schemeClr val="accent1"/>
-          </a:effectRef>
-          <a:fontRef idx="minor">
-            <a:schemeClr val="lt1"/>
-          </a:fontRef>
-        </p:style>
-        <p:txBody>
-          <a:bodyPr rtlCol="0" anchor="ctr"/>
-          <a:lstStyle/>
-          <a:p>
-            <a:pPr algn="ctr"/>
-            <a:endParaRPr lang="en-US" dirty="0"/>
-          </a:p>
-        </p:txBody>
-      </p:sp>
-      <p:sp>
-        <p:nvSpPr>
-          <p:cNvPr id="18" name="Google Shape;251;p28">
-            <a:extLst>
-              <a:ext uri="{FF2B5EF4-FFF2-40B4-BE49-F238E27FC236}">
-                <a16:creationId xmlns:a16="http://schemas.microsoft.com/office/drawing/2014/main" id="{F9FE5CCF-F450-4D83-E3F1-29AA192226AA}"/>
-              </a:ext>
-            </a:extLst>
-          </p:cNvPr>
-          <p:cNvSpPr txBox="1">
-            <a:spLocks noGrp="1"/>
-          </p:cNvSpPr>
-          <p:nvPr>
-            <p:ph type="title"/>
-          </p:nvPr>
-        </p:nvSpPr>
-        <p:spPr>
-          <a:xfrm>
-            <a:off x="878686" y="398202"/>
-            <a:ext cx="6808800" cy="690000"/>
-          </a:xfrm>
-          <a:prstGeom prst="rect">
-            <a:avLst/>
-          </a:prstGeom>
-          <a:noFill/>
-          <a:ln>
-            <a:noFill/>
-          </a:ln>
-        </p:spPr>
-        <p:txBody>
-          <a:bodyPr spcFirstLastPara="1" wrap="square" lIns="0" tIns="12700" rIns="0" bIns="0" anchor="ctr" anchorCtr="0">
-            <a:spAutoFit/>
-          </a:bodyPr>
-          <a:lstStyle/>
-          <a:p>
-            <a:pPr marL="12700" lvl="0" indent="0" algn="l" rtl="0">
-              <a:lnSpc>
-                <a:spcPct val="100000"/>
-              </a:lnSpc>
-              <a:spcBef>
-                <a:spcPts val="0"/>
-              </a:spcBef>
-              <a:spcAft>
-                <a:spcPts val="0"/>
-              </a:spcAft>
-              <a:buClr>
-                <a:schemeClr val="dk1"/>
-              </a:buClr>
-              <a:buSzPts val="4400"/>
-              <a:buFont typeface="Arial Black"/>
-              <a:buNone/>
-            </a:pPr>
-            <a:r>
-              <a:rPr lang="en-US" dirty="0"/>
-              <a:t>Filesystem</a:t>
-            </a:r>
-            <a:endParaRPr dirty="0"/>
+              <a:t>Logging in and Linux</a:t>
+            </a:r>
           </a:p>
         </p:txBody>
       </p:sp>
@@ -29106,6 +30319,26 @@
 </file>
 
 <file path=customXml/item1.xml><?xml version="1.0" encoding="utf-8"?>
+<?mso-contentType ?>
+<FormTemplates xmlns="http://schemas.microsoft.com/sharepoint/v3/contenttype/forms">
+  <Display>DocumentLibraryForm</Display>
+  <Edit>DocumentLibraryForm</Edit>
+  <New>DocumentLibraryForm</New>
+</FormTemplates>
+</file>
+
+<file path=customXml/item2.xml><?xml version="1.0" encoding="utf-8"?>
+<p:properties xmlns:p="http://schemas.microsoft.com/office/2006/metadata/properties" xmlns:xsi="http://www.w3.org/2001/XMLSchema-instance" xmlns:pc="http://schemas.microsoft.com/office/infopath/2007/PartnerControls">
+  <documentManagement>
+    <TaxCatchAll xmlns="92c16b9d-8c83-445e-a4f4-1fe3d2f43f13" xsi:nil="true"/>
+    <lcf76f155ced4ddcb4097134ff3c332f xmlns="7e49f7d3-8802-46ca-9604-495ce27f67f4">
+      <Terms xmlns="http://schemas.microsoft.com/office/infopath/2007/PartnerControls"/>
+    </lcf76f155ced4ddcb4097134ff3c332f>
+  </documentManagement>
+</p:properties>
+</file>
+
+<file path=customXml/item3.xml><?xml version="1.0" encoding="utf-8"?>
 <ct:contentTypeSchema xmlns:ct="http://schemas.microsoft.com/office/2006/metadata/contentType" xmlns:ma="http://schemas.microsoft.com/office/2006/metadata/properties/metaAttributes" ct:_="" ma:_="" ma:contentTypeName="Document" ma:contentTypeID="0x010100DC7320DB280744439FF1CC777D09ECA4" ma:contentTypeVersion="15" ma:contentTypeDescription="Create a new document." ma:contentTypeScope="" ma:versionID="e50b92032c956cc777cf00ac7d475189">
   <xsd:schema xmlns:xsd="http://www.w3.org/2001/XMLSchema" xmlns:xs="http://www.w3.org/2001/XMLSchema" xmlns:p="http://schemas.microsoft.com/office/2006/metadata/properties" xmlns:ns2="7e49f7d3-8802-46ca-9604-495ce27f67f4" xmlns:ns3="a1519f9a-9d6a-41c1-afc9-552e4069f82f" xmlns:ns4="92c16b9d-8c83-445e-a4f4-1fe3d2f43f13" targetNamespace="http://schemas.microsoft.com/office/2006/metadata/properties" ma:root="true" ma:fieldsID="fcd7cab68a23f1df7b42ced4f3edf141" ns2:_="" ns3:_="" ns4:_="">
     <xsd:import namespace="7e49f7d3-8802-46ca-9604-495ce27f67f4"/>
@@ -29347,27 +30580,33 @@
 </ct:contentTypeSchema>
 </file>
 
-<file path=customXml/item2.xml><?xml version="1.0" encoding="utf-8"?>
-<?mso-contentType ?>
-<FormTemplates xmlns="http://schemas.microsoft.com/sharepoint/v3/contenttype/forms">
-  <Display>DocumentLibraryForm</Display>
-  <Edit>DocumentLibraryForm</Edit>
-  <New>DocumentLibraryForm</New>
-</FormTemplates>
+<file path=customXml/itemProps1.xml><?xml version="1.0" encoding="utf-8"?>
+<ds:datastoreItem xmlns:ds="http://schemas.openxmlformats.org/officeDocument/2006/customXml" ds:itemID="{14E7A314-01C0-48C4-8241-85F5E19C1BC9}">
+  <ds:schemaRefs>
+    <ds:schemaRef ds:uri="http://schemas.microsoft.com/sharepoint/v3/contenttype/forms"/>
+  </ds:schemaRefs>
+</ds:datastoreItem>
 </file>
 
-<file path=customXml/item3.xml><?xml version="1.0" encoding="utf-8"?>
-<p:properties xmlns:p="http://schemas.microsoft.com/office/2006/metadata/properties" xmlns:xsi="http://www.w3.org/2001/XMLSchema-instance" xmlns:pc="http://schemas.microsoft.com/office/infopath/2007/PartnerControls">
-  <documentManagement>
-    <TaxCatchAll xmlns="92c16b9d-8c83-445e-a4f4-1fe3d2f43f13" xsi:nil="true"/>
-    <lcf76f155ced4ddcb4097134ff3c332f xmlns="7e49f7d3-8802-46ca-9604-495ce27f67f4">
-      <Terms xmlns="http://schemas.microsoft.com/office/infopath/2007/PartnerControls"/>
-    </lcf76f155ced4ddcb4097134ff3c332f>
-  </documentManagement>
-</p:properties>
+<file path=customXml/itemProps2.xml><?xml version="1.0" encoding="utf-8"?>
+<ds:datastoreItem xmlns:ds="http://schemas.openxmlformats.org/officeDocument/2006/customXml" ds:itemID="{AF8482CD-4EDA-499F-B4D5-123993B6A2DD}">
+  <ds:schemaRefs>
+    <ds:schemaRef ds:uri="http://schemas.openxmlformats.org/package/2006/metadata/core-properties"/>
+    <ds:schemaRef ds:uri="http://schemas.microsoft.com/office/2006/documentManagement/types"/>
+    <ds:schemaRef ds:uri="a1519f9a-9d6a-41c1-afc9-552e4069f82f"/>
+    <ds:schemaRef ds:uri="http://www.w3.org/XML/1998/namespace"/>
+    <ds:schemaRef ds:uri="http://purl.org/dc/elements/1.1/"/>
+    <ds:schemaRef ds:uri="http://purl.org/dc/terms/"/>
+    <ds:schemaRef ds:uri="http://purl.org/dc/dcmitype/"/>
+    <ds:schemaRef ds:uri="http://schemas.microsoft.com/office/2006/metadata/properties"/>
+    <ds:schemaRef ds:uri="http://schemas.microsoft.com/office/infopath/2007/PartnerControls"/>
+    <ds:schemaRef ds:uri="92c16b9d-8c83-445e-a4f4-1fe3d2f43f13"/>
+    <ds:schemaRef ds:uri="7e49f7d3-8802-46ca-9604-495ce27f67f4"/>
+  </ds:schemaRefs>
+</ds:datastoreItem>
 </file>
 
-<file path=customXml/itemProps1.xml><?xml version="1.0" encoding="utf-8"?>
+<file path=customXml/itemProps3.xml><?xml version="1.0" encoding="utf-8"?>
 <ds:datastoreItem xmlns:ds="http://schemas.openxmlformats.org/officeDocument/2006/customXml" ds:itemID="{E58E6ED7-70FB-4535-88C7-C9FFFA89B4CB}">
   <ds:schemaRefs>
     <ds:schemaRef ds:uri="http://schemas.microsoft.com/office/2006/metadata/contentType"/>
@@ -29387,32 +30626,6 @@
 </ds:datastoreItem>
 </file>
 
-<file path=customXml/itemProps2.xml><?xml version="1.0" encoding="utf-8"?>
-<ds:datastoreItem xmlns:ds="http://schemas.openxmlformats.org/officeDocument/2006/customXml" ds:itemID="{14E7A314-01C0-48C4-8241-85F5E19C1BC9}">
-  <ds:schemaRefs>
-    <ds:schemaRef ds:uri="http://schemas.microsoft.com/sharepoint/v3/contenttype/forms"/>
-  </ds:schemaRefs>
-</ds:datastoreItem>
-</file>
-
-<file path=customXml/itemProps3.xml><?xml version="1.0" encoding="utf-8"?>
-<ds:datastoreItem xmlns:ds="http://schemas.openxmlformats.org/officeDocument/2006/customXml" ds:itemID="{AF8482CD-4EDA-499F-B4D5-123993B6A2DD}">
-  <ds:schemaRefs>
-    <ds:schemaRef ds:uri="http://schemas.openxmlformats.org/package/2006/metadata/core-properties"/>
-    <ds:schemaRef ds:uri="http://schemas.microsoft.com/office/2006/documentManagement/types"/>
-    <ds:schemaRef ds:uri="a1519f9a-9d6a-41c1-afc9-552e4069f82f"/>
-    <ds:schemaRef ds:uri="http://www.w3.org/XML/1998/namespace"/>
-    <ds:schemaRef ds:uri="http://purl.org/dc/elements/1.1/"/>
-    <ds:schemaRef ds:uri="http://purl.org/dc/terms/"/>
-    <ds:schemaRef ds:uri="http://purl.org/dc/dcmitype/"/>
-    <ds:schemaRef ds:uri="http://schemas.microsoft.com/office/2006/metadata/properties"/>
-    <ds:schemaRef ds:uri="http://schemas.microsoft.com/office/infopath/2007/PartnerControls"/>
-    <ds:schemaRef ds:uri="92c16b9d-8c83-445e-a4f4-1fe3d2f43f13"/>
-    <ds:schemaRef ds:uri="7e49f7d3-8802-46ca-9604-495ce27f67f4"/>
-  </ds:schemaRefs>
-</ds:datastoreItem>
-</file>
-
 <file path=docMetadata/LabelInfo.xml><?xml version="1.0" encoding="utf-8"?>
 <clbl:labelList xmlns:clbl="http://schemas.microsoft.com/office/2020/mipLabelMetadata">
   <clbl:label id="{3ded8b1b-070d-4629-82e4-c0b019f46057}" enabled="0" method="" siteId="{3ded8b1b-070d-4629-82e4-c0b019f46057}" removed="1"/>

</xml_diff>